<commit_message>
#9 ER Diagram Design
</commit_message>
<xml_diff>
--- a/docs/ER-DIAGRAM.pptx
+++ b/docs/ER-DIAGRAM.pptx
@@ -155,10 +155,9 @@
           </a:lstStyle>
           <a:p>
             <a:r>
-              <a:rPr lang="en-US" smtClean="0"/>
+              <a:rPr lang="en-US"/>
               <a:t>Click to edit Master title style</a:t>
             </a:r>
-            <a:endParaRPr lang="en-US"/>
           </a:p>
         </p:txBody>
       </p:sp>
@@ -220,10 +219,9 @@
           </a:lstStyle>
           <a:p>
             <a:r>
-              <a:rPr lang="en-US" smtClean="0"/>
+              <a:rPr lang="en-US"/>
               <a:t>Click to edit Master subtitle style</a:t>
             </a:r>
-            <a:endParaRPr lang="en-US"/>
           </a:p>
         </p:txBody>
       </p:sp>
@@ -244,7 +242,7 @@
           <a:p>
             <a:fld id="{28BE630F-C39C-4DB9-8258-0B48CA067079}" type="datetimeFigureOut">
               <a:rPr lang="en-US" smtClean="0"/>
-              <a:t>11/25/2021</a:t>
+              <a:t>11/26/2021</a:t>
             </a:fld>
             <a:endParaRPr lang="en-US"/>
           </a:p>
@@ -338,10 +336,9 @@
           <a:lstStyle/>
           <a:p>
             <a:r>
-              <a:rPr lang="en-US" smtClean="0"/>
+              <a:rPr lang="en-US"/>
               <a:t>Click to edit Master title style</a:t>
             </a:r>
-            <a:endParaRPr lang="en-US"/>
           </a:p>
         </p:txBody>
       </p:sp>
@@ -362,38 +359,37 @@
           <a:p>
             <a:pPr lvl="0"/>
             <a:r>
-              <a:rPr lang="en-US" smtClean="0"/>
+              <a:rPr lang="en-US"/>
               <a:t>Click to edit Master text styles</a:t>
             </a:r>
           </a:p>
           <a:p>
             <a:pPr lvl="1"/>
             <a:r>
-              <a:rPr lang="en-US" smtClean="0"/>
+              <a:rPr lang="en-US"/>
               <a:t>Second level</a:t>
             </a:r>
           </a:p>
           <a:p>
             <a:pPr lvl="2"/>
             <a:r>
-              <a:rPr lang="en-US" smtClean="0"/>
+              <a:rPr lang="en-US"/>
               <a:t>Third level</a:t>
             </a:r>
           </a:p>
           <a:p>
             <a:pPr lvl="3"/>
             <a:r>
-              <a:rPr lang="en-US" smtClean="0"/>
+              <a:rPr lang="en-US"/>
               <a:t>Fourth level</a:t>
             </a:r>
           </a:p>
           <a:p>
             <a:pPr lvl="4"/>
             <a:r>
-              <a:rPr lang="en-US" smtClean="0"/>
+              <a:rPr lang="en-US"/>
               <a:t>Fifth level</a:t>
             </a:r>
-            <a:endParaRPr lang="en-US"/>
           </a:p>
         </p:txBody>
       </p:sp>
@@ -414,7 +410,7 @@
           <a:p>
             <a:fld id="{28BE630F-C39C-4DB9-8258-0B48CA067079}" type="datetimeFigureOut">
               <a:rPr lang="en-US" smtClean="0"/>
-              <a:t>11/25/2021</a:t>
+              <a:t>11/26/2021</a:t>
             </a:fld>
             <a:endParaRPr lang="en-US"/>
           </a:p>
@@ -513,10 +509,9 @@
           <a:lstStyle/>
           <a:p>
             <a:r>
-              <a:rPr lang="en-US" smtClean="0"/>
+              <a:rPr lang="en-US"/>
               <a:t>Click to edit Master title style</a:t>
             </a:r>
-            <a:endParaRPr lang="en-US"/>
           </a:p>
         </p:txBody>
       </p:sp>
@@ -542,38 +537,37 @@
           <a:p>
             <a:pPr lvl="0"/>
             <a:r>
-              <a:rPr lang="en-US" smtClean="0"/>
+              <a:rPr lang="en-US"/>
               <a:t>Click to edit Master text styles</a:t>
             </a:r>
           </a:p>
           <a:p>
             <a:pPr lvl="1"/>
             <a:r>
-              <a:rPr lang="en-US" smtClean="0"/>
+              <a:rPr lang="en-US"/>
               <a:t>Second level</a:t>
             </a:r>
           </a:p>
           <a:p>
             <a:pPr lvl="2"/>
             <a:r>
-              <a:rPr lang="en-US" smtClean="0"/>
+              <a:rPr lang="en-US"/>
               <a:t>Third level</a:t>
             </a:r>
           </a:p>
           <a:p>
             <a:pPr lvl="3"/>
             <a:r>
-              <a:rPr lang="en-US" smtClean="0"/>
+              <a:rPr lang="en-US"/>
               <a:t>Fourth level</a:t>
             </a:r>
           </a:p>
           <a:p>
             <a:pPr lvl="4"/>
             <a:r>
-              <a:rPr lang="en-US" smtClean="0"/>
+              <a:rPr lang="en-US"/>
               <a:t>Fifth level</a:t>
             </a:r>
-            <a:endParaRPr lang="en-US"/>
           </a:p>
         </p:txBody>
       </p:sp>
@@ -594,7 +588,7 @@
           <a:p>
             <a:fld id="{28BE630F-C39C-4DB9-8258-0B48CA067079}" type="datetimeFigureOut">
               <a:rPr lang="en-US" smtClean="0"/>
-              <a:t>11/25/2021</a:t>
+              <a:t>11/26/2021</a:t>
             </a:fld>
             <a:endParaRPr lang="en-US"/>
           </a:p>
@@ -688,10 +682,9 @@
           <a:lstStyle/>
           <a:p>
             <a:r>
-              <a:rPr lang="en-US" smtClean="0"/>
+              <a:rPr lang="en-US"/>
               <a:t>Click to edit Master title style</a:t>
             </a:r>
-            <a:endParaRPr lang="en-US"/>
           </a:p>
         </p:txBody>
       </p:sp>
@@ -712,38 +705,37 @@
           <a:p>
             <a:pPr lvl="0"/>
             <a:r>
-              <a:rPr lang="en-US" smtClean="0"/>
+              <a:rPr lang="en-US"/>
               <a:t>Click to edit Master text styles</a:t>
             </a:r>
           </a:p>
           <a:p>
             <a:pPr lvl="1"/>
             <a:r>
-              <a:rPr lang="en-US" smtClean="0"/>
+              <a:rPr lang="en-US"/>
               <a:t>Second level</a:t>
             </a:r>
           </a:p>
           <a:p>
             <a:pPr lvl="2"/>
             <a:r>
-              <a:rPr lang="en-US" smtClean="0"/>
+              <a:rPr lang="en-US"/>
               <a:t>Third level</a:t>
             </a:r>
           </a:p>
           <a:p>
             <a:pPr lvl="3"/>
             <a:r>
-              <a:rPr lang="en-US" smtClean="0"/>
+              <a:rPr lang="en-US"/>
               <a:t>Fourth level</a:t>
             </a:r>
           </a:p>
           <a:p>
             <a:pPr lvl="4"/>
             <a:r>
-              <a:rPr lang="en-US" smtClean="0"/>
+              <a:rPr lang="en-US"/>
               <a:t>Fifth level</a:t>
             </a:r>
-            <a:endParaRPr lang="en-US"/>
           </a:p>
         </p:txBody>
       </p:sp>
@@ -764,7 +756,7 @@
           <a:p>
             <a:fld id="{28BE630F-C39C-4DB9-8258-0B48CA067079}" type="datetimeFigureOut">
               <a:rPr lang="en-US" smtClean="0"/>
-              <a:t>11/25/2021</a:t>
+              <a:t>11/26/2021</a:t>
             </a:fld>
             <a:endParaRPr lang="en-US"/>
           </a:p>
@@ -867,10 +859,9 @@
           </a:lstStyle>
           <a:p>
             <a:r>
-              <a:rPr lang="en-US" smtClean="0"/>
+              <a:rPr lang="en-US"/>
               <a:t>Click to edit Master title style</a:t>
             </a:r>
-            <a:endParaRPr lang="en-US"/>
           </a:p>
         </p:txBody>
       </p:sp>
@@ -987,7 +978,7 @@
           <a:p>
             <a:pPr lvl="0"/>
             <a:r>
-              <a:rPr lang="en-US" smtClean="0"/>
+              <a:rPr lang="en-US"/>
               <a:t>Click to edit Master text styles</a:t>
             </a:r>
           </a:p>
@@ -1010,7 +1001,7 @@
           <a:p>
             <a:fld id="{28BE630F-C39C-4DB9-8258-0B48CA067079}" type="datetimeFigureOut">
               <a:rPr lang="en-US" smtClean="0"/>
-              <a:t>11/25/2021</a:t>
+              <a:t>11/26/2021</a:t>
             </a:fld>
             <a:endParaRPr lang="en-US"/>
           </a:p>
@@ -1104,10 +1095,9 @@
           <a:lstStyle/>
           <a:p>
             <a:r>
-              <a:rPr lang="en-US" smtClean="0"/>
+              <a:rPr lang="en-US"/>
               <a:t>Click to edit Master title style</a:t>
             </a:r>
-            <a:endParaRPr lang="en-US"/>
           </a:p>
         </p:txBody>
       </p:sp>
@@ -1133,38 +1123,37 @@
           <a:p>
             <a:pPr lvl="0"/>
             <a:r>
-              <a:rPr lang="en-US" smtClean="0"/>
+              <a:rPr lang="en-US"/>
               <a:t>Click to edit Master text styles</a:t>
             </a:r>
           </a:p>
           <a:p>
             <a:pPr lvl="1"/>
             <a:r>
-              <a:rPr lang="en-US" smtClean="0"/>
+              <a:rPr lang="en-US"/>
               <a:t>Second level</a:t>
             </a:r>
           </a:p>
           <a:p>
             <a:pPr lvl="2"/>
             <a:r>
-              <a:rPr lang="en-US" smtClean="0"/>
+              <a:rPr lang="en-US"/>
               <a:t>Third level</a:t>
             </a:r>
           </a:p>
           <a:p>
             <a:pPr lvl="3"/>
             <a:r>
-              <a:rPr lang="en-US" smtClean="0"/>
+              <a:rPr lang="en-US"/>
               <a:t>Fourth level</a:t>
             </a:r>
           </a:p>
           <a:p>
             <a:pPr lvl="4"/>
             <a:r>
-              <a:rPr lang="en-US" smtClean="0"/>
+              <a:rPr lang="en-US"/>
               <a:t>Fifth level</a:t>
             </a:r>
-            <a:endParaRPr lang="en-US"/>
           </a:p>
         </p:txBody>
       </p:sp>
@@ -1190,38 +1179,37 @@
           <a:p>
             <a:pPr lvl="0"/>
             <a:r>
-              <a:rPr lang="en-US" smtClean="0"/>
+              <a:rPr lang="en-US"/>
               <a:t>Click to edit Master text styles</a:t>
             </a:r>
           </a:p>
           <a:p>
             <a:pPr lvl="1"/>
             <a:r>
-              <a:rPr lang="en-US" smtClean="0"/>
+              <a:rPr lang="en-US"/>
               <a:t>Second level</a:t>
             </a:r>
           </a:p>
           <a:p>
             <a:pPr lvl="2"/>
             <a:r>
-              <a:rPr lang="en-US" smtClean="0"/>
+              <a:rPr lang="en-US"/>
               <a:t>Third level</a:t>
             </a:r>
           </a:p>
           <a:p>
             <a:pPr lvl="3"/>
             <a:r>
-              <a:rPr lang="en-US" smtClean="0"/>
+              <a:rPr lang="en-US"/>
               <a:t>Fourth level</a:t>
             </a:r>
           </a:p>
           <a:p>
             <a:pPr lvl="4"/>
             <a:r>
-              <a:rPr lang="en-US" smtClean="0"/>
+              <a:rPr lang="en-US"/>
               <a:t>Fifth level</a:t>
             </a:r>
-            <a:endParaRPr lang="en-US"/>
           </a:p>
         </p:txBody>
       </p:sp>
@@ -1242,7 +1230,7 @@
           <a:p>
             <a:fld id="{28BE630F-C39C-4DB9-8258-0B48CA067079}" type="datetimeFigureOut">
               <a:rPr lang="en-US" smtClean="0"/>
-              <a:t>11/25/2021</a:t>
+              <a:t>11/26/2021</a:t>
             </a:fld>
             <a:endParaRPr lang="en-US"/>
           </a:p>
@@ -1341,10 +1329,9 @@
           <a:lstStyle/>
           <a:p>
             <a:r>
-              <a:rPr lang="en-US" smtClean="0"/>
+              <a:rPr lang="en-US"/>
               <a:t>Click to edit Master title style</a:t>
             </a:r>
-            <a:endParaRPr lang="en-US"/>
           </a:p>
         </p:txBody>
       </p:sp>
@@ -1407,7 +1394,7 @@
           <a:p>
             <a:pPr lvl="0"/>
             <a:r>
-              <a:rPr lang="en-US" smtClean="0"/>
+              <a:rPr lang="en-US"/>
               <a:t>Click to edit Master text styles</a:t>
             </a:r>
           </a:p>
@@ -1435,38 +1422,37 @@
           <a:p>
             <a:pPr lvl="0"/>
             <a:r>
-              <a:rPr lang="en-US" smtClean="0"/>
+              <a:rPr lang="en-US"/>
               <a:t>Click to edit Master text styles</a:t>
             </a:r>
           </a:p>
           <a:p>
             <a:pPr lvl="1"/>
             <a:r>
-              <a:rPr lang="en-US" smtClean="0"/>
+              <a:rPr lang="en-US"/>
               <a:t>Second level</a:t>
             </a:r>
           </a:p>
           <a:p>
             <a:pPr lvl="2"/>
             <a:r>
-              <a:rPr lang="en-US" smtClean="0"/>
+              <a:rPr lang="en-US"/>
               <a:t>Third level</a:t>
             </a:r>
           </a:p>
           <a:p>
             <a:pPr lvl="3"/>
             <a:r>
-              <a:rPr lang="en-US" smtClean="0"/>
+              <a:rPr lang="en-US"/>
               <a:t>Fourth level</a:t>
             </a:r>
           </a:p>
           <a:p>
             <a:pPr lvl="4"/>
             <a:r>
-              <a:rPr lang="en-US" smtClean="0"/>
+              <a:rPr lang="en-US"/>
               <a:t>Fifth level</a:t>
             </a:r>
-            <a:endParaRPr lang="en-US"/>
           </a:p>
         </p:txBody>
       </p:sp>
@@ -1529,7 +1515,7 @@
           <a:p>
             <a:pPr lvl="0"/>
             <a:r>
-              <a:rPr lang="en-US" smtClean="0"/>
+              <a:rPr lang="en-US"/>
               <a:t>Click to edit Master text styles</a:t>
             </a:r>
           </a:p>
@@ -1557,38 +1543,37 @@
           <a:p>
             <a:pPr lvl="0"/>
             <a:r>
-              <a:rPr lang="en-US" smtClean="0"/>
+              <a:rPr lang="en-US"/>
               <a:t>Click to edit Master text styles</a:t>
             </a:r>
           </a:p>
           <a:p>
             <a:pPr lvl="1"/>
             <a:r>
-              <a:rPr lang="en-US" smtClean="0"/>
+              <a:rPr lang="en-US"/>
               <a:t>Second level</a:t>
             </a:r>
           </a:p>
           <a:p>
             <a:pPr lvl="2"/>
             <a:r>
-              <a:rPr lang="en-US" smtClean="0"/>
+              <a:rPr lang="en-US"/>
               <a:t>Third level</a:t>
             </a:r>
           </a:p>
           <a:p>
             <a:pPr lvl="3"/>
             <a:r>
-              <a:rPr lang="en-US" smtClean="0"/>
+              <a:rPr lang="en-US"/>
               <a:t>Fourth level</a:t>
             </a:r>
           </a:p>
           <a:p>
             <a:pPr lvl="4"/>
             <a:r>
-              <a:rPr lang="en-US" smtClean="0"/>
+              <a:rPr lang="en-US"/>
               <a:t>Fifth level</a:t>
             </a:r>
-            <a:endParaRPr lang="en-US"/>
           </a:p>
         </p:txBody>
       </p:sp>
@@ -1609,7 +1594,7 @@
           <a:p>
             <a:fld id="{28BE630F-C39C-4DB9-8258-0B48CA067079}" type="datetimeFigureOut">
               <a:rPr lang="en-US" smtClean="0"/>
-              <a:t>11/25/2021</a:t>
+              <a:t>11/26/2021</a:t>
             </a:fld>
             <a:endParaRPr lang="en-US"/>
           </a:p>
@@ -1703,10 +1688,9 @@
           <a:lstStyle/>
           <a:p>
             <a:r>
-              <a:rPr lang="en-US" smtClean="0"/>
+              <a:rPr lang="en-US"/>
               <a:t>Click to edit Master title style</a:t>
             </a:r>
-            <a:endParaRPr lang="en-US"/>
           </a:p>
         </p:txBody>
       </p:sp>
@@ -1727,7 +1711,7 @@
           <a:p>
             <a:fld id="{28BE630F-C39C-4DB9-8258-0B48CA067079}" type="datetimeFigureOut">
               <a:rPr lang="en-US" smtClean="0"/>
-              <a:t>11/25/2021</a:t>
+              <a:t>11/26/2021</a:t>
             </a:fld>
             <a:endParaRPr lang="en-US"/>
           </a:p>
@@ -1822,7 +1806,7 @@
           <a:p>
             <a:fld id="{28BE630F-C39C-4DB9-8258-0B48CA067079}" type="datetimeFigureOut">
               <a:rPr lang="en-US" smtClean="0"/>
-              <a:t>11/25/2021</a:t>
+              <a:t>11/26/2021</a:t>
             </a:fld>
             <a:endParaRPr lang="en-US"/>
           </a:p>
@@ -1925,10 +1909,9 @@
           </a:lstStyle>
           <a:p>
             <a:r>
-              <a:rPr lang="en-US" smtClean="0"/>
+              <a:rPr lang="en-US"/>
               <a:t>Click to edit Master title style</a:t>
             </a:r>
-            <a:endParaRPr lang="en-US"/>
           </a:p>
         </p:txBody>
       </p:sp>
@@ -1982,38 +1965,37 @@
           <a:p>
             <a:pPr lvl="0"/>
             <a:r>
-              <a:rPr lang="en-US" smtClean="0"/>
+              <a:rPr lang="en-US"/>
               <a:t>Click to edit Master text styles</a:t>
             </a:r>
           </a:p>
           <a:p>
             <a:pPr lvl="1"/>
             <a:r>
-              <a:rPr lang="en-US" smtClean="0"/>
+              <a:rPr lang="en-US"/>
               <a:t>Second level</a:t>
             </a:r>
           </a:p>
           <a:p>
             <a:pPr lvl="2"/>
             <a:r>
-              <a:rPr lang="en-US" smtClean="0"/>
+              <a:rPr lang="en-US"/>
               <a:t>Third level</a:t>
             </a:r>
           </a:p>
           <a:p>
             <a:pPr lvl="3"/>
             <a:r>
-              <a:rPr lang="en-US" smtClean="0"/>
+              <a:rPr lang="en-US"/>
               <a:t>Fourth level</a:t>
             </a:r>
           </a:p>
           <a:p>
             <a:pPr lvl="4"/>
             <a:r>
-              <a:rPr lang="en-US" smtClean="0"/>
+              <a:rPr lang="en-US"/>
               <a:t>Fifth level</a:t>
             </a:r>
-            <a:endParaRPr lang="en-US"/>
           </a:p>
         </p:txBody>
       </p:sp>
@@ -2076,7 +2058,7 @@
           <a:p>
             <a:pPr lvl="0"/>
             <a:r>
-              <a:rPr lang="en-US" smtClean="0"/>
+              <a:rPr lang="en-US"/>
               <a:t>Click to edit Master text styles</a:t>
             </a:r>
           </a:p>
@@ -2099,7 +2081,7 @@
           <a:p>
             <a:fld id="{28BE630F-C39C-4DB9-8258-0B48CA067079}" type="datetimeFigureOut">
               <a:rPr lang="en-US" smtClean="0"/>
-              <a:t>11/25/2021</a:t>
+              <a:t>11/26/2021</a:t>
             </a:fld>
             <a:endParaRPr lang="en-US"/>
           </a:p>
@@ -2202,10 +2184,9 @@
           </a:lstStyle>
           <a:p>
             <a:r>
-              <a:rPr lang="en-US" smtClean="0"/>
+              <a:rPr lang="en-US"/>
               <a:t>Click to edit Master title style</a:t>
             </a:r>
-            <a:endParaRPr lang="en-US"/>
           </a:p>
         </p:txBody>
       </p:sp>
@@ -2329,7 +2310,7 @@
           <a:p>
             <a:pPr lvl="0"/>
             <a:r>
-              <a:rPr lang="en-US" smtClean="0"/>
+              <a:rPr lang="en-US"/>
               <a:t>Click to edit Master text styles</a:t>
             </a:r>
           </a:p>
@@ -2352,7 +2333,7 @@
           <a:p>
             <a:fld id="{28BE630F-C39C-4DB9-8258-0B48CA067079}" type="datetimeFigureOut">
               <a:rPr lang="en-US" smtClean="0"/>
-              <a:t>11/25/2021</a:t>
+              <a:t>11/26/2021</a:t>
             </a:fld>
             <a:endParaRPr lang="en-US"/>
           </a:p>
@@ -2461,10 +2442,9 @@
           <a:lstStyle/>
           <a:p>
             <a:r>
-              <a:rPr lang="en-US" smtClean="0"/>
+              <a:rPr lang="en-US"/>
               <a:t>Click to edit Master title style</a:t>
             </a:r>
-            <a:endParaRPr lang="en-US"/>
           </a:p>
         </p:txBody>
       </p:sp>
@@ -2495,38 +2475,37 @@
           <a:p>
             <a:pPr lvl="0"/>
             <a:r>
-              <a:rPr lang="en-US" smtClean="0"/>
+              <a:rPr lang="en-US"/>
               <a:t>Click to edit Master text styles</a:t>
             </a:r>
           </a:p>
           <a:p>
             <a:pPr lvl="1"/>
             <a:r>
-              <a:rPr lang="en-US" smtClean="0"/>
+              <a:rPr lang="en-US"/>
               <a:t>Second level</a:t>
             </a:r>
           </a:p>
           <a:p>
             <a:pPr lvl="2"/>
             <a:r>
-              <a:rPr lang="en-US" smtClean="0"/>
+              <a:rPr lang="en-US"/>
               <a:t>Third level</a:t>
             </a:r>
           </a:p>
           <a:p>
             <a:pPr lvl="3"/>
             <a:r>
-              <a:rPr lang="en-US" smtClean="0"/>
+              <a:rPr lang="en-US"/>
               <a:t>Fourth level</a:t>
             </a:r>
           </a:p>
           <a:p>
             <a:pPr lvl="4"/>
             <a:r>
-              <a:rPr lang="en-US" smtClean="0"/>
+              <a:rPr lang="en-US"/>
               <a:t>Fifth level</a:t>
             </a:r>
-            <a:endParaRPr lang="en-US"/>
           </a:p>
         </p:txBody>
       </p:sp>
@@ -2565,7 +2544,7 @@
           <a:p>
             <a:fld id="{28BE630F-C39C-4DB9-8258-0B48CA067079}" type="datetimeFigureOut">
               <a:rPr lang="en-US" smtClean="0"/>
-              <a:t>11/25/2021</a:t>
+              <a:t>11/26/2021</a:t>
             </a:fld>
             <a:endParaRPr lang="en-US"/>
           </a:p>
@@ -3004,12 +2983,8 @@
           </a:lstStyle>
           <a:p>
             <a:r>
-              <a:rPr lang="en-US" dirty="0" smtClean="0"/>
-              <a:t>ER DIAGRAMM </a:t>
-            </a:r>
-            <a:r>
               <a:rPr lang="en-US" dirty="0"/>
-              <a:t>TEMPLATE</a:t>
+              <a:t>ER DIAGRAMM TEMPLATE</a:t>
             </a:r>
           </a:p>
         </p:txBody>
@@ -3237,8 +3212,8 @@
         </p:nvSpPr>
         <p:spPr>
           <a:xfrm>
-            <a:off x="635970" y="224804"/>
-            <a:ext cx="1803043" cy="2428643"/>
+            <a:off x="5411335" y="68451"/>
+            <a:ext cx="1803043" cy="1822907"/>
           </a:xfrm>
           <a:prstGeom prst="rect">
             <a:avLst/>
@@ -3275,8 +3250,8 @@
         </p:nvSpPr>
         <p:spPr>
           <a:xfrm>
-            <a:off x="1117343" y="314958"/>
-            <a:ext cx="633507" cy="369332"/>
+            <a:off x="5892708" y="158605"/>
+            <a:ext cx="712439" cy="369332"/>
           </a:xfrm>
           <a:prstGeom prst="rect">
             <a:avLst/>
@@ -3290,10 +3265,9 @@
           <a:lstStyle/>
           <a:p>
             <a:r>
-              <a:rPr lang="en-US" b="1" dirty="0" smtClean="0"/>
-              <a:t>class</a:t>
-            </a:r>
-            <a:endParaRPr lang="en-US" b="1" dirty="0"/>
+              <a:rPr lang="en-US" b="1" dirty="0"/>
+              <a:t>Users</a:t>
+            </a:r>
           </a:p>
         </p:txBody>
       </p:sp>
@@ -3305,8 +3279,8 @@
         </p:nvSpPr>
         <p:spPr>
           <a:xfrm>
-            <a:off x="3301896" y="224804"/>
-            <a:ext cx="1803043" cy="2428643"/>
+            <a:off x="5347804" y="3980635"/>
+            <a:ext cx="1921712" cy="2428643"/>
           </a:xfrm>
           <a:prstGeom prst="rect">
             <a:avLst/>
@@ -3343,8 +3317,8 @@
         </p:nvSpPr>
         <p:spPr>
           <a:xfrm>
-            <a:off x="3783269" y="314958"/>
-            <a:ext cx="917367" cy="369332"/>
+            <a:off x="5829177" y="4070789"/>
+            <a:ext cx="806054" cy="369332"/>
           </a:xfrm>
           <a:prstGeom prst="rect">
             <a:avLst/>
@@ -3358,23 +3332,22 @@
           <a:lstStyle/>
           <a:p>
             <a:r>
-              <a:rPr lang="en-US" b="1" dirty="0" smtClean="0"/>
-              <a:t>student</a:t>
-            </a:r>
-            <a:endParaRPr lang="en-US" b="1" dirty="0"/>
-          </a:p>
-        </p:txBody>
-      </p:sp>
-      <p:sp>
-        <p:nvSpPr>
-          <p:cNvPr id="55" name="Rectangle 54"/>
+              <a:rPr lang="en-US" b="1" dirty="0"/>
+              <a:t>Events</a:t>
+            </a:r>
+          </a:p>
+        </p:txBody>
+      </p:sp>
+      <p:sp>
+        <p:nvSpPr>
+          <p:cNvPr id="61" name="Rectangle 60"/>
           <p:cNvSpPr/>
           <p:nvPr/>
         </p:nvSpPr>
         <p:spPr>
           <a:xfrm>
-            <a:off x="5967822" y="224804"/>
-            <a:ext cx="1803043" cy="2428643"/>
+            <a:off x="630766" y="1234051"/>
+            <a:ext cx="2127669" cy="2505017"/>
           </a:xfrm>
           <a:prstGeom prst="rect">
             <a:avLst/>
@@ -3405,14 +3378,14 @@
       </p:sp>
       <p:sp>
         <p:nvSpPr>
-          <p:cNvPr id="56" name="TextBox 55"/>
+          <p:cNvPr id="62" name="TextBox 61"/>
           <p:cNvSpPr txBox="1"/>
           <p:nvPr/>
         </p:nvSpPr>
         <p:spPr>
           <a:xfrm>
-            <a:off x="6209194" y="314959"/>
-            <a:ext cx="1320298" cy="369332"/>
+            <a:off x="1174014" y="1337084"/>
+            <a:ext cx="1332096" cy="369332"/>
           </a:xfrm>
           <a:prstGeom prst="rect">
             <a:avLst/>
@@ -3426,384 +3399,31 @@
           <a:lstStyle/>
           <a:p>
             <a:r>
-              <a:rPr lang="en-US" b="1" dirty="0" smtClean="0"/>
-              <a:t>exam_score</a:t>
-            </a:r>
-            <a:endParaRPr lang="en-US" b="1" dirty="0"/>
-          </a:p>
-        </p:txBody>
-      </p:sp>
-      <p:sp>
-        <p:nvSpPr>
-          <p:cNvPr id="57" name="Rectangle 56"/>
-          <p:cNvSpPr/>
-          <p:nvPr/>
-        </p:nvSpPr>
-        <p:spPr>
-          <a:xfrm>
-            <a:off x="9251935" y="224803"/>
-            <a:ext cx="1803043" cy="2428643"/>
-          </a:xfrm>
-          <a:prstGeom prst="rect">
-            <a:avLst/>
-          </a:prstGeom>
-        </p:spPr>
-        <p:style>
-          <a:lnRef idx="2">
-            <a:schemeClr val="dk1"/>
-          </a:lnRef>
-          <a:fillRef idx="1">
-            <a:schemeClr val="lt1"/>
-          </a:fillRef>
-          <a:effectRef idx="0">
-            <a:schemeClr val="dk1"/>
-          </a:effectRef>
-          <a:fontRef idx="minor">
-            <a:schemeClr val="dk1"/>
-          </a:fontRef>
-        </p:style>
-        <p:txBody>
-          <a:bodyPr rtlCol="0" anchor="ctr"/>
-          <a:lstStyle/>
-          <a:p>
-            <a:pPr algn="ctr"/>
-            <a:endParaRPr lang="en-US"/>
-          </a:p>
-        </p:txBody>
-      </p:sp>
-      <p:sp>
-        <p:nvSpPr>
-          <p:cNvPr id="58" name="TextBox 57"/>
-          <p:cNvSpPr txBox="1"/>
-          <p:nvPr/>
-        </p:nvSpPr>
-        <p:spPr>
-          <a:xfrm>
-            <a:off x="9493307" y="314958"/>
-            <a:ext cx="1243482" cy="369332"/>
-          </a:xfrm>
-          <a:prstGeom prst="rect">
-            <a:avLst/>
-          </a:prstGeom>
-          <a:noFill/>
-        </p:spPr>
-        <p:txBody>
-          <a:bodyPr wrap="none" rtlCol="0">
-            <a:spAutoFit/>
-          </a:bodyPr>
-          <a:lstStyle/>
-          <a:p>
-            <a:r>
-              <a:rPr lang="en-US" b="1" dirty="0" smtClean="0"/>
-              <a:t>exam_type</a:t>
-            </a:r>
-            <a:endParaRPr lang="en-US" b="1" dirty="0"/>
-          </a:p>
-        </p:txBody>
-      </p:sp>
-      <p:sp>
-        <p:nvSpPr>
-          <p:cNvPr id="59" name="Rectangle 58"/>
-          <p:cNvSpPr/>
-          <p:nvPr/>
-        </p:nvSpPr>
-        <p:spPr>
-          <a:xfrm>
-            <a:off x="5980354" y="4186801"/>
-            <a:ext cx="1803043" cy="2009105"/>
-          </a:xfrm>
-          <a:prstGeom prst="rect">
-            <a:avLst/>
-          </a:prstGeom>
-        </p:spPr>
-        <p:style>
-          <a:lnRef idx="2">
-            <a:schemeClr val="dk1"/>
-          </a:lnRef>
-          <a:fillRef idx="1">
-            <a:schemeClr val="lt1"/>
-          </a:fillRef>
-          <a:effectRef idx="0">
-            <a:schemeClr val="dk1"/>
-          </a:effectRef>
-          <a:fontRef idx="minor">
-            <a:schemeClr val="dk1"/>
-          </a:fontRef>
-        </p:style>
-        <p:txBody>
-          <a:bodyPr rtlCol="0" anchor="ctr"/>
-          <a:lstStyle/>
-          <a:p>
-            <a:pPr algn="ctr"/>
-            <a:endParaRPr lang="en-US"/>
-          </a:p>
-        </p:txBody>
-      </p:sp>
-      <p:sp>
-        <p:nvSpPr>
-          <p:cNvPr id="60" name="TextBox 59"/>
-          <p:cNvSpPr txBox="1"/>
-          <p:nvPr/>
-        </p:nvSpPr>
-        <p:spPr>
-          <a:xfrm>
-            <a:off x="6506612" y="4223154"/>
-            <a:ext cx="661720" cy="369332"/>
-          </a:xfrm>
-          <a:prstGeom prst="rect">
-            <a:avLst/>
-          </a:prstGeom>
-          <a:noFill/>
-        </p:spPr>
-        <p:txBody>
-          <a:bodyPr wrap="none" rtlCol="0">
-            <a:spAutoFit/>
-          </a:bodyPr>
-          <a:lstStyle/>
-          <a:p>
-            <a:r>
-              <a:rPr lang="en-US" b="1" dirty="0" smtClean="0"/>
-              <a:t>topic</a:t>
-            </a:r>
-            <a:endParaRPr lang="en-US" b="1" dirty="0"/>
-          </a:p>
-        </p:txBody>
-      </p:sp>
-      <p:sp>
-        <p:nvSpPr>
-          <p:cNvPr id="61" name="Rectangle 60"/>
-          <p:cNvSpPr/>
-          <p:nvPr/>
-        </p:nvSpPr>
-        <p:spPr>
-          <a:xfrm>
-            <a:off x="630766" y="4186801"/>
-            <a:ext cx="1803043" cy="2009105"/>
-          </a:xfrm>
-          <a:prstGeom prst="rect">
-            <a:avLst/>
-          </a:prstGeom>
-        </p:spPr>
-        <p:style>
-          <a:lnRef idx="2">
-            <a:schemeClr val="dk1"/>
-          </a:lnRef>
-          <a:fillRef idx="1">
-            <a:schemeClr val="lt1"/>
-          </a:fillRef>
-          <a:effectRef idx="0">
-            <a:schemeClr val="dk1"/>
-          </a:effectRef>
-          <a:fontRef idx="minor">
-            <a:schemeClr val="dk1"/>
-          </a:fontRef>
-        </p:style>
-        <p:txBody>
-          <a:bodyPr rtlCol="0" anchor="ctr"/>
-          <a:lstStyle/>
-          <a:p>
-            <a:pPr algn="ctr"/>
-            <a:endParaRPr lang="en-US"/>
-          </a:p>
-        </p:txBody>
-      </p:sp>
-      <p:sp>
-        <p:nvSpPr>
-          <p:cNvPr id="62" name="TextBox 61"/>
-          <p:cNvSpPr txBox="1"/>
-          <p:nvPr/>
-        </p:nvSpPr>
-        <p:spPr>
-          <a:xfrm>
-            <a:off x="1174014" y="4289834"/>
-            <a:ext cx="716543" cy="369332"/>
-          </a:xfrm>
-          <a:prstGeom prst="rect">
-            <a:avLst/>
-          </a:prstGeom>
-          <a:noFill/>
-        </p:spPr>
-        <p:txBody>
-          <a:bodyPr wrap="none" rtlCol="0">
-            <a:spAutoFit/>
-          </a:bodyPr>
-          <a:lstStyle/>
-          <a:p>
-            <a:r>
-              <a:rPr lang="en-US" b="1" dirty="0" smtClean="0"/>
-              <a:t>batch</a:t>
-            </a:r>
-            <a:endParaRPr lang="en-US" b="1" dirty="0"/>
-          </a:p>
-        </p:txBody>
-      </p:sp>
-      <p:cxnSp>
-        <p:nvCxnSpPr>
-          <p:cNvPr id="63" name="Straight Connector 62"/>
-          <p:cNvCxnSpPr>
-            <a:stCxn id="55" idx="3"/>
-            <a:endCxn id="57" idx="1"/>
-          </p:cNvCxnSpPr>
-          <p:nvPr/>
-        </p:nvCxnSpPr>
-        <p:spPr>
-          <a:xfrm flipV="1">
-            <a:off x="7770865" y="1439125"/>
-            <a:ext cx="1481070" cy="1"/>
-          </a:xfrm>
-          <a:prstGeom prst="line">
-            <a:avLst/>
-          </a:prstGeom>
-          <a:ln>
-            <a:solidFill>
-              <a:schemeClr val="tx1"/>
-            </a:solidFill>
-          </a:ln>
-        </p:spPr>
-        <p:style>
-          <a:lnRef idx="1">
-            <a:schemeClr val="accent1"/>
-          </a:lnRef>
-          <a:fillRef idx="0">
-            <a:schemeClr val="accent1"/>
-          </a:fillRef>
-          <a:effectRef idx="0">
-            <a:schemeClr val="accent1"/>
-          </a:effectRef>
-          <a:fontRef idx="minor">
-            <a:schemeClr val="tx1"/>
-          </a:fontRef>
-        </p:style>
-      </p:cxnSp>
-      <p:cxnSp>
-        <p:nvCxnSpPr>
-          <p:cNvPr id="64" name="Straight Connector 63"/>
-          <p:cNvCxnSpPr>
-            <a:stCxn id="53" idx="3"/>
-            <a:endCxn id="55" idx="1"/>
-          </p:cNvCxnSpPr>
-          <p:nvPr/>
-        </p:nvCxnSpPr>
-        <p:spPr>
-          <a:xfrm>
-            <a:off x="5104939" y="1439126"/>
-            <a:ext cx="862883" cy="0"/>
-          </a:xfrm>
-          <a:prstGeom prst="line">
-            <a:avLst/>
-          </a:prstGeom>
-          <a:ln>
-            <a:solidFill>
-              <a:schemeClr val="tx1"/>
-            </a:solidFill>
-          </a:ln>
-        </p:spPr>
-        <p:style>
-          <a:lnRef idx="1">
-            <a:schemeClr val="accent1"/>
-          </a:lnRef>
-          <a:fillRef idx="0">
-            <a:schemeClr val="accent1"/>
-          </a:fillRef>
-          <a:effectRef idx="0">
-            <a:schemeClr val="accent1"/>
-          </a:effectRef>
-          <a:fontRef idx="minor">
-            <a:schemeClr val="tx1"/>
-          </a:fontRef>
-        </p:style>
-      </p:cxnSp>
-      <p:cxnSp>
-        <p:nvCxnSpPr>
-          <p:cNvPr id="65" name="Straight Connector 64"/>
-          <p:cNvCxnSpPr/>
-          <p:nvPr/>
-        </p:nvCxnSpPr>
-        <p:spPr>
-          <a:xfrm>
-            <a:off x="2421277" y="1229355"/>
-            <a:ext cx="862883" cy="0"/>
-          </a:xfrm>
-          <a:prstGeom prst="line">
-            <a:avLst/>
-          </a:prstGeom>
-          <a:ln>
-            <a:solidFill>
-              <a:schemeClr val="tx1"/>
-            </a:solidFill>
-          </a:ln>
-        </p:spPr>
-        <p:style>
-          <a:lnRef idx="1">
-            <a:schemeClr val="accent1"/>
-          </a:lnRef>
-          <a:fillRef idx="0">
-            <a:schemeClr val="accent1"/>
-          </a:fillRef>
-          <a:effectRef idx="0">
-            <a:schemeClr val="accent1"/>
-          </a:effectRef>
-          <a:fontRef idx="minor">
-            <a:schemeClr val="tx1"/>
-          </a:fontRef>
-        </p:style>
-      </p:cxnSp>
+              <a:rPr lang="en-US" b="1" dirty="0"/>
+              <a:t>Registration</a:t>
+            </a:r>
+          </a:p>
+        </p:txBody>
+      </p:sp>
       <p:cxnSp>
         <p:nvCxnSpPr>
           <p:cNvPr id="66" name="Straight Connector 65"/>
           <p:cNvCxnSpPr>
+            <a:cxnSpLocks/>
+            <a:stCxn id="51" idx="1"/>
             <a:endCxn id="61" idx="0"/>
           </p:cNvCxnSpPr>
           <p:nvPr/>
         </p:nvCxnSpPr>
         <p:spPr>
-          <a:xfrm>
-            <a:off x="1532288" y="2656354"/>
-            <a:ext cx="0" cy="1530447"/>
+          <a:xfrm flipH="1">
+            <a:off x="1694601" y="979905"/>
+            <a:ext cx="3716734" cy="254146"/>
           </a:xfrm>
           <a:prstGeom prst="line">
             <a:avLst/>
           </a:prstGeom>
-          <a:ln>
-            <a:solidFill>
-              <a:schemeClr val="tx1"/>
-            </a:solidFill>
-          </a:ln>
-        </p:spPr>
-        <p:style>
-          <a:lnRef idx="1">
-            <a:schemeClr val="accent1"/>
-          </a:lnRef>
-          <a:fillRef idx="0">
-            <a:schemeClr val="accent1"/>
-          </a:fillRef>
-          <a:effectRef idx="0">
-            <a:schemeClr val="accent1"/>
-          </a:effectRef>
-          <a:fontRef idx="minor">
-            <a:schemeClr val="tx1"/>
-          </a:fontRef>
-        </p:style>
-      </p:cxnSp>
-      <p:cxnSp>
-        <p:nvCxnSpPr>
-          <p:cNvPr id="67" name="Straight Connector 66"/>
-          <p:cNvCxnSpPr/>
-          <p:nvPr/>
-        </p:nvCxnSpPr>
-        <p:spPr>
-          <a:xfrm>
-            <a:off x="6884740" y="2674531"/>
-            <a:ext cx="42822" cy="1491186"/>
-          </a:xfrm>
-          <a:prstGeom prst="line">
-            <a:avLst/>
-          </a:prstGeom>
-          <a:ln>
-            <a:solidFill>
-              <a:schemeClr val="tx1"/>
-            </a:solidFill>
-          </a:ln>
+          <a:ln/>
         </p:spPr>
         <p:style>
           <a:lnRef idx="1">
@@ -3828,7 +3448,7 @@
         </p:nvCxnSpPr>
         <p:spPr>
           <a:xfrm>
-            <a:off x="656870" y="705893"/>
+            <a:off x="5432235" y="549540"/>
             <a:ext cx="1764407" cy="0"/>
           </a:xfrm>
           <a:prstGeom prst="line">
@@ -3858,83 +3478,15 @@
       <p:cxnSp>
         <p:nvCxnSpPr>
           <p:cNvPr id="69" name="Straight Connector 68"/>
-          <p:cNvCxnSpPr/>
+          <p:cNvCxnSpPr>
+            <a:cxnSpLocks/>
+          </p:cNvCxnSpPr>
           <p:nvPr/>
         </p:nvCxnSpPr>
         <p:spPr>
           <a:xfrm>
-            <a:off x="3340532" y="684290"/>
-            <a:ext cx="1764407" cy="0"/>
-          </a:xfrm>
-          <a:prstGeom prst="line">
-            <a:avLst/>
-          </a:prstGeom>
-          <a:ln>
-            <a:solidFill>
-              <a:schemeClr val="tx1"/>
-            </a:solidFill>
-          </a:ln>
-        </p:spPr>
-        <p:style>
-          <a:lnRef idx="1">
-            <a:schemeClr val="accent1"/>
-          </a:lnRef>
-          <a:fillRef idx="0">
-            <a:schemeClr val="accent1"/>
-          </a:fillRef>
-          <a:effectRef idx="0">
-            <a:schemeClr val="accent1"/>
-          </a:effectRef>
-          <a:fontRef idx="minor">
-            <a:schemeClr val="tx1"/>
-          </a:fontRef>
-        </p:style>
-      </p:cxnSp>
-      <p:cxnSp>
-        <p:nvCxnSpPr>
-          <p:cNvPr id="70" name="Straight Connector 69"/>
-          <p:cNvCxnSpPr/>
-          <p:nvPr/>
-        </p:nvCxnSpPr>
-        <p:spPr>
-          <a:xfrm>
-            <a:off x="5967822" y="705893"/>
-            <a:ext cx="1764407" cy="0"/>
-          </a:xfrm>
-          <a:prstGeom prst="line">
-            <a:avLst/>
-          </a:prstGeom>
-          <a:ln>
-            <a:solidFill>
-              <a:schemeClr val="tx1"/>
-            </a:solidFill>
-          </a:ln>
-        </p:spPr>
-        <p:style>
-          <a:lnRef idx="1">
-            <a:schemeClr val="accent1"/>
-          </a:lnRef>
-          <a:fillRef idx="0">
-            <a:schemeClr val="accent1"/>
-          </a:fillRef>
-          <a:effectRef idx="0">
-            <a:schemeClr val="accent1"/>
-          </a:effectRef>
-          <a:fontRef idx="minor">
-            <a:schemeClr val="tx1"/>
-          </a:fontRef>
-        </p:style>
-      </p:cxnSp>
-      <p:cxnSp>
-        <p:nvCxnSpPr>
-          <p:cNvPr id="71" name="Straight Connector 70"/>
-          <p:cNvCxnSpPr/>
-          <p:nvPr/>
-        </p:nvCxnSpPr>
-        <p:spPr>
-          <a:xfrm>
-            <a:off x="9232844" y="705893"/>
-            <a:ext cx="1764407" cy="0"/>
+            <a:off x="5386440" y="4440121"/>
+            <a:ext cx="1883076" cy="0"/>
           </a:xfrm>
           <a:prstGeom prst="line">
             <a:avLst/>
@@ -3963,13 +3515,15 @@
       <p:cxnSp>
         <p:nvCxnSpPr>
           <p:cNvPr id="72" name="Straight Connector 71"/>
-          <p:cNvCxnSpPr/>
+          <p:cNvCxnSpPr>
+            <a:cxnSpLocks/>
+          </p:cNvCxnSpPr>
           <p:nvPr/>
         </p:nvCxnSpPr>
         <p:spPr>
           <a:xfrm>
-            <a:off x="650081" y="4659166"/>
-            <a:ext cx="1764407" cy="0"/>
+            <a:off x="650081" y="1706416"/>
+            <a:ext cx="2108354" cy="0"/>
           </a:xfrm>
           <a:prstGeom prst="line">
             <a:avLst/>
@@ -3979,6 +3533,1623 @@
               <a:schemeClr val="tx1"/>
             </a:solidFill>
           </a:ln>
+        </p:spPr>
+        <p:style>
+          <a:lnRef idx="1">
+            <a:schemeClr val="accent1"/>
+          </a:lnRef>
+          <a:fillRef idx="0">
+            <a:schemeClr val="accent1"/>
+          </a:fillRef>
+          <a:effectRef idx="0">
+            <a:schemeClr val="accent1"/>
+          </a:effectRef>
+          <a:fontRef idx="minor">
+            <a:schemeClr val="tx1"/>
+          </a:fontRef>
+        </p:style>
+      </p:cxnSp>
+      <p:sp>
+        <p:nvSpPr>
+          <p:cNvPr id="74" name="TextBox 73"/>
+          <p:cNvSpPr txBox="1"/>
+          <p:nvPr/>
+        </p:nvSpPr>
+        <p:spPr>
+          <a:xfrm>
+            <a:off x="5625225" y="5165907"/>
+            <a:ext cx="907621" cy="369332"/>
+          </a:xfrm>
+          <a:prstGeom prst="rect">
+            <a:avLst/>
+          </a:prstGeom>
+          <a:noFill/>
+        </p:spPr>
+        <p:txBody>
+          <a:bodyPr wrap="none" rtlCol="0">
+            <a:spAutoFit/>
+          </a:bodyPr>
+          <a:lstStyle/>
+          <a:p>
+            <a:r>
+              <a:rPr lang="en-US" dirty="0" err="1"/>
+              <a:t>User_id</a:t>
+            </a:r>
+            <a:endParaRPr lang="en-US" dirty="0"/>
+          </a:p>
+        </p:txBody>
+      </p:sp>
+      <p:sp>
+        <p:nvSpPr>
+          <p:cNvPr id="75" name="TextBox 74"/>
+          <p:cNvSpPr txBox="1"/>
+          <p:nvPr/>
+        </p:nvSpPr>
+        <p:spPr>
+          <a:xfrm>
+            <a:off x="5638826" y="4840551"/>
+            <a:ext cx="1353127" cy="369332"/>
+          </a:xfrm>
+          <a:prstGeom prst="rect">
+            <a:avLst/>
+          </a:prstGeom>
+          <a:noFill/>
+        </p:spPr>
+        <p:txBody>
+          <a:bodyPr wrap="none" rtlCol="0">
+            <a:spAutoFit/>
+          </a:bodyPr>
+          <a:lstStyle/>
+          <a:p>
+            <a:r>
+              <a:rPr lang="en-US" dirty="0" err="1"/>
+              <a:t>Event_name</a:t>
+            </a:r>
+            <a:endParaRPr lang="en-US" dirty="0"/>
+          </a:p>
+        </p:txBody>
+      </p:sp>
+      <p:sp>
+        <p:nvSpPr>
+          <p:cNvPr id="80" name="TextBox 79"/>
+          <p:cNvSpPr txBox="1"/>
+          <p:nvPr/>
+        </p:nvSpPr>
+        <p:spPr>
+          <a:xfrm>
+            <a:off x="5644275" y="4543105"/>
+            <a:ext cx="1009635" cy="369332"/>
+          </a:xfrm>
+          <a:prstGeom prst="rect">
+            <a:avLst/>
+          </a:prstGeom>
+          <a:noFill/>
+        </p:spPr>
+        <p:txBody>
+          <a:bodyPr wrap="none" rtlCol="0">
+            <a:spAutoFit/>
+          </a:bodyPr>
+          <a:lstStyle/>
+          <a:p>
+            <a:r>
+              <a:rPr lang="en-US" b="1" dirty="0" err="1"/>
+              <a:t>Event_id</a:t>
+            </a:r>
+            <a:endParaRPr lang="en-US" b="1" dirty="0"/>
+          </a:p>
+        </p:txBody>
+      </p:sp>
+      <p:sp>
+        <p:nvSpPr>
+          <p:cNvPr id="81" name="TextBox 80"/>
+          <p:cNvSpPr txBox="1"/>
+          <p:nvPr/>
+        </p:nvSpPr>
+        <p:spPr>
+          <a:xfrm>
+            <a:off x="5753931" y="643798"/>
+            <a:ext cx="862737" cy="369332"/>
+          </a:xfrm>
+          <a:prstGeom prst="rect">
+            <a:avLst/>
+          </a:prstGeom>
+          <a:noFill/>
+        </p:spPr>
+        <p:txBody>
+          <a:bodyPr wrap="none" rtlCol="0">
+            <a:spAutoFit/>
+          </a:bodyPr>
+          <a:lstStyle/>
+          <a:p>
+            <a:r>
+              <a:rPr lang="en-US" b="1" dirty="0" err="1"/>
+              <a:t>User_d</a:t>
+            </a:r>
+            <a:endParaRPr lang="en-US" b="1" dirty="0"/>
+          </a:p>
+        </p:txBody>
+      </p:sp>
+      <p:sp>
+        <p:nvSpPr>
+          <p:cNvPr id="82" name="TextBox 81"/>
+          <p:cNvSpPr txBox="1"/>
+          <p:nvPr/>
+        </p:nvSpPr>
+        <p:spPr>
+          <a:xfrm>
+            <a:off x="5744703" y="955431"/>
+            <a:ext cx="1265090" cy="923330"/>
+          </a:xfrm>
+          <a:prstGeom prst="rect">
+            <a:avLst/>
+          </a:prstGeom>
+          <a:noFill/>
+        </p:spPr>
+        <p:txBody>
+          <a:bodyPr wrap="none" rtlCol="0">
+            <a:spAutoFit/>
+          </a:bodyPr>
+          <a:lstStyle/>
+          <a:p>
+            <a:r>
+              <a:rPr lang="en-US" dirty="0" err="1"/>
+              <a:t>User_name</a:t>
+            </a:r>
+            <a:endParaRPr lang="en-US" dirty="0"/>
+          </a:p>
+          <a:p>
+            <a:r>
+              <a:rPr lang="en-US" dirty="0"/>
+              <a:t>Email</a:t>
+            </a:r>
+          </a:p>
+          <a:p>
+            <a:r>
+              <a:rPr lang="en-US" dirty="0"/>
+              <a:t>password</a:t>
+            </a:r>
+          </a:p>
+        </p:txBody>
+      </p:sp>
+      <p:sp>
+        <p:nvSpPr>
+          <p:cNvPr id="86" name="TextBox 85"/>
+          <p:cNvSpPr txBox="1"/>
+          <p:nvPr/>
+        </p:nvSpPr>
+        <p:spPr>
+          <a:xfrm>
+            <a:off x="998712" y="1816671"/>
+            <a:ext cx="1627048" cy="369332"/>
+          </a:xfrm>
+          <a:prstGeom prst="rect">
+            <a:avLst/>
+          </a:prstGeom>
+          <a:noFill/>
+        </p:spPr>
+        <p:txBody>
+          <a:bodyPr wrap="none" rtlCol="0">
+            <a:spAutoFit/>
+          </a:bodyPr>
+          <a:lstStyle/>
+          <a:p>
+            <a:r>
+              <a:rPr lang="en-US" b="1" dirty="0" err="1"/>
+              <a:t>Registration_id</a:t>
+            </a:r>
+            <a:endParaRPr lang="en-US" b="1" dirty="0"/>
+          </a:p>
+        </p:txBody>
+      </p:sp>
+      <p:sp>
+        <p:nvSpPr>
+          <p:cNvPr id="87" name="TextBox 86"/>
+          <p:cNvSpPr txBox="1"/>
+          <p:nvPr/>
+        </p:nvSpPr>
+        <p:spPr>
+          <a:xfrm>
+            <a:off x="1001744" y="2388228"/>
+            <a:ext cx="1076128" cy="369332"/>
+          </a:xfrm>
+          <a:prstGeom prst="rect">
+            <a:avLst/>
+          </a:prstGeom>
+          <a:noFill/>
+        </p:spPr>
+        <p:txBody>
+          <a:bodyPr wrap="none" rtlCol="0">
+            <a:spAutoFit/>
+          </a:bodyPr>
+          <a:lstStyle/>
+          <a:p>
+            <a:r>
+              <a:rPr lang="en-US" dirty="0" err="1"/>
+              <a:t>End_date</a:t>
+            </a:r>
+            <a:endParaRPr lang="en-US" dirty="0"/>
+          </a:p>
+        </p:txBody>
+      </p:sp>
+      <p:sp>
+        <p:nvSpPr>
+          <p:cNvPr id="88" name="TextBox 87"/>
+          <p:cNvSpPr txBox="1"/>
+          <p:nvPr/>
+        </p:nvSpPr>
+        <p:spPr>
+          <a:xfrm>
+            <a:off x="10854092" y="3039539"/>
+            <a:ext cx="301686" cy="369332"/>
+          </a:xfrm>
+          <a:prstGeom prst="rect">
+            <a:avLst/>
+          </a:prstGeom>
+          <a:noFill/>
+        </p:spPr>
+        <p:txBody>
+          <a:bodyPr wrap="none" rtlCol="0">
+            <a:spAutoFit/>
+          </a:bodyPr>
+          <a:lstStyle/>
+          <a:p>
+            <a:r>
+              <a:rPr lang="en-US" dirty="0">
+                <a:solidFill>
+                  <a:schemeClr val="accent1"/>
+                </a:solidFill>
+              </a:rPr>
+              <a:t>1</a:t>
+            </a:r>
+          </a:p>
+        </p:txBody>
+      </p:sp>
+      <p:sp>
+        <p:nvSpPr>
+          <p:cNvPr id="89" name="TextBox 88"/>
+          <p:cNvSpPr txBox="1"/>
+          <p:nvPr/>
+        </p:nvSpPr>
+        <p:spPr>
+          <a:xfrm>
+            <a:off x="1576041" y="3795969"/>
+            <a:ext cx="301686" cy="369332"/>
+          </a:xfrm>
+          <a:prstGeom prst="rect">
+            <a:avLst/>
+          </a:prstGeom>
+          <a:noFill/>
+        </p:spPr>
+        <p:txBody>
+          <a:bodyPr wrap="none" rtlCol="0">
+            <a:spAutoFit/>
+          </a:bodyPr>
+          <a:lstStyle/>
+          <a:p>
+            <a:r>
+              <a:rPr lang="en-US" dirty="0">
+                <a:solidFill>
+                  <a:schemeClr val="accent1"/>
+                </a:solidFill>
+              </a:rPr>
+              <a:t>*</a:t>
+            </a:r>
+          </a:p>
+        </p:txBody>
+      </p:sp>
+      <p:sp>
+        <p:nvSpPr>
+          <p:cNvPr id="90" name="TextBox 89"/>
+          <p:cNvSpPr txBox="1"/>
+          <p:nvPr/>
+        </p:nvSpPr>
+        <p:spPr>
+          <a:xfrm>
+            <a:off x="7214378" y="594617"/>
+            <a:ext cx="301686" cy="369332"/>
+          </a:xfrm>
+          <a:prstGeom prst="rect">
+            <a:avLst/>
+          </a:prstGeom>
+          <a:noFill/>
+        </p:spPr>
+        <p:txBody>
+          <a:bodyPr wrap="none" rtlCol="0">
+            <a:spAutoFit/>
+          </a:bodyPr>
+          <a:lstStyle/>
+          <a:p>
+            <a:r>
+              <a:rPr lang="en-US" dirty="0">
+                <a:solidFill>
+                  <a:schemeClr val="accent1"/>
+                </a:solidFill>
+              </a:rPr>
+              <a:t>1</a:t>
+            </a:r>
+          </a:p>
+        </p:txBody>
+      </p:sp>
+      <p:sp>
+        <p:nvSpPr>
+          <p:cNvPr id="91" name="TextBox 90"/>
+          <p:cNvSpPr txBox="1"/>
+          <p:nvPr/>
+        </p:nvSpPr>
+        <p:spPr>
+          <a:xfrm>
+            <a:off x="5468223" y="706353"/>
+            <a:ext cx="301686" cy="369332"/>
+          </a:xfrm>
+          <a:prstGeom prst="rect">
+            <a:avLst/>
+          </a:prstGeom>
+          <a:noFill/>
+        </p:spPr>
+        <p:txBody>
+          <a:bodyPr wrap="none" rtlCol="0">
+            <a:spAutoFit/>
+          </a:bodyPr>
+          <a:lstStyle/>
+          <a:p>
+            <a:r>
+              <a:rPr lang="en-US" dirty="0">
+                <a:solidFill>
+                  <a:schemeClr val="accent1"/>
+                </a:solidFill>
+              </a:rPr>
+              <a:t>*</a:t>
+            </a:r>
+          </a:p>
+        </p:txBody>
+      </p:sp>
+      <p:sp>
+        <p:nvSpPr>
+          <p:cNvPr id="96" name="TextBox 95"/>
+          <p:cNvSpPr txBox="1"/>
+          <p:nvPr/>
+        </p:nvSpPr>
+        <p:spPr>
+          <a:xfrm>
+            <a:off x="7319175" y="4904834"/>
+            <a:ext cx="301686" cy="369332"/>
+          </a:xfrm>
+          <a:prstGeom prst="rect">
+            <a:avLst/>
+          </a:prstGeom>
+          <a:noFill/>
+        </p:spPr>
+        <p:txBody>
+          <a:bodyPr wrap="none" rtlCol="0">
+            <a:spAutoFit/>
+          </a:bodyPr>
+          <a:lstStyle/>
+          <a:p>
+            <a:r>
+              <a:rPr lang="en-US" dirty="0">
+                <a:solidFill>
+                  <a:schemeClr val="accent1"/>
+                </a:solidFill>
+              </a:rPr>
+              <a:t>*</a:t>
+            </a:r>
+          </a:p>
+        </p:txBody>
+      </p:sp>
+      <p:sp>
+        <p:nvSpPr>
+          <p:cNvPr id="97" name="TextBox 96"/>
+          <p:cNvSpPr txBox="1"/>
+          <p:nvPr/>
+        </p:nvSpPr>
+        <p:spPr>
+          <a:xfrm>
+            <a:off x="5040300" y="4888694"/>
+            <a:ext cx="301686" cy="369332"/>
+          </a:xfrm>
+          <a:prstGeom prst="rect">
+            <a:avLst/>
+          </a:prstGeom>
+          <a:noFill/>
+        </p:spPr>
+        <p:txBody>
+          <a:bodyPr wrap="none" rtlCol="0">
+            <a:spAutoFit/>
+          </a:bodyPr>
+          <a:lstStyle/>
+          <a:p>
+            <a:r>
+              <a:rPr lang="en-US" dirty="0">
+                <a:solidFill>
+                  <a:schemeClr val="accent1"/>
+                </a:solidFill>
+              </a:rPr>
+              <a:t>1</a:t>
+            </a:r>
+          </a:p>
+        </p:txBody>
+      </p:sp>
+      <p:sp>
+        <p:nvSpPr>
+          <p:cNvPr id="98" name="TextBox 97"/>
+          <p:cNvSpPr txBox="1"/>
+          <p:nvPr/>
+        </p:nvSpPr>
+        <p:spPr>
+          <a:xfrm>
+            <a:off x="5353115" y="674576"/>
+            <a:ext cx="405880" cy="338554"/>
+          </a:xfrm>
+          <a:prstGeom prst="rect">
+            <a:avLst/>
+          </a:prstGeom>
+          <a:noFill/>
+        </p:spPr>
+        <p:txBody>
+          <a:bodyPr wrap="none" rtlCol="0">
+            <a:spAutoFit/>
+          </a:bodyPr>
+          <a:lstStyle/>
+          <a:p>
+            <a:r>
+              <a:rPr lang="en-US" sz="1600" b="1" dirty="0">
+                <a:solidFill>
+                  <a:schemeClr val="accent2"/>
+                </a:solidFill>
+              </a:rPr>
+              <a:t>PK</a:t>
+            </a:r>
+          </a:p>
+        </p:txBody>
+      </p:sp>
+      <p:sp>
+        <p:nvSpPr>
+          <p:cNvPr id="99" name="TextBox 98"/>
+          <p:cNvSpPr txBox="1"/>
+          <p:nvPr/>
+        </p:nvSpPr>
+        <p:spPr>
+          <a:xfrm>
+            <a:off x="587580" y="1847449"/>
+            <a:ext cx="405880" cy="338554"/>
+          </a:xfrm>
+          <a:prstGeom prst="rect">
+            <a:avLst/>
+          </a:prstGeom>
+          <a:noFill/>
+        </p:spPr>
+        <p:txBody>
+          <a:bodyPr wrap="none" rtlCol="0">
+            <a:spAutoFit/>
+          </a:bodyPr>
+          <a:lstStyle/>
+          <a:p>
+            <a:r>
+              <a:rPr lang="en-US" sz="1600" b="1" dirty="0">
+                <a:solidFill>
+                  <a:schemeClr val="accent2"/>
+                </a:solidFill>
+              </a:rPr>
+              <a:t>PK</a:t>
+            </a:r>
+          </a:p>
+        </p:txBody>
+      </p:sp>
+      <p:sp>
+        <p:nvSpPr>
+          <p:cNvPr id="100" name="TextBox 99"/>
+          <p:cNvSpPr txBox="1"/>
+          <p:nvPr/>
+        </p:nvSpPr>
+        <p:spPr>
+          <a:xfrm>
+            <a:off x="5319313" y="4567053"/>
+            <a:ext cx="405880" cy="338554"/>
+          </a:xfrm>
+          <a:prstGeom prst="rect">
+            <a:avLst/>
+          </a:prstGeom>
+          <a:noFill/>
+        </p:spPr>
+        <p:txBody>
+          <a:bodyPr wrap="none" rtlCol="0">
+            <a:spAutoFit/>
+          </a:bodyPr>
+          <a:lstStyle/>
+          <a:p>
+            <a:r>
+              <a:rPr lang="en-US" sz="1600" b="1" dirty="0">
+                <a:solidFill>
+                  <a:schemeClr val="accent2"/>
+                </a:solidFill>
+              </a:rPr>
+              <a:t>PK</a:t>
+            </a:r>
+          </a:p>
+        </p:txBody>
+      </p:sp>
+      <p:sp>
+        <p:nvSpPr>
+          <p:cNvPr id="107" name="TextBox 106"/>
+          <p:cNvSpPr txBox="1"/>
+          <p:nvPr/>
+        </p:nvSpPr>
+        <p:spPr>
+          <a:xfrm>
+            <a:off x="5309197" y="5189708"/>
+            <a:ext cx="391454" cy="338554"/>
+          </a:xfrm>
+          <a:prstGeom prst="rect">
+            <a:avLst/>
+          </a:prstGeom>
+          <a:noFill/>
+        </p:spPr>
+        <p:txBody>
+          <a:bodyPr wrap="none" rtlCol="0">
+            <a:spAutoFit/>
+          </a:bodyPr>
+          <a:lstStyle/>
+          <a:p>
+            <a:r>
+              <a:rPr lang="en-US" sz="1600" b="1" dirty="0">
+                <a:solidFill>
+                  <a:srgbClr val="7030A0"/>
+                </a:solidFill>
+              </a:rPr>
+              <a:t>FK</a:t>
+            </a:r>
+          </a:p>
+        </p:txBody>
+      </p:sp>
+      <p:sp>
+        <p:nvSpPr>
+          <p:cNvPr id="114" name="TextBox 113">
+            <a:extLst>
+              <a:ext uri="{FF2B5EF4-FFF2-40B4-BE49-F238E27FC236}">
+                <a16:creationId xmlns:a16="http://schemas.microsoft.com/office/drawing/2014/main" id="{354A03B1-DA78-4BA1-AEBE-A40B14A79E98}"/>
+              </a:ext>
+            </a:extLst>
+          </p:cNvPr>
+          <p:cNvSpPr txBox="1"/>
+          <p:nvPr/>
+        </p:nvSpPr>
+        <p:spPr>
+          <a:xfrm>
+            <a:off x="994530" y="2111573"/>
+            <a:ext cx="1167884" cy="369332"/>
+          </a:xfrm>
+          <a:prstGeom prst="rect">
+            <a:avLst/>
+          </a:prstGeom>
+          <a:noFill/>
+        </p:spPr>
+        <p:txBody>
+          <a:bodyPr wrap="none" rtlCol="0">
+            <a:spAutoFit/>
+          </a:bodyPr>
+          <a:lstStyle/>
+          <a:p>
+            <a:r>
+              <a:rPr lang="en-US" dirty="0" err="1"/>
+              <a:t>Start_date</a:t>
+            </a:r>
+            <a:endParaRPr lang="en-US" dirty="0"/>
+          </a:p>
+        </p:txBody>
+      </p:sp>
+      <p:sp>
+        <p:nvSpPr>
+          <p:cNvPr id="115" name="TextBox 114">
+            <a:extLst>
+              <a:ext uri="{FF2B5EF4-FFF2-40B4-BE49-F238E27FC236}">
+                <a16:creationId xmlns:a16="http://schemas.microsoft.com/office/drawing/2014/main" id="{3A771FC9-3B61-420B-B251-E95F92FEB084}"/>
+              </a:ext>
+            </a:extLst>
+          </p:cNvPr>
+          <p:cNvSpPr txBox="1"/>
+          <p:nvPr/>
+        </p:nvSpPr>
+        <p:spPr>
+          <a:xfrm>
+            <a:off x="1000894" y="2699017"/>
+            <a:ext cx="614271" cy="369332"/>
+          </a:xfrm>
+          <a:prstGeom prst="rect">
+            <a:avLst/>
+          </a:prstGeom>
+          <a:noFill/>
+        </p:spPr>
+        <p:txBody>
+          <a:bodyPr wrap="none" rtlCol="0">
+            <a:spAutoFit/>
+          </a:bodyPr>
+          <a:lstStyle/>
+          <a:p>
+            <a:r>
+              <a:rPr lang="en-US" dirty="0"/>
+              <a:t>time</a:t>
+            </a:r>
+          </a:p>
+        </p:txBody>
+      </p:sp>
+      <p:sp>
+        <p:nvSpPr>
+          <p:cNvPr id="116" name="TextBox 115">
+            <a:extLst>
+              <a:ext uri="{FF2B5EF4-FFF2-40B4-BE49-F238E27FC236}">
+                <a16:creationId xmlns:a16="http://schemas.microsoft.com/office/drawing/2014/main" id="{B60B2549-16C3-40C0-B116-CD621FCDCA58}"/>
+              </a:ext>
+            </a:extLst>
+          </p:cNvPr>
+          <p:cNvSpPr txBox="1"/>
+          <p:nvPr/>
+        </p:nvSpPr>
+        <p:spPr>
+          <a:xfrm>
+            <a:off x="1000894" y="2946677"/>
+            <a:ext cx="907621" cy="369332"/>
+          </a:xfrm>
+          <a:prstGeom prst="rect">
+            <a:avLst/>
+          </a:prstGeom>
+          <a:noFill/>
+        </p:spPr>
+        <p:txBody>
+          <a:bodyPr wrap="none" rtlCol="0">
+            <a:spAutoFit/>
+          </a:bodyPr>
+          <a:lstStyle/>
+          <a:p>
+            <a:r>
+              <a:rPr lang="en-US" dirty="0" err="1"/>
+              <a:t>User_id</a:t>
+            </a:r>
+            <a:endParaRPr lang="en-US" dirty="0"/>
+          </a:p>
+        </p:txBody>
+      </p:sp>
+      <p:sp>
+        <p:nvSpPr>
+          <p:cNvPr id="121" name="TextBox 120">
+            <a:extLst>
+              <a:ext uri="{FF2B5EF4-FFF2-40B4-BE49-F238E27FC236}">
+                <a16:creationId xmlns:a16="http://schemas.microsoft.com/office/drawing/2014/main" id="{A5A1E7C1-02B9-4EEC-AA82-E94FBBF376A8}"/>
+              </a:ext>
+            </a:extLst>
+          </p:cNvPr>
+          <p:cNvSpPr txBox="1"/>
+          <p:nvPr/>
+        </p:nvSpPr>
+        <p:spPr>
+          <a:xfrm>
+            <a:off x="1000894" y="3214806"/>
+            <a:ext cx="995657" cy="369332"/>
+          </a:xfrm>
+          <a:prstGeom prst="rect">
+            <a:avLst/>
+          </a:prstGeom>
+          <a:noFill/>
+        </p:spPr>
+        <p:txBody>
+          <a:bodyPr wrap="none" rtlCol="0">
+            <a:spAutoFit/>
+          </a:bodyPr>
+          <a:lstStyle/>
+          <a:p>
+            <a:r>
+              <a:rPr lang="en-US" dirty="0" err="1"/>
+              <a:t>Event_id</a:t>
+            </a:r>
+            <a:endParaRPr lang="en-US" dirty="0"/>
+          </a:p>
+        </p:txBody>
+      </p:sp>
+      <p:sp>
+        <p:nvSpPr>
+          <p:cNvPr id="122" name="TextBox 121">
+            <a:extLst>
+              <a:ext uri="{FF2B5EF4-FFF2-40B4-BE49-F238E27FC236}">
+                <a16:creationId xmlns:a16="http://schemas.microsoft.com/office/drawing/2014/main" id="{038DE85B-3DDE-4EB8-B3BE-1360D08632D5}"/>
+              </a:ext>
+            </a:extLst>
+          </p:cNvPr>
+          <p:cNvSpPr txBox="1"/>
+          <p:nvPr/>
+        </p:nvSpPr>
+        <p:spPr>
+          <a:xfrm>
+            <a:off x="581769" y="2962066"/>
+            <a:ext cx="391454" cy="338554"/>
+          </a:xfrm>
+          <a:prstGeom prst="rect">
+            <a:avLst/>
+          </a:prstGeom>
+          <a:noFill/>
+        </p:spPr>
+        <p:txBody>
+          <a:bodyPr wrap="none" rtlCol="0">
+            <a:spAutoFit/>
+          </a:bodyPr>
+          <a:lstStyle/>
+          <a:p>
+            <a:r>
+              <a:rPr lang="en-US" sz="1600" b="1" dirty="0">
+                <a:solidFill>
+                  <a:srgbClr val="7030A0"/>
+                </a:solidFill>
+              </a:rPr>
+              <a:t>FK</a:t>
+            </a:r>
+          </a:p>
+        </p:txBody>
+      </p:sp>
+      <p:sp>
+        <p:nvSpPr>
+          <p:cNvPr id="123" name="TextBox 122">
+            <a:extLst>
+              <a:ext uri="{FF2B5EF4-FFF2-40B4-BE49-F238E27FC236}">
+                <a16:creationId xmlns:a16="http://schemas.microsoft.com/office/drawing/2014/main" id="{EEC03513-4190-4D64-A2F8-039D05159EE3}"/>
+              </a:ext>
+            </a:extLst>
+          </p:cNvPr>
+          <p:cNvSpPr txBox="1"/>
+          <p:nvPr/>
+        </p:nvSpPr>
+        <p:spPr>
+          <a:xfrm>
+            <a:off x="574916" y="3245584"/>
+            <a:ext cx="391454" cy="338554"/>
+          </a:xfrm>
+          <a:prstGeom prst="rect">
+            <a:avLst/>
+          </a:prstGeom>
+          <a:noFill/>
+        </p:spPr>
+        <p:txBody>
+          <a:bodyPr wrap="none" rtlCol="0">
+            <a:spAutoFit/>
+          </a:bodyPr>
+          <a:lstStyle/>
+          <a:p>
+            <a:r>
+              <a:rPr lang="en-US" sz="1600" b="1" dirty="0">
+                <a:solidFill>
+                  <a:srgbClr val="7030A0"/>
+                </a:solidFill>
+              </a:rPr>
+              <a:t>FK</a:t>
+            </a:r>
+          </a:p>
+        </p:txBody>
+      </p:sp>
+      <p:sp>
+        <p:nvSpPr>
+          <p:cNvPr id="124" name="Rectangle 123">
+            <a:extLst>
+              <a:ext uri="{FF2B5EF4-FFF2-40B4-BE49-F238E27FC236}">
+                <a16:creationId xmlns:a16="http://schemas.microsoft.com/office/drawing/2014/main" id="{75F6756E-6AAD-4A42-8705-56084472D5D7}"/>
+              </a:ext>
+            </a:extLst>
+          </p:cNvPr>
+          <p:cNvSpPr/>
+          <p:nvPr/>
+        </p:nvSpPr>
+        <p:spPr>
+          <a:xfrm>
+            <a:off x="9865821" y="1281098"/>
+            <a:ext cx="1921712" cy="1801766"/>
+          </a:xfrm>
+          <a:prstGeom prst="rect">
+            <a:avLst/>
+          </a:prstGeom>
+        </p:spPr>
+        <p:style>
+          <a:lnRef idx="2">
+            <a:schemeClr val="dk1"/>
+          </a:lnRef>
+          <a:fillRef idx="1">
+            <a:schemeClr val="lt1"/>
+          </a:fillRef>
+          <a:effectRef idx="0">
+            <a:schemeClr val="dk1"/>
+          </a:effectRef>
+          <a:fontRef idx="minor">
+            <a:schemeClr val="dk1"/>
+          </a:fontRef>
+        </p:style>
+        <p:txBody>
+          <a:bodyPr rtlCol="0" anchor="ctr"/>
+          <a:lstStyle/>
+          <a:p>
+            <a:pPr algn="ctr"/>
+            <a:endParaRPr lang="en-US"/>
+          </a:p>
+        </p:txBody>
+      </p:sp>
+      <p:sp>
+        <p:nvSpPr>
+          <p:cNvPr id="125" name="TextBox 124">
+            <a:extLst>
+              <a:ext uri="{FF2B5EF4-FFF2-40B4-BE49-F238E27FC236}">
+                <a16:creationId xmlns:a16="http://schemas.microsoft.com/office/drawing/2014/main" id="{39166B3B-44C8-4978-9DC6-B4F45E21DA10}"/>
+              </a:ext>
+            </a:extLst>
+          </p:cNvPr>
+          <p:cNvSpPr txBox="1"/>
+          <p:nvPr/>
+        </p:nvSpPr>
+        <p:spPr>
+          <a:xfrm>
+            <a:off x="10347194" y="1327709"/>
+            <a:ext cx="1185774" cy="369332"/>
+          </a:xfrm>
+          <a:prstGeom prst="rect">
+            <a:avLst/>
+          </a:prstGeom>
+          <a:noFill/>
+        </p:spPr>
+        <p:txBody>
+          <a:bodyPr wrap="none" rtlCol="0">
+            <a:spAutoFit/>
+          </a:bodyPr>
+          <a:lstStyle/>
+          <a:p>
+            <a:r>
+              <a:rPr lang="en-US" b="1" dirty="0"/>
+              <a:t>Categories</a:t>
+            </a:r>
+          </a:p>
+        </p:txBody>
+      </p:sp>
+      <p:cxnSp>
+        <p:nvCxnSpPr>
+          <p:cNvPr id="126" name="Straight Connector 125">
+            <a:extLst>
+              <a:ext uri="{FF2B5EF4-FFF2-40B4-BE49-F238E27FC236}">
+                <a16:creationId xmlns:a16="http://schemas.microsoft.com/office/drawing/2014/main" id="{27B4BE08-F773-4154-9FD1-C584FC66FAA3}"/>
+              </a:ext>
+            </a:extLst>
+          </p:cNvPr>
+          <p:cNvCxnSpPr>
+            <a:cxnSpLocks/>
+          </p:cNvCxnSpPr>
+          <p:nvPr/>
+        </p:nvCxnSpPr>
+        <p:spPr>
+          <a:xfrm>
+            <a:off x="9904457" y="1740583"/>
+            <a:ext cx="1873348" cy="0"/>
+          </a:xfrm>
+          <a:prstGeom prst="line">
+            <a:avLst/>
+          </a:prstGeom>
+          <a:ln>
+            <a:solidFill>
+              <a:schemeClr val="tx1"/>
+            </a:solidFill>
+          </a:ln>
+        </p:spPr>
+        <p:style>
+          <a:lnRef idx="1">
+            <a:schemeClr val="accent1"/>
+          </a:lnRef>
+          <a:fillRef idx="0">
+            <a:schemeClr val="accent1"/>
+          </a:fillRef>
+          <a:effectRef idx="0">
+            <a:schemeClr val="accent1"/>
+          </a:effectRef>
+          <a:fontRef idx="minor">
+            <a:schemeClr val="tx1"/>
+          </a:fontRef>
+        </p:style>
+      </p:cxnSp>
+      <p:sp>
+        <p:nvSpPr>
+          <p:cNvPr id="127" name="TextBox 126">
+            <a:extLst>
+              <a:ext uri="{FF2B5EF4-FFF2-40B4-BE49-F238E27FC236}">
+                <a16:creationId xmlns:a16="http://schemas.microsoft.com/office/drawing/2014/main" id="{6CC432D3-63DD-48E7-B994-932AF7F45410}"/>
+              </a:ext>
+            </a:extLst>
+          </p:cNvPr>
+          <p:cNvSpPr txBox="1"/>
+          <p:nvPr/>
+        </p:nvSpPr>
+        <p:spPr>
+          <a:xfrm>
+            <a:off x="10162292" y="2580669"/>
+            <a:ext cx="907621" cy="369332"/>
+          </a:xfrm>
+          <a:prstGeom prst="rect">
+            <a:avLst/>
+          </a:prstGeom>
+          <a:noFill/>
+        </p:spPr>
+        <p:txBody>
+          <a:bodyPr wrap="none" rtlCol="0">
+            <a:spAutoFit/>
+          </a:bodyPr>
+          <a:lstStyle/>
+          <a:p>
+            <a:r>
+              <a:rPr lang="en-US" dirty="0" err="1"/>
+              <a:t>User_id</a:t>
+            </a:r>
+            <a:endParaRPr lang="en-US" dirty="0"/>
+          </a:p>
+        </p:txBody>
+      </p:sp>
+      <p:sp>
+        <p:nvSpPr>
+          <p:cNvPr id="128" name="TextBox 127">
+            <a:extLst>
+              <a:ext uri="{FF2B5EF4-FFF2-40B4-BE49-F238E27FC236}">
+                <a16:creationId xmlns:a16="http://schemas.microsoft.com/office/drawing/2014/main" id="{25DC4F6A-F569-43C6-9ADB-D5427A186995}"/>
+              </a:ext>
+            </a:extLst>
+          </p:cNvPr>
+          <p:cNvSpPr txBox="1"/>
+          <p:nvPr/>
+        </p:nvSpPr>
+        <p:spPr>
+          <a:xfrm>
+            <a:off x="10137793" y="2198163"/>
+            <a:ext cx="1668790" cy="369332"/>
+          </a:xfrm>
+          <a:prstGeom prst="rect">
+            <a:avLst/>
+          </a:prstGeom>
+          <a:noFill/>
+        </p:spPr>
+        <p:txBody>
+          <a:bodyPr wrap="none" rtlCol="0">
+            <a:spAutoFit/>
+          </a:bodyPr>
+          <a:lstStyle/>
+          <a:p>
+            <a:r>
+              <a:rPr lang="en-US" dirty="0" err="1"/>
+              <a:t>Category_name</a:t>
+            </a:r>
+            <a:endParaRPr lang="en-US" dirty="0"/>
+          </a:p>
+        </p:txBody>
+      </p:sp>
+      <p:sp>
+        <p:nvSpPr>
+          <p:cNvPr id="129" name="TextBox 128">
+            <a:extLst>
+              <a:ext uri="{FF2B5EF4-FFF2-40B4-BE49-F238E27FC236}">
+                <a16:creationId xmlns:a16="http://schemas.microsoft.com/office/drawing/2014/main" id="{7AEE6F3B-230C-4FCC-8E3F-1629EEC5B3EE}"/>
+              </a:ext>
+            </a:extLst>
+          </p:cNvPr>
+          <p:cNvSpPr txBox="1"/>
+          <p:nvPr/>
+        </p:nvSpPr>
+        <p:spPr>
+          <a:xfrm>
+            <a:off x="10162292" y="1843567"/>
+            <a:ext cx="1327864" cy="369332"/>
+          </a:xfrm>
+          <a:prstGeom prst="rect">
+            <a:avLst/>
+          </a:prstGeom>
+          <a:noFill/>
+        </p:spPr>
+        <p:txBody>
+          <a:bodyPr wrap="none" rtlCol="0">
+            <a:spAutoFit/>
+          </a:bodyPr>
+          <a:lstStyle/>
+          <a:p>
+            <a:r>
+              <a:rPr lang="en-US" b="1" dirty="0" err="1"/>
+              <a:t>Category_id</a:t>
+            </a:r>
+            <a:endParaRPr lang="en-US" b="1" dirty="0"/>
+          </a:p>
+        </p:txBody>
+      </p:sp>
+      <p:sp>
+        <p:nvSpPr>
+          <p:cNvPr id="130" name="TextBox 129">
+            <a:extLst>
+              <a:ext uri="{FF2B5EF4-FFF2-40B4-BE49-F238E27FC236}">
+                <a16:creationId xmlns:a16="http://schemas.microsoft.com/office/drawing/2014/main" id="{38A97912-53C8-449B-9F50-39634E0B285F}"/>
+              </a:ext>
+            </a:extLst>
+          </p:cNvPr>
+          <p:cNvSpPr txBox="1"/>
+          <p:nvPr/>
+        </p:nvSpPr>
+        <p:spPr>
+          <a:xfrm>
+            <a:off x="5118877" y="624199"/>
+            <a:ext cx="301686" cy="369332"/>
+          </a:xfrm>
+          <a:prstGeom prst="rect">
+            <a:avLst/>
+          </a:prstGeom>
+          <a:noFill/>
+        </p:spPr>
+        <p:txBody>
+          <a:bodyPr wrap="none" rtlCol="0">
+            <a:spAutoFit/>
+          </a:bodyPr>
+          <a:lstStyle/>
+          <a:p>
+            <a:r>
+              <a:rPr lang="en-US" dirty="0">
+                <a:solidFill>
+                  <a:schemeClr val="accent1"/>
+                </a:solidFill>
+              </a:rPr>
+              <a:t>1</a:t>
+            </a:r>
+          </a:p>
+        </p:txBody>
+      </p:sp>
+      <p:sp>
+        <p:nvSpPr>
+          <p:cNvPr id="131" name="TextBox 130">
+            <a:extLst>
+              <a:ext uri="{FF2B5EF4-FFF2-40B4-BE49-F238E27FC236}">
+                <a16:creationId xmlns:a16="http://schemas.microsoft.com/office/drawing/2014/main" id="{1E523A41-4AC0-4705-9383-23BA7420C1CC}"/>
+              </a:ext>
+            </a:extLst>
+          </p:cNvPr>
+          <p:cNvSpPr txBox="1"/>
+          <p:nvPr/>
+        </p:nvSpPr>
+        <p:spPr>
+          <a:xfrm>
+            <a:off x="9837330" y="1867515"/>
+            <a:ext cx="405880" cy="338554"/>
+          </a:xfrm>
+          <a:prstGeom prst="rect">
+            <a:avLst/>
+          </a:prstGeom>
+          <a:noFill/>
+        </p:spPr>
+        <p:txBody>
+          <a:bodyPr wrap="none" rtlCol="0">
+            <a:spAutoFit/>
+          </a:bodyPr>
+          <a:lstStyle/>
+          <a:p>
+            <a:r>
+              <a:rPr lang="en-US" sz="1600" b="1" dirty="0">
+                <a:solidFill>
+                  <a:schemeClr val="accent2"/>
+                </a:solidFill>
+              </a:rPr>
+              <a:t>PK</a:t>
+            </a:r>
+          </a:p>
+        </p:txBody>
+      </p:sp>
+      <p:sp>
+        <p:nvSpPr>
+          <p:cNvPr id="132" name="TextBox 131">
+            <a:extLst>
+              <a:ext uri="{FF2B5EF4-FFF2-40B4-BE49-F238E27FC236}">
+                <a16:creationId xmlns:a16="http://schemas.microsoft.com/office/drawing/2014/main" id="{6E94FA1B-316E-491E-B7A4-50C72371E7FD}"/>
+              </a:ext>
+            </a:extLst>
+          </p:cNvPr>
+          <p:cNvSpPr txBox="1"/>
+          <p:nvPr/>
+        </p:nvSpPr>
+        <p:spPr>
+          <a:xfrm>
+            <a:off x="9846264" y="2623520"/>
+            <a:ext cx="391454" cy="338554"/>
+          </a:xfrm>
+          <a:prstGeom prst="rect">
+            <a:avLst/>
+          </a:prstGeom>
+          <a:noFill/>
+        </p:spPr>
+        <p:txBody>
+          <a:bodyPr wrap="none" rtlCol="0">
+            <a:spAutoFit/>
+          </a:bodyPr>
+          <a:lstStyle/>
+          <a:p>
+            <a:r>
+              <a:rPr lang="en-US" sz="1600" b="1" dirty="0">
+                <a:solidFill>
+                  <a:srgbClr val="7030A0"/>
+                </a:solidFill>
+              </a:rPr>
+              <a:t>FK</a:t>
+            </a:r>
+          </a:p>
+        </p:txBody>
+      </p:sp>
+      <p:sp>
+        <p:nvSpPr>
+          <p:cNvPr id="133" name="TextBox 132">
+            <a:extLst>
+              <a:ext uri="{FF2B5EF4-FFF2-40B4-BE49-F238E27FC236}">
+                <a16:creationId xmlns:a16="http://schemas.microsoft.com/office/drawing/2014/main" id="{9A61C024-0122-43FC-AE76-20F8534E2098}"/>
+              </a:ext>
+            </a:extLst>
+          </p:cNvPr>
+          <p:cNvSpPr txBox="1"/>
+          <p:nvPr/>
+        </p:nvSpPr>
+        <p:spPr>
+          <a:xfrm>
+            <a:off x="5627430" y="5499697"/>
+            <a:ext cx="1311321" cy="369332"/>
+          </a:xfrm>
+          <a:prstGeom prst="rect">
+            <a:avLst/>
+          </a:prstGeom>
+          <a:noFill/>
+        </p:spPr>
+        <p:txBody>
+          <a:bodyPr wrap="none" rtlCol="0">
+            <a:spAutoFit/>
+          </a:bodyPr>
+          <a:lstStyle/>
+          <a:p>
+            <a:r>
+              <a:rPr lang="en-US" dirty="0" err="1"/>
+              <a:t>Category_id</a:t>
+            </a:r>
+            <a:endParaRPr lang="en-US" dirty="0"/>
+          </a:p>
+        </p:txBody>
+      </p:sp>
+      <p:sp>
+        <p:nvSpPr>
+          <p:cNvPr id="134" name="TextBox 133">
+            <a:extLst>
+              <a:ext uri="{FF2B5EF4-FFF2-40B4-BE49-F238E27FC236}">
+                <a16:creationId xmlns:a16="http://schemas.microsoft.com/office/drawing/2014/main" id="{2B19E817-8768-42A7-A2BB-BB88AC519CD4}"/>
+              </a:ext>
+            </a:extLst>
+          </p:cNvPr>
+          <p:cNvSpPr txBox="1"/>
+          <p:nvPr/>
+        </p:nvSpPr>
+        <p:spPr>
+          <a:xfrm>
+            <a:off x="5298930" y="5512247"/>
+            <a:ext cx="391454" cy="338554"/>
+          </a:xfrm>
+          <a:prstGeom prst="rect">
+            <a:avLst/>
+          </a:prstGeom>
+          <a:noFill/>
+        </p:spPr>
+        <p:txBody>
+          <a:bodyPr wrap="none" rtlCol="0">
+            <a:spAutoFit/>
+          </a:bodyPr>
+          <a:lstStyle/>
+          <a:p>
+            <a:r>
+              <a:rPr lang="en-US" sz="1600" b="1" dirty="0">
+                <a:solidFill>
+                  <a:srgbClr val="7030A0"/>
+                </a:solidFill>
+              </a:rPr>
+              <a:t>FK</a:t>
+            </a:r>
+          </a:p>
+        </p:txBody>
+      </p:sp>
+      <p:sp>
+        <p:nvSpPr>
+          <p:cNvPr id="135" name="TextBox 134">
+            <a:extLst>
+              <a:ext uri="{FF2B5EF4-FFF2-40B4-BE49-F238E27FC236}">
+                <a16:creationId xmlns:a16="http://schemas.microsoft.com/office/drawing/2014/main" id="{8CA182A3-F970-4917-897B-4AF11FFBB7D1}"/>
+              </a:ext>
+            </a:extLst>
+          </p:cNvPr>
+          <p:cNvSpPr txBox="1"/>
+          <p:nvPr/>
+        </p:nvSpPr>
+        <p:spPr>
+          <a:xfrm>
+            <a:off x="5627430" y="5805379"/>
+            <a:ext cx="1272271" cy="369332"/>
+          </a:xfrm>
+          <a:prstGeom prst="rect">
+            <a:avLst/>
+          </a:prstGeom>
+          <a:noFill/>
+        </p:spPr>
+        <p:txBody>
+          <a:bodyPr wrap="none" rtlCol="0">
+            <a:spAutoFit/>
+          </a:bodyPr>
+          <a:lstStyle/>
+          <a:p>
+            <a:r>
+              <a:rPr lang="en-US" dirty="0" err="1"/>
+              <a:t>Location_id</a:t>
+            </a:r>
+            <a:endParaRPr lang="en-US" dirty="0"/>
+          </a:p>
+        </p:txBody>
+      </p:sp>
+      <p:sp>
+        <p:nvSpPr>
+          <p:cNvPr id="136" name="TextBox 135">
+            <a:extLst>
+              <a:ext uri="{FF2B5EF4-FFF2-40B4-BE49-F238E27FC236}">
+                <a16:creationId xmlns:a16="http://schemas.microsoft.com/office/drawing/2014/main" id="{B121F664-76DF-44CC-B912-FF525E1E7895}"/>
+              </a:ext>
+            </a:extLst>
+          </p:cNvPr>
+          <p:cNvSpPr txBox="1"/>
+          <p:nvPr/>
+        </p:nvSpPr>
+        <p:spPr>
+          <a:xfrm>
+            <a:off x="5296414" y="5816503"/>
+            <a:ext cx="391454" cy="338554"/>
+          </a:xfrm>
+          <a:prstGeom prst="rect">
+            <a:avLst/>
+          </a:prstGeom>
+          <a:noFill/>
+        </p:spPr>
+        <p:txBody>
+          <a:bodyPr wrap="none" rtlCol="0">
+            <a:spAutoFit/>
+          </a:bodyPr>
+          <a:lstStyle/>
+          <a:p>
+            <a:r>
+              <a:rPr lang="en-US" sz="1600" b="1" dirty="0">
+                <a:solidFill>
+                  <a:srgbClr val="7030A0"/>
+                </a:solidFill>
+              </a:rPr>
+              <a:t>FK</a:t>
+            </a:r>
+          </a:p>
+        </p:txBody>
+      </p:sp>
+      <p:sp>
+        <p:nvSpPr>
+          <p:cNvPr id="137" name="Rectangle 136">
+            <a:extLst>
+              <a:ext uri="{FF2B5EF4-FFF2-40B4-BE49-F238E27FC236}">
+                <a16:creationId xmlns:a16="http://schemas.microsoft.com/office/drawing/2014/main" id="{3E778F03-ED14-499B-88D2-A6D39D65D36E}"/>
+              </a:ext>
+            </a:extLst>
+          </p:cNvPr>
+          <p:cNvSpPr/>
+          <p:nvPr/>
+        </p:nvSpPr>
+        <p:spPr>
+          <a:xfrm>
+            <a:off x="9930432" y="5096735"/>
+            <a:ext cx="1921712" cy="1668904"/>
+          </a:xfrm>
+          <a:prstGeom prst="rect">
+            <a:avLst/>
+          </a:prstGeom>
+        </p:spPr>
+        <p:style>
+          <a:lnRef idx="2">
+            <a:schemeClr val="dk1"/>
+          </a:lnRef>
+          <a:fillRef idx="1">
+            <a:schemeClr val="lt1"/>
+          </a:fillRef>
+          <a:effectRef idx="0">
+            <a:schemeClr val="dk1"/>
+          </a:effectRef>
+          <a:fontRef idx="minor">
+            <a:schemeClr val="dk1"/>
+          </a:fontRef>
+        </p:style>
+        <p:txBody>
+          <a:bodyPr rtlCol="0" anchor="ctr"/>
+          <a:lstStyle/>
+          <a:p>
+            <a:pPr algn="ctr"/>
+            <a:endParaRPr lang="en-US"/>
+          </a:p>
+        </p:txBody>
+      </p:sp>
+      <p:sp>
+        <p:nvSpPr>
+          <p:cNvPr id="138" name="TextBox 137">
+            <a:extLst>
+              <a:ext uri="{FF2B5EF4-FFF2-40B4-BE49-F238E27FC236}">
+                <a16:creationId xmlns:a16="http://schemas.microsoft.com/office/drawing/2014/main" id="{413DED83-745C-494C-A21E-506411F8241F}"/>
+              </a:ext>
+            </a:extLst>
+          </p:cNvPr>
+          <p:cNvSpPr txBox="1"/>
+          <p:nvPr/>
+        </p:nvSpPr>
+        <p:spPr>
+          <a:xfrm>
+            <a:off x="10411805" y="5186888"/>
+            <a:ext cx="1086901" cy="369332"/>
+          </a:xfrm>
+          <a:prstGeom prst="rect">
+            <a:avLst/>
+          </a:prstGeom>
+          <a:noFill/>
+        </p:spPr>
+        <p:txBody>
+          <a:bodyPr wrap="none" rtlCol="0">
+            <a:spAutoFit/>
+          </a:bodyPr>
+          <a:lstStyle/>
+          <a:p>
+            <a:r>
+              <a:rPr lang="en-US" b="1" dirty="0"/>
+              <a:t>Locations</a:t>
+            </a:r>
+          </a:p>
+        </p:txBody>
+      </p:sp>
+      <p:cxnSp>
+        <p:nvCxnSpPr>
+          <p:cNvPr id="139" name="Straight Connector 138">
+            <a:extLst>
+              <a:ext uri="{FF2B5EF4-FFF2-40B4-BE49-F238E27FC236}">
+                <a16:creationId xmlns:a16="http://schemas.microsoft.com/office/drawing/2014/main" id="{70B1CBBC-095C-4D7C-A96E-BF7FE9F24368}"/>
+              </a:ext>
+            </a:extLst>
+          </p:cNvPr>
+          <p:cNvCxnSpPr>
+            <a:cxnSpLocks/>
+          </p:cNvCxnSpPr>
+          <p:nvPr/>
+        </p:nvCxnSpPr>
+        <p:spPr>
+          <a:xfrm>
+            <a:off x="9969068" y="5556220"/>
+            <a:ext cx="1863078" cy="0"/>
+          </a:xfrm>
+          <a:prstGeom prst="line">
+            <a:avLst/>
+          </a:prstGeom>
+          <a:ln>
+            <a:solidFill>
+              <a:schemeClr val="tx1"/>
+            </a:solidFill>
+          </a:ln>
+        </p:spPr>
+        <p:style>
+          <a:lnRef idx="1">
+            <a:schemeClr val="accent1"/>
+          </a:lnRef>
+          <a:fillRef idx="0">
+            <a:schemeClr val="accent1"/>
+          </a:fillRef>
+          <a:effectRef idx="0">
+            <a:schemeClr val="accent1"/>
+          </a:effectRef>
+          <a:fontRef idx="minor">
+            <a:schemeClr val="tx1"/>
+          </a:fontRef>
+        </p:style>
+      </p:cxnSp>
+      <p:sp>
+        <p:nvSpPr>
+          <p:cNvPr id="140" name="TextBox 139">
+            <a:extLst>
+              <a:ext uri="{FF2B5EF4-FFF2-40B4-BE49-F238E27FC236}">
+                <a16:creationId xmlns:a16="http://schemas.microsoft.com/office/drawing/2014/main" id="{D12E18FF-EA29-4CBA-AC1C-5C2DDB31E51D}"/>
+              </a:ext>
+            </a:extLst>
+          </p:cNvPr>
+          <p:cNvSpPr txBox="1"/>
+          <p:nvPr/>
+        </p:nvSpPr>
+        <p:spPr>
+          <a:xfrm>
+            <a:off x="10207853" y="6377256"/>
+            <a:ext cx="731932" cy="369332"/>
+          </a:xfrm>
+          <a:prstGeom prst="rect">
+            <a:avLst/>
+          </a:prstGeom>
+          <a:noFill/>
+        </p:spPr>
+        <p:txBody>
+          <a:bodyPr wrap="none" rtlCol="0">
+            <a:spAutoFit/>
+          </a:bodyPr>
+          <a:lstStyle/>
+          <a:p>
+            <a:r>
+              <a:rPr lang="en-US" dirty="0"/>
+              <a:t>Guest</a:t>
+            </a:r>
+          </a:p>
+        </p:txBody>
+      </p:sp>
+      <p:sp>
+        <p:nvSpPr>
+          <p:cNvPr id="141" name="TextBox 140">
+            <a:extLst>
+              <a:ext uri="{FF2B5EF4-FFF2-40B4-BE49-F238E27FC236}">
+                <a16:creationId xmlns:a16="http://schemas.microsoft.com/office/drawing/2014/main" id="{F65C9F02-280A-4D0B-BE5F-8EE21A500311}"/>
+              </a:ext>
+            </a:extLst>
+          </p:cNvPr>
+          <p:cNvSpPr txBox="1"/>
+          <p:nvPr/>
+        </p:nvSpPr>
+        <p:spPr>
+          <a:xfrm>
+            <a:off x="10202404" y="6013800"/>
+            <a:ext cx="1629742" cy="369332"/>
+          </a:xfrm>
+          <a:prstGeom prst="rect">
+            <a:avLst/>
+          </a:prstGeom>
+          <a:noFill/>
+        </p:spPr>
+        <p:txBody>
+          <a:bodyPr wrap="none" rtlCol="0">
+            <a:spAutoFit/>
+          </a:bodyPr>
+          <a:lstStyle/>
+          <a:p>
+            <a:r>
+              <a:rPr lang="en-US" dirty="0" err="1"/>
+              <a:t>Location_name</a:t>
+            </a:r>
+            <a:endParaRPr lang="en-US" dirty="0"/>
+          </a:p>
+        </p:txBody>
+      </p:sp>
+      <p:sp>
+        <p:nvSpPr>
+          <p:cNvPr id="142" name="TextBox 141">
+            <a:extLst>
+              <a:ext uri="{FF2B5EF4-FFF2-40B4-BE49-F238E27FC236}">
+                <a16:creationId xmlns:a16="http://schemas.microsoft.com/office/drawing/2014/main" id="{A84C1AEC-236C-4A9E-B39E-E4E8D26DFADF}"/>
+              </a:ext>
+            </a:extLst>
+          </p:cNvPr>
+          <p:cNvSpPr txBox="1"/>
+          <p:nvPr/>
+        </p:nvSpPr>
+        <p:spPr>
+          <a:xfrm>
+            <a:off x="10226903" y="5659204"/>
+            <a:ext cx="1290481" cy="369332"/>
+          </a:xfrm>
+          <a:prstGeom prst="rect">
+            <a:avLst/>
+          </a:prstGeom>
+          <a:noFill/>
+        </p:spPr>
+        <p:txBody>
+          <a:bodyPr wrap="none" rtlCol="0">
+            <a:spAutoFit/>
+          </a:bodyPr>
+          <a:lstStyle/>
+          <a:p>
+            <a:r>
+              <a:rPr lang="en-US" b="1" dirty="0" err="1"/>
+              <a:t>Location_id</a:t>
+            </a:r>
+            <a:endParaRPr lang="en-US" b="1" dirty="0"/>
+          </a:p>
+        </p:txBody>
+      </p:sp>
+      <p:sp>
+        <p:nvSpPr>
+          <p:cNvPr id="143" name="TextBox 142">
+            <a:extLst>
+              <a:ext uri="{FF2B5EF4-FFF2-40B4-BE49-F238E27FC236}">
+                <a16:creationId xmlns:a16="http://schemas.microsoft.com/office/drawing/2014/main" id="{D221F5F8-1A4F-4314-936B-DBF26BF053B7}"/>
+              </a:ext>
+            </a:extLst>
+          </p:cNvPr>
+          <p:cNvSpPr txBox="1"/>
+          <p:nvPr/>
+        </p:nvSpPr>
+        <p:spPr>
+          <a:xfrm>
+            <a:off x="9568501" y="5502000"/>
+            <a:ext cx="301686" cy="369332"/>
+          </a:xfrm>
+          <a:prstGeom prst="rect">
+            <a:avLst/>
+          </a:prstGeom>
+          <a:noFill/>
+        </p:spPr>
+        <p:txBody>
+          <a:bodyPr wrap="none" rtlCol="0">
+            <a:spAutoFit/>
+          </a:bodyPr>
+          <a:lstStyle/>
+          <a:p>
+            <a:r>
+              <a:rPr lang="en-US" dirty="0">
+                <a:solidFill>
+                  <a:schemeClr val="accent1"/>
+                </a:solidFill>
+              </a:rPr>
+              <a:t>1</a:t>
+            </a:r>
+          </a:p>
+        </p:txBody>
+      </p:sp>
+      <p:sp>
+        <p:nvSpPr>
+          <p:cNvPr id="144" name="TextBox 143">
+            <a:extLst>
+              <a:ext uri="{FF2B5EF4-FFF2-40B4-BE49-F238E27FC236}">
+                <a16:creationId xmlns:a16="http://schemas.microsoft.com/office/drawing/2014/main" id="{1180450C-C504-4E4D-8D4B-A059916DBCFF}"/>
+              </a:ext>
+            </a:extLst>
+          </p:cNvPr>
+          <p:cNvSpPr txBox="1"/>
+          <p:nvPr/>
+        </p:nvSpPr>
+        <p:spPr>
+          <a:xfrm>
+            <a:off x="9901941" y="5683152"/>
+            <a:ext cx="405880" cy="338554"/>
+          </a:xfrm>
+          <a:prstGeom prst="rect">
+            <a:avLst/>
+          </a:prstGeom>
+          <a:noFill/>
+        </p:spPr>
+        <p:txBody>
+          <a:bodyPr wrap="none" rtlCol="0">
+            <a:spAutoFit/>
+          </a:bodyPr>
+          <a:lstStyle/>
+          <a:p>
+            <a:r>
+              <a:rPr lang="en-US" sz="1600" b="1" dirty="0">
+                <a:solidFill>
+                  <a:schemeClr val="accent2"/>
+                </a:solidFill>
+              </a:rPr>
+              <a:t>PK</a:t>
+            </a:r>
+          </a:p>
+        </p:txBody>
+      </p:sp>
+      <p:cxnSp>
+        <p:nvCxnSpPr>
+          <p:cNvPr id="8" name="Straight Connector 7">
+            <a:extLst>
+              <a:ext uri="{FF2B5EF4-FFF2-40B4-BE49-F238E27FC236}">
+                <a16:creationId xmlns:a16="http://schemas.microsoft.com/office/drawing/2014/main" id="{54C84E59-E627-4DFC-829C-65034F8B2976}"/>
+              </a:ext>
+            </a:extLst>
+          </p:cNvPr>
+          <p:cNvCxnSpPr>
+            <a:cxnSpLocks/>
+            <a:stCxn id="51" idx="3"/>
+            <a:endCxn id="124" idx="0"/>
+          </p:cNvCxnSpPr>
+          <p:nvPr/>
+        </p:nvCxnSpPr>
+        <p:spPr>
+          <a:xfrm>
+            <a:off x="7214378" y="979905"/>
+            <a:ext cx="3612299" cy="301193"/>
+          </a:xfrm>
+          <a:prstGeom prst="line">
+            <a:avLst/>
+          </a:prstGeom>
         </p:spPr>
         <p:style>
           <a:lnRef idx="1">
@@ -3997,23 +5168,27 @@
       </p:cxnSp>
       <p:cxnSp>
         <p:nvCxnSpPr>
-          <p:cNvPr id="73" name="Straight Connector 72"/>
-          <p:cNvCxnSpPr/>
+          <p:cNvPr id="10" name="Straight Connector 9">
+            <a:extLst>
+              <a:ext uri="{FF2B5EF4-FFF2-40B4-BE49-F238E27FC236}">
+                <a16:creationId xmlns:a16="http://schemas.microsoft.com/office/drawing/2014/main" id="{4FF3E07E-700D-4346-AEC1-91DD8B1BEDA1}"/>
+              </a:ext>
+            </a:extLst>
+          </p:cNvPr>
+          <p:cNvCxnSpPr>
+            <a:stCxn id="61" idx="2"/>
+            <a:endCxn id="107" idx="1"/>
+          </p:cNvCxnSpPr>
           <p:nvPr/>
         </p:nvCxnSpPr>
         <p:spPr>
           <a:xfrm>
-            <a:off x="5955268" y="4592486"/>
-            <a:ext cx="1764407" cy="0"/>
+            <a:off x="1694601" y="3739068"/>
+            <a:ext cx="3614596" cy="1619917"/>
           </a:xfrm>
           <a:prstGeom prst="line">
             <a:avLst/>
           </a:prstGeom>
-          <a:ln>
-            <a:solidFill>
-              <a:schemeClr val="tx1"/>
-            </a:solidFill>
-          </a:ln>
         </p:spPr>
         <p:style>
           <a:lnRef idx="1">
@@ -4030,16 +5205,101 @@
           </a:fontRef>
         </p:style>
       </p:cxnSp>
-      <p:sp>
-        <p:nvSpPr>
-          <p:cNvPr id="74" name="TextBox 73"/>
+      <p:cxnSp>
+        <p:nvCxnSpPr>
+          <p:cNvPr id="18" name="Straight Connector 17">
+            <a:extLst>
+              <a:ext uri="{FF2B5EF4-FFF2-40B4-BE49-F238E27FC236}">
+                <a16:creationId xmlns:a16="http://schemas.microsoft.com/office/drawing/2014/main" id="{AB824854-7547-4B9F-B535-66720CCA6965}"/>
+              </a:ext>
+            </a:extLst>
+          </p:cNvPr>
+          <p:cNvCxnSpPr>
+            <a:cxnSpLocks/>
+            <a:endCxn id="137" idx="1"/>
+          </p:cNvCxnSpPr>
+          <p:nvPr/>
+        </p:nvCxnSpPr>
+        <p:spPr>
+          <a:xfrm>
+            <a:off x="7293060" y="5491314"/>
+            <a:ext cx="2637372" cy="439873"/>
+          </a:xfrm>
+          <a:prstGeom prst="line">
+            <a:avLst/>
+          </a:prstGeom>
+        </p:spPr>
+        <p:style>
+          <a:lnRef idx="1">
+            <a:schemeClr val="accent1"/>
+          </a:lnRef>
+          <a:fillRef idx="0">
+            <a:schemeClr val="accent1"/>
+          </a:fillRef>
+          <a:effectRef idx="0">
+            <a:schemeClr val="accent1"/>
+          </a:effectRef>
+          <a:fontRef idx="minor">
+            <a:schemeClr val="tx1"/>
+          </a:fontRef>
+        </p:style>
+      </p:cxnSp>
+      <p:cxnSp>
+        <p:nvCxnSpPr>
+          <p:cNvPr id="21" name="Straight Connector 20">
+            <a:extLst>
+              <a:ext uri="{FF2B5EF4-FFF2-40B4-BE49-F238E27FC236}">
+                <a16:creationId xmlns:a16="http://schemas.microsoft.com/office/drawing/2014/main" id="{9DA91D63-9578-4985-90E5-71AF92F8AE2F}"/>
+              </a:ext>
+            </a:extLst>
+          </p:cNvPr>
+          <p:cNvCxnSpPr>
+            <a:cxnSpLocks/>
+            <a:stCxn id="124" idx="2"/>
+            <a:endCxn id="53" idx="3"/>
+          </p:cNvCxnSpPr>
+          <p:nvPr/>
+        </p:nvCxnSpPr>
+        <p:spPr>
+          <a:xfrm flipH="1">
+            <a:off x="7269516" y="3082864"/>
+            <a:ext cx="3557161" cy="2112093"/>
+          </a:xfrm>
+          <a:prstGeom prst="line">
+            <a:avLst/>
+          </a:prstGeom>
+        </p:spPr>
+        <p:style>
+          <a:lnRef idx="1">
+            <a:schemeClr val="accent1"/>
+          </a:lnRef>
+          <a:fillRef idx="0">
+            <a:schemeClr val="accent1"/>
+          </a:fillRef>
+          <a:effectRef idx="0">
+            <a:schemeClr val="accent1"/>
+          </a:effectRef>
+          <a:fontRef idx="minor">
+            <a:schemeClr val="tx1"/>
+          </a:fontRef>
+        </p:style>
+      </p:cxnSp>
+      <p:sp>
+        <p:nvSpPr>
+          <p:cNvPr id="146" name="TextBox 145">
+            <a:extLst>
+              <a:ext uri="{FF2B5EF4-FFF2-40B4-BE49-F238E27FC236}">
+                <a16:creationId xmlns:a16="http://schemas.microsoft.com/office/drawing/2014/main" id="{1EF851A9-999F-4C39-A576-032ACBB936FA}"/>
+              </a:ext>
+            </a:extLst>
+          </p:cNvPr>
           <p:cNvSpPr txBox="1"/>
           <p:nvPr/>
         </p:nvSpPr>
         <p:spPr>
           <a:xfrm>
-            <a:off x="3567083" y="1093040"/>
-            <a:ext cx="1231299" cy="369332"/>
+            <a:off x="1556991" y="904664"/>
+            <a:ext cx="301686" cy="369332"/>
           </a:xfrm>
           <a:prstGeom prst="rect">
             <a:avLst/>
@@ -4053,488 +5313,31 @@
           <a:lstStyle/>
           <a:p>
             <a:r>
-              <a:rPr lang="en-US" dirty="0" smtClean="0"/>
-              <a:t>first_name</a:t>
-            </a:r>
-            <a:endParaRPr lang="en-US" dirty="0"/>
-          </a:p>
-        </p:txBody>
-      </p:sp>
-      <p:sp>
-        <p:nvSpPr>
-          <p:cNvPr id="75" name="TextBox 74"/>
-          <p:cNvSpPr txBox="1"/>
-          <p:nvPr/>
-        </p:nvSpPr>
-        <p:spPr>
-          <a:xfrm>
-            <a:off x="3554818" y="1350878"/>
-            <a:ext cx="1159933" cy="369332"/>
-          </a:xfrm>
-          <a:prstGeom prst="rect">
-            <a:avLst/>
-          </a:prstGeom>
-          <a:noFill/>
-        </p:spPr>
-        <p:txBody>
-          <a:bodyPr wrap="none" rtlCol="0">
-            <a:spAutoFit/>
-          </a:bodyPr>
-          <a:lstStyle/>
-          <a:p>
-            <a:r>
-              <a:rPr lang="en-US" dirty="0" smtClean="0"/>
-              <a:t>last_name</a:t>
-            </a:r>
-            <a:endParaRPr lang="en-US" dirty="0"/>
-          </a:p>
-        </p:txBody>
-      </p:sp>
-      <p:sp>
-        <p:nvSpPr>
-          <p:cNvPr id="76" name="TextBox 75"/>
-          <p:cNvSpPr txBox="1"/>
-          <p:nvPr/>
-        </p:nvSpPr>
-        <p:spPr>
-          <a:xfrm>
-            <a:off x="6243812" y="1053320"/>
-            <a:ext cx="684675" cy="369332"/>
-          </a:xfrm>
-          <a:prstGeom prst="rect">
-            <a:avLst/>
-          </a:prstGeom>
-          <a:noFill/>
-        </p:spPr>
-        <p:txBody>
-          <a:bodyPr wrap="none" rtlCol="0">
-            <a:spAutoFit/>
-          </a:bodyPr>
-          <a:lstStyle/>
-          <a:p>
-            <a:r>
-              <a:rPr lang="en-US" dirty="0" smtClean="0"/>
-              <a:t>score</a:t>
-            </a:r>
-            <a:endParaRPr lang="en-US" dirty="0"/>
-          </a:p>
-        </p:txBody>
-      </p:sp>
-      <p:sp>
-        <p:nvSpPr>
-          <p:cNvPr id="77" name="TextBox 76"/>
-          <p:cNvSpPr txBox="1"/>
-          <p:nvPr/>
-        </p:nvSpPr>
-        <p:spPr>
-          <a:xfrm>
-            <a:off x="9512669" y="1051656"/>
-            <a:ext cx="559769" cy="369332"/>
-          </a:xfrm>
-          <a:prstGeom prst="rect">
-            <a:avLst/>
-          </a:prstGeom>
-          <a:noFill/>
-        </p:spPr>
-        <p:txBody>
-          <a:bodyPr wrap="none" rtlCol="0">
-            <a:spAutoFit/>
-          </a:bodyPr>
-          <a:lstStyle/>
-          <a:p>
-            <a:r>
-              <a:rPr lang="en-US" dirty="0" smtClean="0"/>
-              <a:t>title</a:t>
-            </a:r>
-            <a:endParaRPr lang="en-US" dirty="0"/>
-          </a:p>
-        </p:txBody>
-      </p:sp>
-      <p:sp>
-        <p:nvSpPr>
-          <p:cNvPr id="78" name="TextBox 77"/>
-          <p:cNvSpPr txBox="1"/>
-          <p:nvPr/>
-        </p:nvSpPr>
-        <p:spPr>
-          <a:xfrm>
-            <a:off x="9543336" y="755280"/>
-            <a:ext cx="364202" cy="369332"/>
-          </a:xfrm>
-          <a:prstGeom prst="rect">
-            <a:avLst/>
-          </a:prstGeom>
-          <a:noFill/>
-        </p:spPr>
-        <p:txBody>
-          <a:bodyPr wrap="none" rtlCol="0">
-            <a:spAutoFit/>
-          </a:bodyPr>
-          <a:lstStyle/>
-          <a:p>
-            <a:r>
-              <a:rPr lang="en-US" b="1" dirty="0" smtClean="0"/>
-              <a:t>id</a:t>
-            </a:r>
-            <a:endParaRPr lang="en-US" b="1" dirty="0"/>
-          </a:p>
-        </p:txBody>
-      </p:sp>
-      <p:sp>
-        <p:nvSpPr>
-          <p:cNvPr id="79" name="TextBox 78"/>
-          <p:cNvSpPr txBox="1"/>
-          <p:nvPr/>
-        </p:nvSpPr>
-        <p:spPr>
-          <a:xfrm>
-            <a:off x="6287064" y="787274"/>
-            <a:ext cx="364202" cy="369332"/>
-          </a:xfrm>
-          <a:prstGeom prst="rect">
-            <a:avLst/>
-          </a:prstGeom>
-          <a:noFill/>
-        </p:spPr>
-        <p:txBody>
-          <a:bodyPr wrap="none" rtlCol="0">
-            <a:spAutoFit/>
-          </a:bodyPr>
-          <a:lstStyle/>
-          <a:p>
-            <a:r>
-              <a:rPr lang="en-US" b="1" dirty="0" smtClean="0"/>
-              <a:t>id</a:t>
-            </a:r>
-            <a:endParaRPr lang="en-US" b="1" dirty="0"/>
-          </a:p>
-        </p:txBody>
-      </p:sp>
-      <p:sp>
-        <p:nvSpPr>
-          <p:cNvPr id="80" name="TextBox 79"/>
-          <p:cNvSpPr txBox="1"/>
-          <p:nvPr/>
-        </p:nvSpPr>
-        <p:spPr>
-          <a:xfrm>
-            <a:off x="3598367" y="787274"/>
-            <a:ext cx="364202" cy="369332"/>
-          </a:xfrm>
-          <a:prstGeom prst="rect">
-            <a:avLst/>
-          </a:prstGeom>
-          <a:noFill/>
-        </p:spPr>
-        <p:txBody>
-          <a:bodyPr wrap="none" rtlCol="0">
-            <a:spAutoFit/>
-          </a:bodyPr>
-          <a:lstStyle/>
-          <a:p>
-            <a:r>
-              <a:rPr lang="en-US" b="1" dirty="0" smtClean="0"/>
-              <a:t>id</a:t>
-            </a:r>
-            <a:endParaRPr lang="en-US" b="1" dirty="0"/>
-          </a:p>
-        </p:txBody>
-      </p:sp>
-      <p:sp>
-        <p:nvSpPr>
-          <p:cNvPr id="81" name="TextBox 80"/>
-          <p:cNvSpPr txBox="1"/>
-          <p:nvPr/>
-        </p:nvSpPr>
-        <p:spPr>
-          <a:xfrm>
-            <a:off x="978566" y="800151"/>
-            <a:ext cx="364202" cy="369332"/>
-          </a:xfrm>
-          <a:prstGeom prst="rect">
-            <a:avLst/>
-          </a:prstGeom>
-          <a:noFill/>
-        </p:spPr>
-        <p:txBody>
-          <a:bodyPr wrap="none" rtlCol="0">
-            <a:spAutoFit/>
-          </a:bodyPr>
-          <a:lstStyle/>
-          <a:p>
-            <a:r>
-              <a:rPr lang="en-US" b="1" dirty="0" smtClean="0"/>
-              <a:t>id</a:t>
-            </a:r>
-            <a:endParaRPr lang="en-US" b="1" dirty="0"/>
-          </a:p>
-        </p:txBody>
-      </p:sp>
-      <p:sp>
-        <p:nvSpPr>
-          <p:cNvPr id="82" name="TextBox 81"/>
-          <p:cNvSpPr txBox="1"/>
-          <p:nvPr/>
-        </p:nvSpPr>
-        <p:spPr>
-          <a:xfrm>
-            <a:off x="923618" y="1111784"/>
-            <a:ext cx="716863" cy="369332"/>
-          </a:xfrm>
-          <a:prstGeom prst="rect">
-            <a:avLst/>
-          </a:prstGeom>
-          <a:noFill/>
-        </p:spPr>
-        <p:txBody>
-          <a:bodyPr wrap="none" rtlCol="0">
-            <a:spAutoFit/>
-          </a:bodyPr>
-          <a:lstStyle/>
-          <a:p>
-            <a:r>
-              <a:rPr lang="en-US" dirty="0" smtClean="0"/>
-              <a:t>name</a:t>
-            </a:r>
-            <a:endParaRPr lang="en-US" dirty="0"/>
-          </a:p>
-        </p:txBody>
-      </p:sp>
-      <p:sp>
-        <p:nvSpPr>
-          <p:cNvPr id="83" name="TextBox 82"/>
-          <p:cNvSpPr txBox="1"/>
-          <p:nvPr/>
-        </p:nvSpPr>
-        <p:spPr>
-          <a:xfrm>
-            <a:off x="6333794" y="5032084"/>
-            <a:ext cx="559769" cy="369332"/>
-          </a:xfrm>
-          <a:prstGeom prst="rect">
-            <a:avLst/>
-          </a:prstGeom>
-          <a:noFill/>
-        </p:spPr>
-        <p:txBody>
-          <a:bodyPr wrap="none" rtlCol="0">
-            <a:spAutoFit/>
-          </a:bodyPr>
-          <a:lstStyle/>
-          <a:p>
-            <a:r>
-              <a:rPr lang="en-US" dirty="0" smtClean="0"/>
-              <a:t>title</a:t>
-            </a:r>
-            <a:endParaRPr lang="en-US" dirty="0"/>
-          </a:p>
-        </p:txBody>
-      </p:sp>
-      <p:sp>
-        <p:nvSpPr>
-          <p:cNvPr id="84" name="TextBox 83"/>
-          <p:cNvSpPr txBox="1"/>
-          <p:nvPr/>
-        </p:nvSpPr>
-        <p:spPr>
-          <a:xfrm>
-            <a:off x="6386433" y="4673967"/>
-            <a:ext cx="364202" cy="369332"/>
-          </a:xfrm>
-          <a:prstGeom prst="rect">
-            <a:avLst/>
-          </a:prstGeom>
-          <a:noFill/>
-        </p:spPr>
-        <p:txBody>
-          <a:bodyPr wrap="none" rtlCol="0">
-            <a:spAutoFit/>
-          </a:bodyPr>
-          <a:lstStyle/>
-          <a:p>
-            <a:r>
-              <a:rPr lang="en-US" b="1" dirty="0" smtClean="0"/>
-              <a:t>id</a:t>
-            </a:r>
-            <a:endParaRPr lang="en-US" b="1" dirty="0"/>
-          </a:p>
-        </p:txBody>
-      </p:sp>
-      <p:sp>
-        <p:nvSpPr>
-          <p:cNvPr id="85" name="TextBox 84"/>
-          <p:cNvSpPr txBox="1"/>
-          <p:nvPr/>
-        </p:nvSpPr>
-        <p:spPr>
-          <a:xfrm>
-            <a:off x="3567083" y="1608716"/>
-            <a:ext cx="485774" cy="369332"/>
-          </a:xfrm>
-          <a:prstGeom prst="rect">
-            <a:avLst/>
-          </a:prstGeom>
-          <a:noFill/>
-        </p:spPr>
-        <p:txBody>
-          <a:bodyPr wrap="none" rtlCol="0">
-            <a:spAutoFit/>
-          </a:bodyPr>
-          <a:lstStyle/>
-          <a:p>
-            <a:r>
-              <a:rPr lang="en-US" dirty="0" smtClean="0"/>
-              <a:t>sex</a:t>
-            </a:r>
-            <a:endParaRPr lang="en-US" dirty="0"/>
-          </a:p>
-        </p:txBody>
-      </p:sp>
-      <p:sp>
-        <p:nvSpPr>
-          <p:cNvPr id="86" name="TextBox 85"/>
-          <p:cNvSpPr txBox="1"/>
-          <p:nvPr/>
-        </p:nvSpPr>
-        <p:spPr>
-          <a:xfrm>
-            <a:off x="998712" y="4769421"/>
-            <a:ext cx="364202" cy="369332"/>
-          </a:xfrm>
-          <a:prstGeom prst="rect">
-            <a:avLst/>
-          </a:prstGeom>
-          <a:noFill/>
-        </p:spPr>
-        <p:txBody>
-          <a:bodyPr wrap="none" rtlCol="0">
-            <a:spAutoFit/>
-          </a:bodyPr>
-          <a:lstStyle/>
-          <a:p>
-            <a:r>
-              <a:rPr lang="en-US" b="1" dirty="0" smtClean="0"/>
-              <a:t>id</a:t>
-            </a:r>
-            <a:endParaRPr lang="en-US" b="1" dirty="0"/>
-          </a:p>
-        </p:txBody>
-      </p:sp>
-      <p:sp>
-        <p:nvSpPr>
-          <p:cNvPr id="87" name="TextBox 86"/>
-          <p:cNvSpPr txBox="1"/>
-          <p:nvPr/>
-        </p:nvSpPr>
-        <p:spPr>
-          <a:xfrm>
-            <a:off x="1006003" y="5090145"/>
-            <a:ext cx="716863" cy="369332"/>
-          </a:xfrm>
-          <a:prstGeom prst="rect">
-            <a:avLst/>
-          </a:prstGeom>
-          <a:noFill/>
-        </p:spPr>
-        <p:txBody>
-          <a:bodyPr wrap="none" rtlCol="0">
-            <a:spAutoFit/>
-          </a:bodyPr>
-          <a:lstStyle/>
-          <a:p>
-            <a:r>
-              <a:rPr lang="en-US" smtClean="0"/>
-              <a:t>name</a:t>
-            </a:r>
-            <a:endParaRPr lang="en-US" dirty="0"/>
-          </a:p>
-        </p:txBody>
-      </p:sp>
-      <p:sp>
-        <p:nvSpPr>
-          <p:cNvPr id="88" name="TextBox 87"/>
-          <p:cNvSpPr txBox="1"/>
-          <p:nvPr/>
-        </p:nvSpPr>
-        <p:spPr>
-          <a:xfrm>
-            <a:off x="2456749" y="895546"/>
-            <a:ext cx="301686" cy="369332"/>
-          </a:xfrm>
-          <a:prstGeom prst="rect">
-            <a:avLst/>
-          </a:prstGeom>
-          <a:noFill/>
-        </p:spPr>
-        <p:txBody>
-          <a:bodyPr wrap="none" rtlCol="0">
-            <a:spAutoFit/>
-          </a:bodyPr>
-          <a:lstStyle/>
-          <a:p>
-            <a:r>
-              <a:rPr lang="en-US" dirty="0" smtClean="0">
-                <a:solidFill>
-                  <a:schemeClr val="accent1"/>
-                </a:solidFill>
-              </a:rPr>
-              <a:t>1</a:t>
-            </a:r>
-            <a:endParaRPr lang="en-US" dirty="0">
-              <a:solidFill>
-                <a:schemeClr val="accent1"/>
-              </a:solidFill>
-            </a:endParaRPr>
-          </a:p>
-        </p:txBody>
-      </p:sp>
-      <p:sp>
-        <p:nvSpPr>
-          <p:cNvPr id="89" name="TextBox 88"/>
-          <p:cNvSpPr txBox="1"/>
-          <p:nvPr/>
-        </p:nvSpPr>
-        <p:spPr>
-          <a:xfrm>
-            <a:off x="2948059" y="933147"/>
-            <a:ext cx="301686" cy="369332"/>
-          </a:xfrm>
-          <a:prstGeom prst="rect">
-            <a:avLst/>
-          </a:prstGeom>
-          <a:noFill/>
-        </p:spPr>
-        <p:txBody>
-          <a:bodyPr wrap="none" rtlCol="0">
-            <a:spAutoFit/>
-          </a:bodyPr>
-          <a:lstStyle/>
-          <a:p>
-            <a:r>
-              <a:rPr lang="en-US" dirty="0" smtClean="0">
+              <a:rPr lang="en-US" dirty="0">
                 <a:solidFill>
                   <a:schemeClr val="accent1"/>
                 </a:solidFill>
               </a:rPr>
               <a:t>*</a:t>
             </a:r>
-            <a:endParaRPr lang="en-US" dirty="0">
-              <a:solidFill>
-                <a:schemeClr val="accent1"/>
-              </a:solidFill>
-            </a:endParaRPr>
-          </a:p>
-        </p:txBody>
-      </p:sp>
-      <p:sp>
-        <p:nvSpPr>
-          <p:cNvPr id="90" name="TextBox 89"/>
+          </a:p>
+        </p:txBody>
+      </p:sp>
+      <p:sp>
+        <p:nvSpPr>
+          <p:cNvPr id="147" name="TextBox 146">
+            <a:extLst>
+              <a:ext uri="{FF2B5EF4-FFF2-40B4-BE49-F238E27FC236}">
+                <a16:creationId xmlns:a16="http://schemas.microsoft.com/office/drawing/2014/main" id="{9E2BC56C-4D3B-4EEB-832D-452DE585FA99}"/>
+              </a:ext>
+            </a:extLst>
+          </p:cNvPr>
           <p:cNvSpPr txBox="1"/>
           <p:nvPr/>
         </p:nvSpPr>
         <p:spPr>
           <a:xfrm>
-            <a:off x="5149269" y="878302"/>
+            <a:off x="7319175" y="5607115"/>
             <a:ext cx="301686" cy="369332"/>
           </a:xfrm>
           <a:prstGeom prst="rect">
@@ -4549,68 +5352,31 @@
           <a:lstStyle/>
           <a:p>
             <a:r>
-              <a:rPr lang="en-US" dirty="0" smtClean="0">
-                <a:solidFill>
-                  <a:schemeClr val="accent1"/>
-                </a:solidFill>
-              </a:rPr>
-              <a:t>1</a:t>
-            </a:r>
-            <a:endParaRPr lang="en-US" dirty="0">
-              <a:solidFill>
-                <a:schemeClr val="accent1"/>
-              </a:solidFill>
-            </a:endParaRPr>
-          </a:p>
-        </p:txBody>
-      </p:sp>
-      <p:sp>
-        <p:nvSpPr>
-          <p:cNvPr id="91" name="TextBox 90"/>
-          <p:cNvSpPr txBox="1"/>
-          <p:nvPr/>
-        </p:nvSpPr>
-        <p:spPr>
-          <a:xfrm>
-            <a:off x="5640579" y="915903"/>
-            <a:ext cx="301686" cy="369332"/>
-          </a:xfrm>
-          <a:prstGeom prst="rect">
-            <a:avLst/>
-          </a:prstGeom>
-          <a:noFill/>
-        </p:spPr>
-        <p:txBody>
-          <a:bodyPr wrap="none" rtlCol="0">
-            <a:spAutoFit/>
-          </a:bodyPr>
-          <a:lstStyle/>
-          <a:p>
-            <a:r>
-              <a:rPr lang="en-US" dirty="0" smtClean="0">
+              <a:rPr lang="en-US" dirty="0">
                 <a:solidFill>
                   <a:schemeClr val="accent1"/>
                 </a:solidFill>
               </a:rPr>
               <a:t>*</a:t>
             </a:r>
-            <a:endParaRPr lang="en-US" dirty="0">
-              <a:solidFill>
-                <a:schemeClr val="accent1"/>
-              </a:solidFill>
-            </a:endParaRPr>
-          </a:p>
-        </p:txBody>
-      </p:sp>
-      <p:sp>
-        <p:nvSpPr>
-          <p:cNvPr id="92" name="TextBox 91"/>
+          </a:p>
+        </p:txBody>
+      </p:sp>
+      <p:sp>
+        <p:nvSpPr>
+          <p:cNvPr id="148" name="TextBox 147">
+            <a:extLst>
+              <a:ext uri="{FF2B5EF4-FFF2-40B4-BE49-F238E27FC236}">
+                <a16:creationId xmlns:a16="http://schemas.microsoft.com/office/drawing/2014/main" id="{94CAB2BB-D64F-4241-91C4-F36DFB1030D1}"/>
+              </a:ext>
+            </a:extLst>
+          </p:cNvPr>
           <p:cNvSpPr txBox="1"/>
           <p:nvPr/>
         </p:nvSpPr>
         <p:spPr>
           <a:xfrm>
-            <a:off x="8899781" y="888691"/>
+            <a:off x="10740445" y="853129"/>
             <a:ext cx="301686" cy="369332"/>
           </a:xfrm>
           <a:prstGeom prst="rect">
@@ -4625,779 +5391,55 @@
           <a:lstStyle/>
           <a:p>
             <a:r>
-              <a:rPr lang="en-US" dirty="0" smtClean="0">
-                <a:solidFill>
-                  <a:schemeClr val="accent1"/>
-                </a:solidFill>
-              </a:rPr>
-              <a:t>1</a:t>
-            </a:r>
-            <a:endParaRPr lang="en-US" dirty="0">
-              <a:solidFill>
-                <a:schemeClr val="accent1"/>
-              </a:solidFill>
-            </a:endParaRPr>
-          </a:p>
-        </p:txBody>
-      </p:sp>
-      <p:sp>
-        <p:nvSpPr>
-          <p:cNvPr id="93" name="TextBox 92"/>
-          <p:cNvSpPr txBox="1"/>
-          <p:nvPr/>
-        </p:nvSpPr>
-        <p:spPr>
-          <a:xfrm>
-            <a:off x="7897559" y="927118"/>
-            <a:ext cx="301686" cy="369332"/>
-          </a:xfrm>
-          <a:prstGeom prst="rect">
-            <a:avLst/>
-          </a:prstGeom>
-          <a:noFill/>
-        </p:spPr>
-        <p:txBody>
-          <a:bodyPr wrap="none" rtlCol="0">
-            <a:spAutoFit/>
-          </a:bodyPr>
-          <a:lstStyle/>
-          <a:p>
-            <a:r>
-              <a:rPr lang="en-US" dirty="0" smtClean="0">
+              <a:rPr lang="en-US" dirty="0">
                 <a:solidFill>
                   <a:schemeClr val="accent1"/>
                 </a:solidFill>
               </a:rPr>
               <a:t>*</a:t>
             </a:r>
-            <a:endParaRPr lang="en-US" dirty="0">
-              <a:solidFill>
-                <a:schemeClr val="accent1"/>
-              </a:solidFill>
-            </a:endParaRPr>
-          </a:p>
-        </p:txBody>
-      </p:sp>
-      <p:sp>
-        <p:nvSpPr>
-          <p:cNvPr id="94" name="TextBox 93"/>
-          <p:cNvSpPr txBox="1"/>
-          <p:nvPr/>
-        </p:nvSpPr>
-        <p:spPr>
-          <a:xfrm>
-            <a:off x="6927562" y="3844734"/>
-            <a:ext cx="301686" cy="369332"/>
-          </a:xfrm>
-          <a:prstGeom prst="rect">
-            <a:avLst/>
-          </a:prstGeom>
-          <a:noFill/>
-        </p:spPr>
-        <p:txBody>
-          <a:bodyPr wrap="none" rtlCol="0">
-            <a:spAutoFit/>
-          </a:bodyPr>
-          <a:lstStyle/>
-          <a:p>
-            <a:r>
-              <a:rPr lang="en-US" dirty="0" smtClean="0">
-                <a:solidFill>
-                  <a:schemeClr val="accent1"/>
-                </a:solidFill>
-              </a:rPr>
-              <a:t>1</a:t>
-            </a:r>
-            <a:endParaRPr lang="en-US" dirty="0">
-              <a:solidFill>
-                <a:schemeClr val="accent1"/>
-              </a:solidFill>
-            </a:endParaRPr>
-          </a:p>
-        </p:txBody>
-      </p:sp>
-      <p:sp>
-        <p:nvSpPr>
-          <p:cNvPr id="95" name="TextBox 94"/>
-          <p:cNvSpPr txBox="1"/>
-          <p:nvPr/>
-        </p:nvSpPr>
-        <p:spPr>
-          <a:xfrm>
-            <a:off x="6909826" y="2690473"/>
-            <a:ext cx="301686" cy="369332"/>
-          </a:xfrm>
-          <a:prstGeom prst="rect">
-            <a:avLst/>
-          </a:prstGeom>
-          <a:noFill/>
-        </p:spPr>
-        <p:txBody>
-          <a:bodyPr wrap="none" rtlCol="0">
-            <a:spAutoFit/>
-          </a:bodyPr>
-          <a:lstStyle/>
-          <a:p>
-            <a:r>
-              <a:rPr lang="en-US" dirty="0" smtClean="0">
-                <a:solidFill>
-                  <a:schemeClr val="accent1"/>
-                </a:solidFill>
-              </a:rPr>
-              <a:t>*</a:t>
-            </a:r>
-            <a:endParaRPr lang="en-US" dirty="0">
-              <a:solidFill>
-                <a:schemeClr val="accent1"/>
-              </a:solidFill>
-            </a:endParaRPr>
-          </a:p>
-        </p:txBody>
-      </p:sp>
-      <p:sp>
-        <p:nvSpPr>
-          <p:cNvPr id="96" name="TextBox 95"/>
-          <p:cNvSpPr txBox="1"/>
-          <p:nvPr/>
-        </p:nvSpPr>
-        <p:spPr>
-          <a:xfrm>
-            <a:off x="1650748" y="2668822"/>
-            <a:ext cx="301686" cy="369332"/>
-          </a:xfrm>
-          <a:prstGeom prst="rect">
-            <a:avLst/>
-          </a:prstGeom>
-          <a:noFill/>
-        </p:spPr>
-        <p:txBody>
-          <a:bodyPr wrap="none" rtlCol="0">
-            <a:spAutoFit/>
-          </a:bodyPr>
-          <a:lstStyle/>
-          <a:p>
-            <a:r>
-              <a:rPr lang="en-US" dirty="0" smtClean="0">
-                <a:solidFill>
-                  <a:schemeClr val="accent1"/>
-                </a:solidFill>
-              </a:rPr>
-              <a:t>*</a:t>
-            </a:r>
-            <a:endParaRPr lang="en-US" dirty="0">
-              <a:solidFill>
-                <a:schemeClr val="accent1"/>
-              </a:solidFill>
-            </a:endParaRPr>
-          </a:p>
-        </p:txBody>
-      </p:sp>
-      <p:sp>
-        <p:nvSpPr>
-          <p:cNvPr id="97" name="TextBox 96"/>
-          <p:cNvSpPr txBox="1"/>
-          <p:nvPr/>
-        </p:nvSpPr>
-        <p:spPr>
-          <a:xfrm>
-            <a:off x="1667685" y="3821834"/>
-            <a:ext cx="301686" cy="369332"/>
-          </a:xfrm>
-          <a:prstGeom prst="rect">
-            <a:avLst/>
-          </a:prstGeom>
-          <a:noFill/>
-        </p:spPr>
-        <p:txBody>
-          <a:bodyPr wrap="none" rtlCol="0">
-            <a:spAutoFit/>
-          </a:bodyPr>
-          <a:lstStyle/>
-          <a:p>
-            <a:r>
-              <a:rPr lang="en-US" dirty="0" smtClean="0">
-                <a:solidFill>
-                  <a:schemeClr val="accent1"/>
-                </a:solidFill>
-              </a:rPr>
-              <a:t>1</a:t>
-            </a:r>
-            <a:endParaRPr lang="en-US" dirty="0">
-              <a:solidFill>
-                <a:schemeClr val="accent1"/>
-              </a:solidFill>
-            </a:endParaRPr>
-          </a:p>
-        </p:txBody>
-      </p:sp>
-      <p:sp>
-        <p:nvSpPr>
-          <p:cNvPr id="98" name="TextBox 97"/>
-          <p:cNvSpPr txBox="1"/>
-          <p:nvPr/>
-        </p:nvSpPr>
-        <p:spPr>
-          <a:xfrm>
-            <a:off x="577750" y="830929"/>
-            <a:ext cx="405880" cy="338554"/>
-          </a:xfrm>
-          <a:prstGeom prst="rect">
-            <a:avLst/>
-          </a:prstGeom>
-          <a:noFill/>
-        </p:spPr>
-        <p:txBody>
-          <a:bodyPr wrap="none" rtlCol="0">
-            <a:spAutoFit/>
-          </a:bodyPr>
-          <a:lstStyle/>
-          <a:p>
-            <a:r>
-              <a:rPr lang="en-US" sz="1600" b="1" dirty="0" smtClean="0">
-                <a:solidFill>
-                  <a:schemeClr val="accent2"/>
-                </a:solidFill>
-              </a:rPr>
-              <a:t>PK</a:t>
-            </a:r>
-            <a:endParaRPr lang="en-US" sz="1600" b="1" dirty="0">
-              <a:solidFill>
-                <a:schemeClr val="accent2"/>
-              </a:solidFill>
-            </a:endParaRPr>
-          </a:p>
-        </p:txBody>
-      </p:sp>
-      <p:sp>
-        <p:nvSpPr>
-          <p:cNvPr id="99" name="TextBox 98"/>
-          <p:cNvSpPr txBox="1"/>
-          <p:nvPr/>
-        </p:nvSpPr>
-        <p:spPr>
-          <a:xfrm>
-            <a:off x="587580" y="4800199"/>
-            <a:ext cx="405880" cy="338554"/>
-          </a:xfrm>
-          <a:prstGeom prst="rect">
-            <a:avLst/>
-          </a:prstGeom>
-          <a:noFill/>
-        </p:spPr>
-        <p:txBody>
-          <a:bodyPr wrap="none" rtlCol="0">
-            <a:spAutoFit/>
-          </a:bodyPr>
-          <a:lstStyle/>
-          <a:p>
-            <a:r>
-              <a:rPr lang="en-US" sz="1600" b="1" dirty="0" smtClean="0">
-                <a:solidFill>
-                  <a:schemeClr val="accent2"/>
-                </a:solidFill>
-              </a:rPr>
-              <a:t>PK</a:t>
-            </a:r>
-            <a:endParaRPr lang="en-US" sz="1600" b="1" dirty="0">
-              <a:solidFill>
-                <a:schemeClr val="accent2"/>
-              </a:solidFill>
-            </a:endParaRPr>
-          </a:p>
-        </p:txBody>
-      </p:sp>
-      <p:sp>
-        <p:nvSpPr>
-          <p:cNvPr id="100" name="TextBox 99"/>
-          <p:cNvSpPr txBox="1"/>
-          <p:nvPr/>
-        </p:nvSpPr>
-        <p:spPr>
-          <a:xfrm>
-            <a:off x="3273405" y="811222"/>
-            <a:ext cx="405880" cy="338554"/>
-          </a:xfrm>
-          <a:prstGeom prst="rect">
-            <a:avLst/>
-          </a:prstGeom>
-          <a:noFill/>
-        </p:spPr>
-        <p:txBody>
-          <a:bodyPr wrap="none" rtlCol="0">
-            <a:spAutoFit/>
-          </a:bodyPr>
-          <a:lstStyle/>
-          <a:p>
-            <a:r>
-              <a:rPr lang="en-US" sz="1600" b="1" dirty="0" smtClean="0">
-                <a:solidFill>
-                  <a:schemeClr val="accent2"/>
-                </a:solidFill>
-              </a:rPr>
-              <a:t>PK</a:t>
-            </a:r>
-            <a:endParaRPr lang="en-US" sz="1600" b="1" dirty="0">
-              <a:solidFill>
-                <a:schemeClr val="accent2"/>
-              </a:solidFill>
-            </a:endParaRPr>
-          </a:p>
-        </p:txBody>
-      </p:sp>
-      <p:sp>
-        <p:nvSpPr>
-          <p:cNvPr id="101" name="TextBox 100"/>
-          <p:cNvSpPr txBox="1"/>
-          <p:nvPr/>
-        </p:nvSpPr>
-        <p:spPr>
-          <a:xfrm>
-            <a:off x="5924503" y="821611"/>
-            <a:ext cx="405880" cy="338554"/>
-          </a:xfrm>
-          <a:prstGeom prst="rect">
-            <a:avLst/>
-          </a:prstGeom>
-          <a:noFill/>
-        </p:spPr>
-        <p:txBody>
-          <a:bodyPr wrap="none" rtlCol="0">
-            <a:spAutoFit/>
-          </a:bodyPr>
-          <a:lstStyle/>
-          <a:p>
-            <a:r>
-              <a:rPr lang="en-US" sz="1600" b="1" dirty="0" smtClean="0">
-                <a:solidFill>
-                  <a:schemeClr val="accent2"/>
-                </a:solidFill>
-              </a:rPr>
-              <a:t>PK</a:t>
-            </a:r>
-            <a:endParaRPr lang="en-US" sz="1600" b="1" dirty="0">
-              <a:solidFill>
-                <a:schemeClr val="accent2"/>
-              </a:solidFill>
-            </a:endParaRPr>
-          </a:p>
-        </p:txBody>
-      </p:sp>
-      <p:sp>
-        <p:nvSpPr>
-          <p:cNvPr id="102" name="TextBox 101"/>
-          <p:cNvSpPr txBox="1"/>
-          <p:nvPr/>
-        </p:nvSpPr>
-        <p:spPr>
-          <a:xfrm>
-            <a:off x="9188123" y="783421"/>
-            <a:ext cx="405880" cy="338554"/>
-          </a:xfrm>
-          <a:prstGeom prst="rect">
-            <a:avLst/>
-          </a:prstGeom>
-          <a:noFill/>
-        </p:spPr>
-        <p:txBody>
-          <a:bodyPr wrap="none" rtlCol="0">
-            <a:spAutoFit/>
-          </a:bodyPr>
-          <a:lstStyle/>
-          <a:p>
-            <a:r>
-              <a:rPr lang="en-US" sz="1600" b="1" dirty="0" smtClean="0">
-                <a:solidFill>
-                  <a:schemeClr val="accent2"/>
-                </a:solidFill>
-              </a:rPr>
-              <a:t>PK</a:t>
-            </a:r>
-            <a:endParaRPr lang="en-US" sz="1600" b="1" dirty="0">
-              <a:solidFill>
-                <a:schemeClr val="accent2"/>
-              </a:solidFill>
-            </a:endParaRPr>
-          </a:p>
-        </p:txBody>
-      </p:sp>
-      <p:sp>
-        <p:nvSpPr>
-          <p:cNvPr id="103" name="TextBox 102"/>
-          <p:cNvSpPr txBox="1"/>
-          <p:nvPr/>
-        </p:nvSpPr>
-        <p:spPr>
-          <a:xfrm>
-            <a:off x="6001050" y="4693530"/>
-            <a:ext cx="405880" cy="338554"/>
-          </a:xfrm>
-          <a:prstGeom prst="rect">
-            <a:avLst/>
-          </a:prstGeom>
-          <a:noFill/>
-        </p:spPr>
-        <p:txBody>
-          <a:bodyPr wrap="none" rtlCol="0">
-            <a:spAutoFit/>
-          </a:bodyPr>
-          <a:lstStyle/>
-          <a:p>
-            <a:r>
-              <a:rPr lang="en-US" sz="1600" b="1" dirty="0" smtClean="0">
-                <a:solidFill>
-                  <a:schemeClr val="accent2"/>
-                </a:solidFill>
-              </a:rPr>
-              <a:t>PK</a:t>
-            </a:r>
-            <a:endParaRPr lang="en-US" sz="1600" b="1" dirty="0">
-              <a:solidFill>
-                <a:schemeClr val="accent2"/>
-              </a:solidFill>
-            </a:endParaRPr>
-          </a:p>
-        </p:txBody>
-      </p:sp>
-      <p:sp>
-        <p:nvSpPr>
-          <p:cNvPr id="104" name="TextBox 103"/>
-          <p:cNvSpPr txBox="1"/>
-          <p:nvPr/>
-        </p:nvSpPr>
-        <p:spPr>
-          <a:xfrm>
-            <a:off x="936060" y="1617174"/>
-            <a:ext cx="1002069" cy="369332"/>
-          </a:xfrm>
-          <a:prstGeom prst="rect">
-            <a:avLst/>
-          </a:prstGeom>
-          <a:noFill/>
-        </p:spPr>
-        <p:txBody>
-          <a:bodyPr wrap="none" rtlCol="0">
-            <a:spAutoFit/>
-          </a:bodyPr>
-          <a:lstStyle/>
-          <a:p>
-            <a:r>
-              <a:rPr lang="en-US" dirty="0" smtClean="0"/>
-              <a:t>batch_id</a:t>
-            </a:r>
-            <a:endParaRPr lang="en-US" dirty="0"/>
-          </a:p>
-        </p:txBody>
-      </p:sp>
-      <p:sp>
-        <p:nvSpPr>
-          <p:cNvPr id="105" name="TextBox 104"/>
-          <p:cNvSpPr txBox="1"/>
-          <p:nvPr/>
-        </p:nvSpPr>
-        <p:spPr>
-          <a:xfrm>
-            <a:off x="619753" y="1623472"/>
-            <a:ext cx="391454" cy="338554"/>
-          </a:xfrm>
-          <a:prstGeom prst="rect">
-            <a:avLst/>
-          </a:prstGeom>
-          <a:noFill/>
-        </p:spPr>
-        <p:txBody>
-          <a:bodyPr wrap="none" rtlCol="0">
-            <a:spAutoFit/>
-          </a:bodyPr>
-          <a:lstStyle/>
-          <a:p>
-            <a:r>
-              <a:rPr lang="en-US" sz="1600" b="1" dirty="0" smtClean="0">
-                <a:solidFill>
-                  <a:srgbClr val="7030A0"/>
-                </a:solidFill>
-              </a:rPr>
-              <a:t>FK</a:t>
-            </a:r>
-            <a:endParaRPr lang="en-US" sz="1600" b="1" dirty="0">
-              <a:solidFill>
-                <a:srgbClr val="7030A0"/>
-              </a:solidFill>
-            </a:endParaRPr>
-          </a:p>
-        </p:txBody>
-      </p:sp>
-      <p:sp>
-        <p:nvSpPr>
-          <p:cNvPr id="106" name="TextBox 105"/>
-          <p:cNvSpPr txBox="1"/>
-          <p:nvPr/>
-        </p:nvSpPr>
-        <p:spPr>
-          <a:xfrm>
-            <a:off x="3674846" y="2113379"/>
-            <a:ext cx="915635" cy="369332"/>
-          </a:xfrm>
-          <a:prstGeom prst="rect">
-            <a:avLst/>
-          </a:prstGeom>
-          <a:noFill/>
-        </p:spPr>
-        <p:txBody>
-          <a:bodyPr wrap="none" rtlCol="0">
-            <a:spAutoFit/>
-          </a:bodyPr>
-          <a:lstStyle/>
-          <a:p>
-            <a:r>
-              <a:rPr lang="en-US" dirty="0" smtClean="0"/>
-              <a:t>class_id</a:t>
-            </a:r>
-            <a:endParaRPr lang="en-US" dirty="0"/>
-          </a:p>
-        </p:txBody>
-      </p:sp>
-      <p:sp>
-        <p:nvSpPr>
-          <p:cNvPr id="107" name="TextBox 106"/>
-          <p:cNvSpPr txBox="1"/>
-          <p:nvPr/>
-        </p:nvSpPr>
-        <p:spPr>
-          <a:xfrm>
-            <a:off x="3358539" y="2119677"/>
-            <a:ext cx="391454" cy="338554"/>
-          </a:xfrm>
-          <a:prstGeom prst="rect">
-            <a:avLst/>
-          </a:prstGeom>
-          <a:noFill/>
-        </p:spPr>
-        <p:txBody>
-          <a:bodyPr wrap="none" rtlCol="0">
-            <a:spAutoFit/>
-          </a:bodyPr>
-          <a:lstStyle/>
-          <a:p>
-            <a:r>
-              <a:rPr lang="en-US" sz="1600" b="1" dirty="0" smtClean="0">
-                <a:solidFill>
-                  <a:srgbClr val="7030A0"/>
-                </a:solidFill>
-              </a:rPr>
-              <a:t>FK</a:t>
-            </a:r>
-            <a:endParaRPr lang="en-US" sz="1600" b="1" dirty="0">
-              <a:solidFill>
-                <a:srgbClr val="7030A0"/>
-              </a:solidFill>
-            </a:endParaRPr>
-          </a:p>
-        </p:txBody>
-      </p:sp>
-      <p:sp>
-        <p:nvSpPr>
-          <p:cNvPr id="108" name="TextBox 107"/>
-          <p:cNvSpPr txBox="1"/>
-          <p:nvPr/>
-        </p:nvSpPr>
-        <p:spPr>
-          <a:xfrm>
-            <a:off x="6257853" y="1483685"/>
-            <a:ext cx="1194686" cy="369332"/>
-          </a:xfrm>
-          <a:prstGeom prst="rect">
-            <a:avLst/>
-          </a:prstGeom>
-          <a:noFill/>
-        </p:spPr>
-        <p:txBody>
-          <a:bodyPr wrap="none" rtlCol="0">
-            <a:spAutoFit/>
-          </a:bodyPr>
-          <a:lstStyle/>
-          <a:p>
-            <a:r>
-              <a:rPr lang="en-US" dirty="0" err="1" smtClean="0"/>
-              <a:t>student_id</a:t>
-            </a:r>
-            <a:endParaRPr lang="en-US" dirty="0"/>
-          </a:p>
-        </p:txBody>
-      </p:sp>
-      <p:sp>
-        <p:nvSpPr>
-          <p:cNvPr id="109" name="TextBox 108"/>
-          <p:cNvSpPr txBox="1"/>
-          <p:nvPr/>
-        </p:nvSpPr>
-        <p:spPr>
-          <a:xfrm>
-            <a:off x="5977770" y="1489361"/>
-            <a:ext cx="391454" cy="338554"/>
-          </a:xfrm>
-          <a:prstGeom prst="rect">
-            <a:avLst/>
-          </a:prstGeom>
-          <a:noFill/>
-        </p:spPr>
-        <p:txBody>
-          <a:bodyPr wrap="none" rtlCol="0">
-            <a:spAutoFit/>
-          </a:bodyPr>
-          <a:lstStyle/>
-          <a:p>
-            <a:r>
-              <a:rPr lang="en-US" sz="1600" b="1" dirty="0" smtClean="0">
-                <a:solidFill>
-                  <a:srgbClr val="7030A0"/>
-                </a:solidFill>
-              </a:rPr>
-              <a:t>FK</a:t>
-            </a:r>
-            <a:endParaRPr lang="en-US" sz="1600" b="1" dirty="0">
-              <a:solidFill>
-                <a:srgbClr val="7030A0"/>
-              </a:solidFill>
-            </a:endParaRPr>
-          </a:p>
-        </p:txBody>
-      </p:sp>
-      <p:sp>
-        <p:nvSpPr>
-          <p:cNvPr id="110" name="TextBox 109"/>
-          <p:cNvSpPr txBox="1"/>
-          <p:nvPr/>
-        </p:nvSpPr>
-        <p:spPr>
-          <a:xfrm>
-            <a:off x="6253182" y="1790609"/>
-            <a:ext cx="943848" cy="369332"/>
-          </a:xfrm>
-          <a:prstGeom prst="rect">
-            <a:avLst/>
-          </a:prstGeom>
-          <a:noFill/>
-        </p:spPr>
-        <p:txBody>
-          <a:bodyPr wrap="none" rtlCol="0">
-            <a:spAutoFit/>
-          </a:bodyPr>
-          <a:lstStyle/>
-          <a:p>
-            <a:r>
-              <a:rPr lang="en-US" dirty="0" err="1" smtClean="0"/>
-              <a:t>topic_id</a:t>
-            </a:r>
-            <a:endParaRPr lang="en-US" dirty="0"/>
-          </a:p>
-        </p:txBody>
-      </p:sp>
-      <p:sp>
-        <p:nvSpPr>
-          <p:cNvPr id="111" name="TextBox 110"/>
-          <p:cNvSpPr txBox="1"/>
-          <p:nvPr/>
-        </p:nvSpPr>
-        <p:spPr>
-          <a:xfrm>
-            <a:off x="5961902" y="1814011"/>
-            <a:ext cx="391454" cy="338554"/>
-          </a:xfrm>
-          <a:prstGeom prst="rect">
-            <a:avLst/>
-          </a:prstGeom>
-          <a:noFill/>
-        </p:spPr>
-        <p:txBody>
-          <a:bodyPr wrap="none" rtlCol="0">
-            <a:spAutoFit/>
-          </a:bodyPr>
-          <a:lstStyle/>
-          <a:p>
-            <a:r>
-              <a:rPr lang="en-US" sz="1600" b="1" dirty="0" smtClean="0">
-                <a:solidFill>
-                  <a:srgbClr val="7030A0"/>
-                </a:solidFill>
-              </a:rPr>
-              <a:t>FK</a:t>
-            </a:r>
-            <a:endParaRPr lang="en-US" sz="1600" b="1" dirty="0">
-              <a:solidFill>
-                <a:srgbClr val="7030A0"/>
-              </a:solidFill>
-            </a:endParaRPr>
-          </a:p>
-        </p:txBody>
-      </p:sp>
-      <p:sp>
-        <p:nvSpPr>
-          <p:cNvPr id="112" name="TextBox 111"/>
-          <p:cNvSpPr txBox="1"/>
-          <p:nvPr/>
-        </p:nvSpPr>
-        <p:spPr>
-          <a:xfrm>
-            <a:off x="6257853" y="2137900"/>
-            <a:ext cx="1510991" cy="369332"/>
-          </a:xfrm>
-          <a:prstGeom prst="rect">
-            <a:avLst/>
-          </a:prstGeom>
-          <a:noFill/>
-        </p:spPr>
-        <p:txBody>
-          <a:bodyPr wrap="none" rtlCol="0">
-            <a:spAutoFit/>
-          </a:bodyPr>
-          <a:lstStyle/>
-          <a:p>
-            <a:r>
-              <a:rPr lang="en-US" dirty="0" err="1" smtClean="0"/>
-              <a:t>exam_type_id</a:t>
-            </a:r>
-            <a:endParaRPr lang="en-US" dirty="0"/>
-          </a:p>
-        </p:txBody>
-      </p:sp>
-      <p:sp>
-        <p:nvSpPr>
-          <p:cNvPr id="113" name="TextBox 112"/>
-          <p:cNvSpPr txBox="1"/>
-          <p:nvPr/>
-        </p:nvSpPr>
-        <p:spPr>
-          <a:xfrm>
-            <a:off x="5953321" y="2167847"/>
-            <a:ext cx="391454" cy="338554"/>
-          </a:xfrm>
-          <a:prstGeom prst="rect">
-            <a:avLst/>
-          </a:prstGeom>
-          <a:noFill/>
-        </p:spPr>
-        <p:txBody>
-          <a:bodyPr wrap="none" rtlCol="0">
-            <a:spAutoFit/>
-          </a:bodyPr>
-          <a:lstStyle/>
-          <a:p>
-            <a:r>
-              <a:rPr lang="en-US" sz="1600" b="1" dirty="0" smtClean="0">
-                <a:solidFill>
-                  <a:srgbClr val="7030A0"/>
-                </a:solidFill>
-              </a:rPr>
-              <a:t>FK</a:t>
-            </a:r>
-            <a:endParaRPr lang="en-US" sz="1600" b="1" dirty="0">
-              <a:solidFill>
-                <a:srgbClr val="7030A0"/>
-              </a:solidFill>
-            </a:endParaRPr>
-          </a:p>
-        </p:txBody>
-      </p:sp>
+          </a:p>
+        </p:txBody>
+      </p:sp>
+      <p:cxnSp>
+        <p:nvCxnSpPr>
+          <p:cNvPr id="26" name="Straight Connector 25">
+            <a:extLst>
+              <a:ext uri="{FF2B5EF4-FFF2-40B4-BE49-F238E27FC236}">
+                <a16:creationId xmlns:a16="http://schemas.microsoft.com/office/drawing/2014/main" id="{25FE4D28-9332-416E-9C89-00779B2DDD78}"/>
+              </a:ext>
+            </a:extLst>
+          </p:cNvPr>
+          <p:cNvCxnSpPr>
+            <a:stCxn id="51" idx="2"/>
+            <a:endCxn id="53" idx="0"/>
+          </p:cNvCxnSpPr>
+          <p:nvPr/>
+        </p:nvCxnSpPr>
+        <p:spPr>
+          <a:xfrm flipH="1">
+            <a:off x="6308660" y="1891358"/>
+            <a:ext cx="4197" cy="2089277"/>
+          </a:xfrm>
+          <a:prstGeom prst="line">
+            <a:avLst/>
+          </a:prstGeom>
+        </p:spPr>
+        <p:style>
+          <a:lnRef idx="1">
+            <a:schemeClr val="accent1"/>
+          </a:lnRef>
+          <a:fillRef idx="0">
+            <a:schemeClr val="accent1"/>
+          </a:fillRef>
+          <a:effectRef idx="0">
+            <a:schemeClr val="accent1"/>
+          </a:effectRef>
+          <a:fontRef idx="minor">
+            <a:schemeClr val="tx1"/>
+          </a:fontRef>
+        </p:style>
+      </p:cxnSp>
     </p:spTree>
     <p:extLst>
       <p:ext uri="{BB962C8B-B14F-4D97-AF65-F5344CB8AC3E}">

</xml_diff>

<commit_message>
#9 ER Diagram Update
</commit_message>
<xml_diff>
--- a/docs/ER-DIAGRAM.pptx
+++ b/docs/ER-DIAGRAM.pptx
@@ -242,7 +242,7 @@
           <a:p>
             <a:fld id="{28BE630F-C39C-4DB9-8258-0B48CA067079}" type="datetimeFigureOut">
               <a:rPr lang="en-US" smtClean="0"/>
-              <a:t>11/26/2021</a:t>
+              <a:t>11/28/2021</a:t>
             </a:fld>
             <a:endParaRPr lang="en-US"/>
           </a:p>
@@ -410,7 +410,7 @@
           <a:p>
             <a:fld id="{28BE630F-C39C-4DB9-8258-0B48CA067079}" type="datetimeFigureOut">
               <a:rPr lang="en-US" smtClean="0"/>
-              <a:t>11/26/2021</a:t>
+              <a:t>11/28/2021</a:t>
             </a:fld>
             <a:endParaRPr lang="en-US"/>
           </a:p>
@@ -588,7 +588,7 @@
           <a:p>
             <a:fld id="{28BE630F-C39C-4DB9-8258-0B48CA067079}" type="datetimeFigureOut">
               <a:rPr lang="en-US" smtClean="0"/>
-              <a:t>11/26/2021</a:t>
+              <a:t>11/28/2021</a:t>
             </a:fld>
             <a:endParaRPr lang="en-US"/>
           </a:p>
@@ -756,7 +756,7 @@
           <a:p>
             <a:fld id="{28BE630F-C39C-4DB9-8258-0B48CA067079}" type="datetimeFigureOut">
               <a:rPr lang="en-US" smtClean="0"/>
-              <a:t>11/26/2021</a:t>
+              <a:t>11/28/2021</a:t>
             </a:fld>
             <a:endParaRPr lang="en-US"/>
           </a:p>
@@ -1001,7 +1001,7 @@
           <a:p>
             <a:fld id="{28BE630F-C39C-4DB9-8258-0B48CA067079}" type="datetimeFigureOut">
               <a:rPr lang="en-US" smtClean="0"/>
-              <a:t>11/26/2021</a:t>
+              <a:t>11/28/2021</a:t>
             </a:fld>
             <a:endParaRPr lang="en-US"/>
           </a:p>
@@ -1230,7 +1230,7 @@
           <a:p>
             <a:fld id="{28BE630F-C39C-4DB9-8258-0B48CA067079}" type="datetimeFigureOut">
               <a:rPr lang="en-US" smtClean="0"/>
-              <a:t>11/26/2021</a:t>
+              <a:t>11/28/2021</a:t>
             </a:fld>
             <a:endParaRPr lang="en-US"/>
           </a:p>
@@ -1594,7 +1594,7 @@
           <a:p>
             <a:fld id="{28BE630F-C39C-4DB9-8258-0B48CA067079}" type="datetimeFigureOut">
               <a:rPr lang="en-US" smtClean="0"/>
-              <a:t>11/26/2021</a:t>
+              <a:t>11/28/2021</a:t>
             </a:fld>
             <a:endParaRPr lang="en-US"/>
           </a:p>
@@ -1711,7 +1711,7 @@
           <a:p>
             <a:fld id="{28BE630F-C39C-4DB9-8258-0B48CA067079}" type="datetimeFigureOut">
               <a:rPr lang="en-US" smtClean="0"/>
-              <a:t>11/26/2021</a:t>
+              <a:t>11/28/2021</a:t>
             </a:fld>
             <a:endParaRPr lang="en-US"/>
           </a:p>
@@ -1806,7 +1806,7 @@
           <a:p>
             <a:fld id="{28BE630F-C39C-4DB9-8258-0B48CA067079}" type="datetimeFigureOut">
               <a:rPr lang="en-US" smtClean="0"/>
-              <a:t>11/26/2021</a:t>
+              <a:t>11/28/2021</a:t>
             </a:fld>
             <a:endParaRPr lang="en-US"/>
           </a:p>
@@ -2081,7 +2081,7 @@
           <a:p>
             <a:fld id="{28BE630F-C39C-4DB9-8258-0B48CA067079}" type="datetimeFigureOut">
               <a:rPr lang="en-US" smtClean="0"/>
-              <a:t>11/26/2021</a:t>
+              <a:t>11/28/2021</a:t>
             </a:fld>
             <a:endParaRPr lang="en-US"/>
           </a:p>
@@ -2333,7 +2333,7 @@
           <a:p>
             <a:fld id="{28BE630F-C39C-4DB9-8258-0B48CA067079}" type="datetimeFigureOut">
               <a:rPr lang="en-US" smtClean="0"/>
-              <a:t>11/26/2021</a:t>
+              <a:t>11/28/2021</a:t>
             </a:fld>
             <a:endParaRPr lang="en-US"/>
           </a:p>
@@ -2544,7 +2544,7 @@
           <a:p>
             <a:fld id="{28BE630F-C39C-4DB9-8258-0B48CA067079}" type="datetimeFigureOut">
               <a:rPr lang="en-US" smtClean="0"/>
-              <a:t>11/26/2021</a:t>
+              <a:t>11/28/2021</a:t>
             </a:fld>
             <a:endParaRPr lang="en-US"/>
           </a:p>
@@ -3212,8 +3212,8 @@
         </p:nvSpPr>
         <p:spPr>
           <a:xfrm>
-            <a:off x="5411335" y="68451"/>
-            <a:ext cx="1803043" cy="1822907"/>
+            <a:off x="5411335" y="598538"/>
+            <a:ext cx="1803043" cy="2358069"/>
           </a:xfrm>
           <a:prstGeom prst="rect">
             <a:avLst/>
@@ -3250,7 +3250,7 @@
         </p:nvSpPr>
         <p:spPr>
           <a:xfrm>
-            <a:off x="5892708" y="158605"/>
+            <a:off x="5892708" y="688692"/>
             <a:ext cx="712439" cy="369332"/>
           </a:xfrm>
           <a:prstGeom prst="rect">
@@ -3279,8 +3279,8 @@
         </p:nvSpPr>
         <p:spPr>
           <a:xfrm>
-            <a:off x="5347804" y="3980635"/>
-            <a:ext cx="1921712" cy="2428643"/>
+            <a:off x="5347804" y="3490303"/>
+            <a:ext cx="1921712" cy="3121422"/>
           </a:xfrm>
           <a:prstGeom prst="rect">
             <a:avLst/>
@@ -3317,7 +3317,7 @@
         </p:nvSpPr>
         <p:spPr>
           <a:xfrm>
-            <a:off x="5829177" y="4070789"/>
+            <a:off x="5829177" y="3580457"/>
             <a:ext cx="806054" cy="369332"/>
           </a:xfrm>
           <a:prstGeom prst="rect">
@@ -3346,8 +3346,8 @@
         </p:nvSpPr>
         <p:spPr>
           <a:xfrm>
-            <a:off x="630766" y="1234051"/>
-            <a:ext cx="2127669" cy="2505017"/>
+            <a:off x="630766" y="1764138"/>
+            <a:ext cx="2127669" cy="1848813"/>
           </a:xfrm>
           <a:prstGeom prst="rect">
             <a:avLst/>
@@ -3384,7 +3384,7 @@
         </p:nvSpPr>
         <p:spPr>
           <a:xfrm>
-            <a:off x="1174014" y="1337084"/>
+            <a:off x="1174014" y="1867171"/>
             <a:ext cx="1332096" cy="369332"/>
           </a:xfrm>
           <a:prstGeom prst="rect">
@@ -3411,14 +3411,14 @@
           <p:cNvCxnSpPr>
             <a:cxnSpLocks/>
             <a:stCxn id="51" idx="1"/>
-            <a:endCxn id="61" idx="0"/>
+            <a:endCxn id="61" idx="3"/>
           </p:cNvCxnSpPr>
           <p:nvPr/>
         </p:nvCxnSpPr>
         <p:spPr>
           <a:xfrm flipH="1">
-            <a:off x="1694601" y="979905"/>
-            <a:ext cx="3716734" cy="254146"/>
+            <a:off x="2758435" y="1777573"/>
+            <a:ext cx="2652900" cy="910972"/>
           </a:xfrm>
           <a:prstGeom prst="line">
             <a:avLst/>
@@ -3448,7 +3448,7 @@
         </p:nvCxnSpPr>
         <p:spPr>
           <a:xfrm>
-            <a:off x="5432235" y="549540"/>
+            <a:off x="5432235" y="1079627"/>
             <a:ext cx="1764407" cy="0"/>
           </a:xfrm>
           <a:prstGeom prst="line">
@@ -3485,7 +3485,7 @@
         </p:nvCxnSpPr>
         <p:spPr>
           <a:xfrm>
-            <a:off x="5386440" y="4440121"/>
+            <a:off x="5386440" y="3949789"/>
             <a:ext cx="1883076" cy="0"/>
           </a:xfrm>
           <a:prstGeom prst="line">
@@ -3522,7 +3522,7 @@
         </p:nvCxnSpPr>
         <p:spPr>
           <a:xfrm>
-            <a:off x="650081" y="1706416"/>
+            <a:off x="650081" y="2236503"/>
             <a:ext cx="2108354" cy="0"/>
           </a:xfrm>
           <a:prstGeom prst="line">
@@ -3551,14 +3551,14 @@
       </p:cxnSp>
       <p:sp>
         <p:nvSpPr>
-          <p:cNvPr id="74" name="TextBox 73"/>
+          <p:cNvPr id="75" name="TextBox 74"/>
           <p:cNvSpPr txBox="1"/>
           <p:nvPr/>
         </p:nvSpPr>
         <p:spPr>
           <a:xfrm>
-            <a:off x="5625225" y="5165907"/>
-            <a:ext cx="907621" cy="369332"/>
+            <a:off x="5638826" y="4350219"/>
+            <a:ext cx="1353127" cy="369332"/>
           </a:xfrm>
           <a:prstGeom prst="rect">
             <a:avLst/>
@@ -3573,7 +3573,7 @@
           <a:p>
             <a:r>
               <a:rPr lang="en-US" dirty="0" err="1"/>
-              <a:t>User_id</a:t>
+              <a:t>Event_name</a:t>
             </a:r>
             <a:endParaRPr lang="en-US" dirty="0"/>
           </a:p>
@@ -3581,14 +3581,14 @@
       </p:sp>
       <p:sp>
         <p:nvSpPr>
-          <p:cNvPr id="75" name="TextBox 74"/>
+          <p:cNvPr id="80" name="TextBox 79"/>
           <p:cNvSpPr txBox="1"/>
           <p:nvPr/>
         </p:nvSpPr>
         <p:spPr>
           <a:xfrm>
-            <a:off x="5638826" y="4840551"/>
-            <a:ext cx="1353127" cy="369332"/>
+            <a:off x="5644275" y="4039521"/>
+            <a:ext cx="1009635" cy="369332"/>
           </a:xfrm>
           <a:prstGeom prst="rect">
             <a:avLst/>
@@ -3602,23 +3602,23 @@
           <a:lstStyle/>
           <a:p>
             <a:r>
-              <a:rPr lang="en-US" dirty="0" err="1"/>
-              <a:t>Event_name</a:t>
-            </a:r>
-            <a:endParaRPr lang="en-US" dirty="0"/>
-          </a:p>
-        </p:txBody>
-      </p:sp>
-      <p:sp>
-        <p:nvSpPr>
-          <p:cNvPr id="80" name="TextBox 79"/>
+              <a:rPr lang="en-US" b="1" dirty="0" err="1"/>
+              <a:t>Event_id</a:t>
+            </a:r>
+            <a:endParaRPr lang="en-US" b="1" dirty="0"/>
+          </a:p>
+        </p:txBody>
+      </p:sp>
+      <p:sp>
+        <p:nvSpPr>
+          <p:cNvPr id="81" name="TextBox 80"/>
           <p:cNvSpPr txBox="1"/>
           <p:nvPr/>
         </p:nvSpPr>
         <p:spPr>
           <a:xfrm>
-            <a:off x="5644275" y="4543105"/>
-            <a:ext cx="1009635" cy="369332"/>
+            <a:off x="5753931" y="1173885"/>
+            <a:ext cx="918841" cy="369332"/>
           </a:xfrm>
           <a:prstGeom prst="rect">
             <a:avLst/>
@@ -3633,7 +3633,7 @@
           <a:p>
             <a:r>
               <a:rPr lang="en-US" b="1" dirty="0" err="1"/>
-              <a:t>Event_id</a:t>
+              <a:t>User_id</a:t>
             </a:r>
             <a:endParaRPr lang="en-US" b="1" dirty="0"/>
           </a:p>
@@ -3641,14 +3641,14 @@
       </p:sp>
       <p:sp>
         <p:nvSpPr>
-          <p:cNvPr id="81" name="TextBox 80"/>
+          <p:cNvPr id="82" name="TextBox 81"/>
           <p:cNvSpPr txBox="1"/>
           <p:nvPr/>
         </p:nvSpPr>
         <p:spPr>
           <a:xfrm>
-            <a:off x="5753931" y="643798"/>
-            <a:ext cx="918841" cy="369332"/>
+            <a:off x="5744703" y="1485518"/>
+            <a:ext cx="1231299" cy="1477328"/>
           </a:xfrm>
           <a:prstGeom prst="rect">
             <a:avLst/>
@@ -3662,23 +3662,48 @@
           <a:lstStyle/>
           <a:p>
             <a:r>
-              <a:rPr lang="en-US" b="1" dirty="0" err="1"/>
-              <a:t>User_id</a:t>
-            </a:r>
-            <a:endParaRPr lang="en-US" b="1" dirty="0"/>
-          </a:p>
-        </p:txBody>
-      </p:sp>
-      <p:sp>
-        <p:nvSpPr>
-          <p:cNvPr id="82" name="TextBox 81"/>
+              <a:rPr lang="en-US" dirty="0" err="1"/>
+              <a:t>First_name</a:t>
+            </a:r>
+            <a:endParaRPr lang="en-US" dirty="0"/>
+          </a:p>
+          <a:p>
+            <a:r>
+              <a:rPr lang="en-US" dirty="0" err="1"/>
+              <a:t>Last_name</a:t>
+            </a:r>
+            <a:endParaRPr lang="en-US" dirty="0"/>
+          </a:p>
+          <a:p>
+            <a:r>
+              <a:rPr lang="en-US" dirty="0"/>
+              <a:t>Phone</a:t>
+            </a:r>
+          </a:p>
+          <a:p>
+            <a:r>
+              <a:rPr lang="en-US" dirty="0"/>
+              <a:t>Email</a:t>
+            </a:r>
+          </a:p>
+          <a:p>
+            <a:r>
+              <a:rPr lang="en-US" dirty="0"/>
+              <a:t>Password</a:t>
+            </a:r>
+          </a:p>
+        </p:txBody>
+      </p:sp>
+      <p:sp>
+        <p:nvSpPr>
+          <p:cNvPr id="86" name="TextBox 85"/>
           <p:cNvSpPr txBox="1"/>
           <p:nvPr/>
         </p:nvSpPr>
         <p:spPr>
           <a:xfrm>
-            <a:off x="5744703" y="955431"/>
-            <a:ext cx="1265090" cy="923330"/>
+            <a:off x="998712" y="2346758"/>
+            <a:ext cx="1627048" cy="369332"/>
           </a:xfrm>
           <a:prstGeom prst="rect">
             <a:avLst/>
@@ -3692,35 +3717,23 @@
           <a:lstStyle/>
           <a:p>
             <a:r>
-              <a:rPr lang="en-US" dirty="0" err="1"/>
-              <a:t>User_name</a:t>
-            </a:r>
-            <a:endParaRPr lang="en-US" dirty="0"/>
-          </a:p>
-          <a:p>
-            <a:r>
-              <a:rPr lang="en-US" dirty="0"/>
-              <a:t>Email</a:t>
-            </a:r>
-          </a:p>
-          <a:p>
-            <a:r>
-              <a:rPr lang="en-US" dirty="0"/>
-              <a:t>password</a:t>
-            </a:r>
-          </a:p>
-        </p:txBody>
-      </p:sp>
-      <p:sp>
-        <p:nvSpPr>
-          <p:cNvPr id="86" name="TextBox 85"/>
+              <a:rPr lang="en-US" b="1" dirty="0" err="1"/>
+              <a:t>Registration_id</a:t>
+            </a:r>
+            <a:endParaRPr lang="en-US" b="1" dirty="0"/>
+          </a:p>
+        </p:txBody>
+      </p:sp>
+      <p:sp>
+        <p:nvSpPr>
+          <p:cNvPr id="87" name="TextBox 86"/>
           <p:cNvSpPr txBox="1"/>
           <p:nvPr/>
         </p:nvSpPr>
         <p:spPr>
           <a:xfrm>
-            <a:off x="998712" y="1816671"/>
-            <a:ext cx="1627048" cy="369332"/>
+            <a:off x="5625574" y="5623291"/>
+            <a:ext cx="1076128" cy="369332"/>
           </a:xfrm>
           <a:prstGeom prst="rect">
             <a:avLst/>
@@ -3734,36 +3747,6 @@
           <a:lstStyle/>
           <a:p>
             <a:r>
-              <a:rPr lang="en-US" b="1" dirty="0" err="1"/>
-              <a:t>Registration_id</a:t>
-            </a:r>
-            <a:endParaRPr lang="en-US" b="1" dirty="0"/>
-          </a:p>
-        </p:txBody>
-      </p:sp>
-      <p:sp>
-        <p:nvSpPr>
-          <p:cNvPr id="87" name="TextBox 86"/>
-          <p:cNvSpPr txBox="1"/>
-          <p:nvPr/>
-        </p:nvSpPr>
-        <p:spPr>
-          <a:xfrm>
-            <a:off x="1001744" y="2388228"/>
-            <a:ext cx="1076128" cy="369332"/>
-          </a:xfrm>
-          <a:prstGeom prst="rect">
-            <a:avLst/>
-          </a:prstGeom>
-          <a:noFill/>
-        </p:spPr>
-        <p:txBody>
-          <a:bodyPr wrap="none" rtlCol="0">
-            <a:spAutoFit/>
-          </a:bodyPr>
-          <a:lstStyle/>
-          <a:p>
-            <a:r>
               <a:rPr lang="en-US" dirty="0" err="1"/>
               <a:t>End_date</a:t>
             </a:r>
@@ -3779,7 +3762,7 @@
         </p:nvSpPr>
         <p:spPr>
           <a:xfrm>
-            <a:off x="10854092" y="3039539"/>
+            <a:off x="10854092" y="3569626"/>
             <a:ext cx="301686" cy="369332"/>
           </a:xfrm>
           <a:prstGeom prst="rect">
@@ -3812,7 +3795,7 @@
         </p:nvSpPr>
         <p:spPr>
           <a:xfrm>
-            <a:off x="1576041" y="3795969"/>
+            <a:off x="1562789" y="3636942"/>
             <a:ext cx="301686" cy="369332"/>
           </a:xfrm>
           <a:prstGeom prst="rect">
@@ -3845,7 +3828,7 @@
         </p:nvSpPr>
         <p:spPr>
           <a:xfrm>
-            <a:off x="7214378" y="594617"/>
+            <a:off x="7214378" y="1124704"/>
             <a:ext cx="301686" cy="369332"/>
           </a:xfrm>
           <a:prstGeom prst="rect">
@@ -3878,7 +3861,7 @@
         </p:nvSpPr>
         <p:spPr>
           <a:xfrm>
-            <a:off x="5468223" y="706353"/>
+            <a:off x="5468223" y="1236440"/>
             <a:ext cx="301686" cy="369332"/>
           </a:xfrm>
           <a:prstGeom prst="rect">
@@ -3911,7 +3894,7 @@
         </p:nvSpPr>
         <p:spPr>
           <a:xfrm>
-            <a:off x="7279419" y="4785566"/>
+            <a:off x="7279419" y="4679547"/>
             <a:ext cx="301686" cy="369332"/>
           </a:xfrm>
           <a:prstGeom prst="rect">
@@ -3944,7 +3927,7 @@
         </p:nvSpPr>
         <p:spPr>
           <a:xfrm>
-            <a:off x="5040300" y="4888694"/>
+            <a:off x="5040300" y="4623646"/>
             <a:ext cx="301686" cy="369332"/>
           </a:xfrm>
           <a:prstGeom prst="rect">
@@ -3977,7 +3960,7 @@
         </p:nvSpPr>
         <p:spPr>
           <a:xfrm>
-            <a:off x="5353115" y="674576"/>
+            <a:off x="5353115" y="1204663"/>
             <a:ext cx="405880" cy="338554"/>
           </a:xfrm>
           <a:prstGeom prst="rect">
@@ -4010,7 +3993,7 @@
         </p:nvSpPr>
         <p:spPr>
           <a:xfrm>
-            <a:off x="587580" y="1847449"/>
+            <a:off x="587580" y="2377536"/>
             <a:ext cx="405880" cy="338554"/>
           </a:xfrm>
           <a:prstGeom prst="rect">
@@ -4043,7 +4026,7 @@
         </p:nvSpPr>
         <p:spPr>
           <a:xfrm>
-            <a:off x="5319313" y="4567053"/>
+            <a:off x="5319313" y="4063469"/>
             <a:ext cx="405880" cy="338554"/>
           </a:xfrm>
           <a:prstGeom prst="rect">
@@ -4064,39 +4047,6 @@
                 </a:solidFill>
               </a:rPr>
               <a:t>PK</a:t>
-            </a:r>
-          </a:p>
-        </p:txBody>
-      </p:sp>
-      <p:sp>
-        <p:nvSpPr>
-          <p:cNvPr id="107" name="TextBox 106"/>
-          <p:cNvSpPr txBox="1"/>
-          <p:nvPr/>
-        </p:nvSpPr>
-        <p:spPr>
-          <a:xfrm>
-            <a:off x="5309197" y="5189708"/>
-            <a:ext cx="391454" cy="338554"/>
-          </a:xfrm>
-          <a:prstGeom prst="rect">
-            <a:avLst/>
-          </a:prstGeom>
-          <a:noFill/>
-        </p:spPr>
-        <p:txBody>
-          <a:bodyPr wrap="none" rtlCol="0">
-            <a:spAutoFit/>
-          </a:bodyPr>
-          <a:lstStyle/>
-          <a:p>
-            <a:r>
-              <a:rPr lang="en-US" sz="1600" b="1" dirty="0">
-                <a:solidFill>
-                  <a:srgbClr val="7030A0"/>
-                </a:solidFill>
-              </a:rPr>
-              <a:t>FK</a:t>
             </a:r>
           </a:p>
         </p:txBody>
@@ -4115,7 +4065,7 @@
         </p:nvSpPr>
         <p:spPr>
           <a:xfrm>
-            <a:off x="994530" y="2111573"/>
+            <a:off x="5632870" y="5936285"/>
             <a:ext cx="1167884" cy="369332"/>
           </a:xfrm>
           <a:prstGeom prst="rect">
@@ -4151,8 +4101,8 @@
         </p:nvSpPr>
         <p:spPr>
           <a:xfrm>
-            <a:off x="1000894" y="2699017"/>
-            <a:ext cx="614271" cy="369332"/>
+            <a:off x="5625225" y="5020967"/>
+            <a:ext cx="1177310" cy="369332"/>
           </a:xfrm>
           <a:prstGeom prst="rect">
             <a:avLst/>
@@ -4166,9 +4116,10 @@
           <a:lstStyle/>
           <a:p>
             <a:r>
-              <a:rPr lang="en-US" dirty="0"/>
-              <a:t>time</a:t>
-            </a:r>
+              <a:rPr lang="en-US" dirty="0" err="1"/>
+              <a:t>Start_time</a:t>
+            </a:r>
+            <a:endParaRPr lang="en-US" dirty="0"/>
           </a:p>
         </p:txBody>
       </p:sp>
@@ -4186,7 +4137,7 @@
         </p:nvSpPr>
         <p:spPr>
           <a:xfrm>
-            <a:off x="1000894" y="2946677"/>
+            <a:off x="986475" y="2690427"/>
             <a:ext cx="907621" cy="369332"/>
           </a:xfrm>
           <a:prstGeom prst="rect">
@@ -4222,7 +4173,7 @@
         </p:nvSpPr>
         <p:spPr>
           <a:xfrm>
-            <a:off x="1000894" y="3214806"/>
+            <a:off x="999916" y="3003318"/>
             <a:ext cx="995657" cy="369332"/>
           </a:xfrm>
           <a:prstGeom prst="rect">
@@ -4258,7 +4209,7 @@
         </p:nvSpPr>
         <p:spPr>
           <a:xfrm>
-            <a:off x="581769" y="2962066"/>
+            <a:off x="579971" y="2712605"/>
             <a:ext cx="391454" cy="338554"/>
           </a:xfrm>
           <a:prstGeom prst="rect">
@@ -4297,7 +4248,7 @@
         </p:nvSpPr>
         <p:spPr>
           <a:xfrm>
-            <a:off x="574916" y="3245584"/>
+            <a:off x="574916" y="3033548"/>
             <a:ext cx="391454" cy="338554"/>
           </a:xfrm>
           <a:prstGeom prst="rect">
@@ -4336,7 +4287,7 @@
         </p:nvSpPr>
         <p:spPr>
           <a:xfrm>
-            <a:off x="9865821" y="1281098"/>
+            <a:off x="9865821" y="1811185"/>
             <a:ext cx="1921712" cy="1801766"/>
           </a:xfrm>
           <a:prstGeom prst="rect">
@@ -4380,7 +4331,7 @@
         </p:nvSpPr>
         <p:spPr>
           <a:xfrm>
-            <a:off x="10347194" y="1327709"/>
+            <a:off x="10347194" y="1857796"/>
             <a:ext cx="1185774" cy="369332"/>
           </a:xfrm>
           <a:prstGeom prst="rect">
@@ -4417,7 +4368,7 @@
         </p:nvCxnSpPr>
         <p:spPr>
           <a:xfrm>
-            <a:off x="9904457" y="1740583"/>
+            <a:off x="9904457" y="2270670"/>
             <a:ext cx="1873348" cy="0"/>
           </a:xfrm>
           <a:prstGeom prst="line">
@@ -4458,7 +4409,7 @@
         </p:nvSpPr>
         <p:spPr>
           <a:xfrm>
-            <a:off x="10162292" y="2580669"/>
+            <a:off x="10162292" y="3071000"/>
             <a:ext cx="907621" cy="369332"/>
           </a:xfrm>
           <a:prstGeom prst="rect">
@@ -4494,7 +4445,7 @@
         </p:nvSpPr>
         <p:spPr>
           <a:xfrm>
-            <a:off x="10137793" y="2198163"/>
+            <a:off x="10137793" y="2728250"/>
             <a:ext cx="1668790" cy="369332"/>
           </a:xfrm>
           <a:prstGeom prst="rect">
@@ -4530,7 +4481,7 @@
         </p:nvSpPr>
         <p:spPr>
           <a:xfrm>
-            <a:off x="10162292" y="1843567"/>
+            <a:off x="10162292" y="2373654"/>
             <a:ext cx="1327864" cy="369332"/>
           </a:xfrm>
           <a:prstGeom prst="rect">
@@ -4566,7 +4517,7 @@
         </p:nvSpPr>
         <p:spPr>
           <a:xfrm>
-            <a:off x="5118877" y="624199"/>
+            <a:off x="5118877" y="1154286"/>
             <a:ext cx="301686" cy="369332"/>
           </a:xfrm>
           <a:prstGeom prst="rect">
@@ -4605,7 +4556,7 @@
         </p:nvSpPr>
         <p:spPr>
           <a:xfrm>
-            <a:off x="9837330" y="1867515"/>
+            <a:off x="9837330" y="2424109"/>
             <a:ext cx="405880" cy="338554"/>
           </a:xfrm>
           <a:prstGeom prst="rect">
@@ -4644,7 +4595,7 @@
         </p:nvSpPr>
         <p:spPr>
           <a:xfrm>
-            <a:off x="9846264" y="2623520"/>
+            <a:off x="9846264" y="3087347"/>
             <a:ext cx="391454" cy="338554"/>
           </a:xfrm>
           <a:prstGeom prst="rect">
@@ -4683,7 +4634,7 @@
         </p:nvSpPr>
         <p:spPr>
           <a:xfrm>
-            <a:off x="5627430" y="5499697"/>
+            <a:off x="5627430" y="4704567"/>
             <a:ext cx="1311321" cy="369332"/>
           </a:xfrm>
           <a:prstGeom prst="rect">
@@ -4719,7 +4670,7 @@
         </p:nvSpPr>
         <p:spPr>
           <a:xfrm>
-            <a:off x="5298930" y="5512247"/>
+            <a:off x="5298930" y="4730370"/>
             <a:ext cx="391454" cy="338554"/>
           </a:xfrm>
           <a:prstGeom prst="rect">
@@ -4740,388 +4691,6 @@
                 </a:solidFill>
               </a:rPr>
               <a:t>FK</a:t>
-            </a:r>
-          </a:p>
-        </p:txBody>
-      </p:sp>
-      <p:sp>
-        <p:nvSpPr>
-          <p:cNvPr id="135" name="TextBox 134">
-            <a:extLst>
-              <a:ext uri="{FF2B5EF4-FFF2-40B4-BE49-F238E27FC236}">
-                <a16:creationId xmlns:a16="http://schemas.microsoft.com/office/drawing/2014/main" id="{8CA182A3-F970-4917-897B-4AF11FFBB7D1}"/>
-              </a:ext>
-            </a:extLst>
-          </p:cNvPr>
-          <p:cNvSpPr txBox="1"/>
-          <p:nvPr/>
-        </p:nvSpPr>
-        <p:spPr>
-          <a:xfrm>
-            <a:off x="5627430" y="5805379"/>
-            <a:ext cx="1272271" cy="369332"/>
-          </a:xfrm>
-          <a:prstGeom prst="rect">
-            <a:avLst/>
-          </a:prstGeom>
-          <a:noFill/>
-        </p:spPr>
-        <p:txBody>
-          <a:bodyPr wrap="none" rtlCol="0">
-            <a:spAutoFit/>
-          </a:bodyPr>
-          <a:lstStyle/>
-          <a:p>
-            <a:r>
-              <a:rPr lang="en-US" dirty="0" err="1"/>
-              <a:t>Location_id</a:t>
-            </a:r>
-            <a:endParaRPr lang="en-US" dirty="0"/>
-          </a:p>
-        </p:txBody>
-      </p:sp>
-      <p:sp>
-        <p:nvSpPr>
-          <p:cNvPr id="136" name="TextBox 135">
-            <a:extLst>
-              <a:ext uri="{FF2B5EF4-FFF2-40B4-BE49-F238E27FC236}">
-                <a16:creationId xmlns:a16="http://schemas.microsoft.com/office/drawing/2014/main" id="{B121F664-76DF-44CC-B912-FF525E1E7895}"/>
-              </a:ext>
-            </a:extLst>
-          </p:cNvPr>
-          <p:cNvSpPr txBox="1"/>
-          <p:nvPr/>
-        </p:nvSpPr>
-        <p:spPr>
-          <a:xfrm>
-            <a:off x="5296414" y="5816503"/>
-            <a:ext cx="391454" cy="338554"/>
-          </a:xfrm>
-          <a:prstGeom prst="rect">
-            <a:avLst/>
-          </a:prstGeom>
-          <a:noFill/>
-        </p:spPr>
-        <p:txBody>
-          <a:bodyPr wrap="none" rtlCol="0">
-            <a:spAutoFit/>
-          </a:bodyPr>
-          <a:lstStyle/>
-          <a:p>
-            <a:r>
-              <a:rPr lang="en-US" sz="1600" b="1" dirty="0">
-                <a:solidFill>
-                  <a:srgbClr val="7030A0"/>
-                </a:solidFill>
-              </a:rPr>
-              <a:t>FK</a:t>
-            </a:r>
-          </a:p>
-        </p:txBody>
-      </p:sp>
-      <p:sp>
-        <p:nvSpPr>
-          <p:cNvPr id="137" name="Rectangle 136">
-            <a:extLst>
-              <a:ext uri="{FF2B5EF4-FFF2-40B4-BE49-F238E27FC236}">
-                <a16:creationId xmlns:a16="http://schemas.microsoft.com/office/drawing/2014/main" id="{3E778F03-ED14-499B-88D2-A6D39D65D36E}"/>
-              </a:ext>
-            </a:extLst>
-          </p:cNvPr>
-          <p:cNvSpPr/>
-          <p:nvPr/>
-        </p:nvSpPr>
-        <p:spPr>
-          <a:xfrm>
-            <a:off x="9930432" y="5096735"/>
-            <a:ext cx="1921712" cy="1668904"/>
-          </a:xfrm>
-          <a:prstGeom prst="rect">
-            <a:avLst/>
-          </a:prstGeom>
-        </p:spPr>
-        <p:style>
-          <a:lnRef idx="2">
-            <a:schemeClr val="dk1"/>
-          </a:lnRef>
-          <a:fillRef idx="1">
-            <a:schemeClr val="lt1"/>
-          </a:fillRef>
-          <a:effectRef idx="0">
-            <a:schemeClr val="dk1"/>
-          </a:effectRef>
-          <a:fontRef idx="minor">
-            <a:schemeClr val="dk1"/>
-          </a:fontRef>
-        </p:style>
-        <p:txBody>
-          <a:bodyPr rtlCol="0" anchor="ctr"/>
-          <a:lstStyle/>
-          <a:p>
-            <a:pPr algn="ctr"/>
-            <a:endParaRPr lang="en-US"/>
-          </a:p>
-        </p:txBody>
-      </p:sp>
-      <p:sp>
-        <p:nvSpPr>
-          <p:cNvPr id="138" name="TextBox 137">
-            <a:extLst>
-              <a:ext uri="{FF2B5EF4-FFF2-40B4-BE49-F238E27FC236}">
-                <a16:creationId xmlns:a16="http://schemas.microsoft.com/office/drawing/2014/main" id="{413DED83-745C-494C-A21E-506411F8241F}"/>
-              </a:ext>
-            </a:extLst>
-          </p:cNvPr>
-          <p:cNvSpPr txBox="1"/>
-          <p:nvPr/>
-        </p:nvSpPr>
-        <p:spPr>
-          <a:xfrm>
-            <a:off x="10411805" y="5186888"/>
-            <a:ext cx="1086901" cy="369332"/>
-          </a:xfrm>
-          <a:prstGeom prst="rect">
-            <a:avLst/>
-          </a:prstGeom>
-          <a:noFill/>
-        </p:spPr>
-        <p:txBody>
-          <a:bodyPr wrap="none" rtlCol="0">
-            <a:spAutoFit/>
-          </a:bodyPr>
-          <a:lstStyle/>
-          <a:p>
-            <a:r>
-              <a:rPr lang="en-US" b="1" dirty="0"/>
-              <a:t>Locations</a:t>
-            </a:r>
-          </a:p>
-        </p:txBody>
-      </p:sp>
-      <p:cxnSp>
-        <p:nvCxnSpPr>
-          <p:cNvPr id="139" name="Straight Connector 138">
-            <a:extLst>
-              <a:ext uri="{FF2B5EF4-FFF2-40B4-BE49-F238E27FC236}">
-                <a16:creationId xmlns:a16="http://schemas.microsoft.com/office/drawing/2014/main" id="{70B1CBBC-095C-4D7C-A96E-BF7FE9F24368}"/>
-              </a:ext>
-            </a:extLst>
-          </p:cNvPr>
-          <p:cNvCxnSpPr>
-            <a:cxnSpLocks/>
-          </p:cNvCxnSpPr>
-          <p:nvPr/>
-        </p:nvCxnSpPr>
-        <p:spPr>
-          <a:xfrm>
-            <a:off x="9969068" y="5556220"/>
-            <a:ext cx="1863078" cy="0"/>
-          </a:xfrm>
-          <a:prstGeom prst="line">
-            <a:avLst/>
-          </a:prstGeom>
-          <a:ln>
-            <a:solidFill>
-              <a:schemeClr val="tx1"/>
-            </a:solidFill>
-          </a:ln>
-        </p:spPr>
-        <p:style>
-          <a:lnRef idx="1">
-            <a:schemeClr val="accent1"/>
-          </a:lnRef>
-          <a:fillRef idx="0">
-            <a:schemeClr val="accent1"/>
-          </a:fillRef>
-          <a:effectRef idx="0">
-            <a:schemeClr val="accent1"/>
-          </a:effectRef>
-          <a:fontRef idx="minor">
-            <a:schemeClr val="tx1"/>
-          </a:fontRef>
-        </p:style>
-      </p:cxnSp>
-      <p:sp>
-        <p:nvSpPr>
-          <p:cNvPr id="140" name="TextBox 139">
-            <a:extLst>
-              <a:ext uri="{FF2B5EF4-FFF2-40B4-BE49-F238E27FC236}">
-                <a16:creationId xmlns:a16="http://schemas.microsoft.com/office/drawing/2014/main" id="{D12E18FF-EA29-4CBA-AC1C-5C2DDB31E51D}"/>
-              </a:ext>
-            </a:extLst>
-          </p:cNvPr>
-          <p:cNvSpPr txBox="1"/>
-          <p:nvPr/>
-        </p:nvSpPr>
-        <p:spPr>
-          <a:xfrm>
-            <a:off x="10207853" y="6377256"/>
-            <a:ext cx="731932" cy="369332"/>
-          </a:xfrm>
-          <a:prstGeom prst="rect">
-            <a:avLst/>
-          </a:prstGeom>
-          <a:noFill/>
-        </p:spPr>
-        <p:txBody>
-          <a:bodyPr wrap="none" rtlCol="0">
-            <a:spAutoFit/>
-          </a:bodyPr>
-          <a:lstStyle/>
-          <a:p>
-            <a:r>
-              <a:rPr lang="en-US" dirty="0"/>
-              <a:t>Guest</a:t>
-            </a:r>
-          </a:p>
-        </p:txBody>
-      </p:sp>
-      <p:sp>
-        <p:nvSpPr>
-          <p:cNvPr id="141" name="TextBox 140">
-            <a:extLst>
-              <a:ext uri="{FF2B5EF4-FFF2-40B4-BE49-F238E27FC236}">
-                <a16:creationId xmlns:a16="http://schemas.microsoft.com/office/drawing/2014/main" id="{F65C9F02-280A-4D0B-BE5F-8EE21A500311}"/>
-              </a:ext>
-            </a:extLst>
-          </p:cNvPr>
-          <p:cNvSpPr txBox="1"/>
-          <p:nvPr/>
-        </p:nvSpPr>
-        <p:spPr>
-          <a:xfrm>
-            <a:off x="10202404" y="6013800"/>
-            <a:ext cx="1629742" cy="369332"/>
-          </a:xfrm>
-          <a:prstGeom prst="rect">
-            <a:avLst/>
-          </a:prstGeom>
-          <a:noFill/>
-        </p:spPr>
-        <p:txBody>
-          <a:bodyPr wrap="none" rtlCol="0">
-            <a:spAutoFit/>
-          </a:bodyPr>
-          <a:lstStyle/>
-          <a:p>
-            <a:r>
-              <a:rPr lang="en-US" dirty="0" err="1"/>
-              <a:t>Location_name</a:t>
-            </a:r>
-            <a:endParaRPr lang="en-US" dirty="0"/>
-          </a:p>
-        </p:txBody>
-      </p:sp>
-      <p:sp>
-        <p:nvSpPr>
-          <p:cNvPr id="142" name="TextBox 141">
-            <a:extLst>
-              <a:ext uri="{FF2B5EF4-FFF2-40B4-BE49-F238E27FC236}">
-                <a16:creationId xmlns:a16="http://schemas.microsoft.com/office/drawing/2014/main" id="{A84C1AEC-236C-4A9E-B39E-E4E8D26DFADF}"/>
-              </a:ext>
-            </a:extLst>
-          </p:cNvPr>
-          <p:cNvSpPr txBox="1"/>
-          <p:nvPr/>
-        </p:nvSpPr>
-        <p:spPr>
-          <a:xfrm>
-            <a:off x="10226903" y="5659204"/>
-            <a:ext cx="1290481" cy="369332"/>
-          </a:xfrm>
-          <a:prstGeom prst="rect">
-            <a:avLst/>
-          </a:prstGeom>
-          <a:noFill/>
-        </p:spPr>
-        <p:txBody>
-          <a:bodyPr wrap="none" rtlCol="0">
-            <a:spAutoFit/>
-          </a:bodyPr>
-          <a:lstStyle/>
-          <a:p>
-            <a:r>
-              <a:rPr lang="en-US" b="1" dirty="0" err="1"/>
-              <a:t>Location_id</a:t>
-            </a:r>
-            <a:endParaRPr lang="en-US" b="1" dirty="0"/>
-          </a:p>
-        </p:txBody>
-      </p:sp>
-      <p:sp>
-        <p:nvSpPr>
-          <p:cNvPr id="143" name="TextBox 142">
-            <a:extLst>
-              <a:ext uri="{FF2B5EF4-FFF2-40B4-BE49-F238E27FC236}">
-                <a16:creationId xmlns:a16="http://schemas.microsoft.com/office/drawing/2014/main" id="{D221F5F8-1A4F-4314-936B-DBF26BF053B7}"/>
-              </a:ext>
-            </a:extLst>
-          </p:cNvPr>
-          <p:cNvSpPr txBox="1"/>
-          <p:nvPr/>
-        </p:nvSpPr>
-        <p:spPr>
-          <a:xfrm>
-            <a:off x="9568501" y="5502000"/>
-            <a:ext cx="301686" cy="369332"/>
-          </a:xfrm>
-          <a:prstGeom prst="rect">
-            <a:avLst/>
-          </a:prstGeom>
-          <a:noFill/>
-        </p:spPr>
-        <p:txBody>
-          <a:bodyPr wrap="none" rtlCol="0">
-            <a:spAutoFit/>
-          </a:bodyPr>
-          <a:lstStyle/>
-          <a:p>
-            <a:r>
-              <a:rPr lang="en-US" dirty="0">
-                <a:solidFill>
-                  <a:schemeClr val="accent1"/>
-                </a:solidFill>
-              </a:rPr>
-              <a:t>1</a:t>
-            </a:r>
-          </a:p>
-        </p:txBody>
-      </p:sp>
-      <p:sp>
-        <p:nvSpPr>
-          <p:cNvPr id="144" name="TextBox 143">
-            <a:extLst>
-              <a:ext uri="{FF2B5EF4-FFF2-40B4-BE49-F238E27FC236}">
-                <a16:creationId xmlns:a16="http://schemas.microsoft.com/office/drawing/2014/main" id="{1180450C-C504-4E4D-8D4B-A059916DBCFF}"/>
-              </a:ext>
-            </a:extLst>
-          </p:cNvPr>
-          <p:cNvSpPr txBox="1"/>
-          <p:nvPr/>
-        </p:nvSpPr>
-        <p:spPr>
-          <a:xfrm>
-            <a:off x="9901941" y="5683152"/>
-            <a:ext cx="405880" cy="338554"/>
-          </a:xfrm>
-          <a:prstGeom prst="rect">
-            <a:avLst/>
-          </a:prstGeom>
-          <a:noFill/>
-        </p:spPr>
-        <p:txBody>
-          <a:bodyPr wrap="none" rtlCol="0">
-            <a:spAutoFit/>
-          </a:bodyPr>
-          <a:lstStyle/>
-          <a:p>
-            <a:r>
-              <a:rPr lang="en-US" sz="1600" b="1" dirty="0">
-                <a:solidFill>
-                  <a:schemeClr val="accent2"/>
-                </a:solidFill>
-              </a:rPr>
-              <a:t>PK</a:t>
             </a:r>
           </a:p>
         </p:txBody>
@@ -5138,14 +4707,14 @@
           <p:cNvCxnSpPr>
             <a:cxnSpLocks/>
             <a:stCxn id="51" idx="3"/>
-            <a:endCxn id="124" idx="0"/>
+            <a:endCxn id="124" idx="1"/>
           </p:cNvCxnSpPr>
           <p:nvPr/>
         </p:nvCxnSpPr>
         <p:spPr>
           <a:xfrm>
-            <a:off x="7214378" y="979905"/>
-            <a:ext cx="3612299" cy="301193"/>
+            <a:off x="7214378" y="1777573"/>
+            <a:ext cx="2651443" cy="934495"/>
           </a:xfrm>
           <a:prstGeom prst="line">
             <a:avLst/>
@@ -5176,54 +4745,16 @@
             </a:extLst>
           </p:cNvPr>
           <p:cNvCxnSpPr>
+            <a:cxnSpLocks/>
             <a:stCxn id="61" idx="2"/>
-            <a:endCxn id="107" idx="1"/>
+            <a:endCxn id="53" idx="1"/>
           </p:cNvCxnSpPr>
           <p:nvPr/>
         </p:nvCxnSpPr>
         <p:spPr>
           <a:xfrm>
-            <a:off x="1694601" y="3739068"/>
-            <a:ext cx="3614596" cy="1619917"/>
-          </a:xfrm>
-          <a:prstGeom prst="line">
-            <a:avLst/>
-          </a:prstGeom>
-        </p:spPr>
-        <p:style>
-          <a:lnRef idx="1">
-            <a:schemeClr val="accent1"/>
-          </a:lnRef>
-          <a:fillRef idx="0">
-            <a:schemeClr val="accent1"/>
-          </a:fillRef>
-          <a:effectRef idx="0">
-            <a:schemeClr val="accent1"/>
-          </a:effectRef>
-          <a:fontRef idx="minor">
-            <a:schemeClr val="tx1"/>
-          </a:fontRef>
-        </p:style>
-      </p:cxnSp>
-      <p:cxnSp>
-        <p:nvCxnSpPr>
-          <p:cNvPr id="18" name="Straight Connector 17">
-            <a:extLst>
-              <a:ext uri="{FF2B5EF4-FFF2-40B4-BE49-F238E27FC236}">
-                <a16:creationId xmlns:a16="http://schemas.microsoft.com/office/drawing/2014/main" id="{AB824854-7547-4B9F-B535-66720CCA6965}"/>
-              </a:ext>
-            </a:extLst>
-          </p:cNvPr>
-          <p:cNvCxnSpPr>
-            <a:cxnSpLocks/>
-            <a:endCxn id="137" idx="1"/>
-          </p:cNvCxnSpPr>
-          <p:nvPr/>
-        </p:nvCxnSpPr>
-        <p:spPr>
-          <a:xfrm>
-            <a:off x="7293060" y="5491314"/>
-            <a:ext cx="2637372" cy="439873"/>
+            <a:off x="1694601" y="3612951"/>
+            <a:ext cx="3653203" cy="1438063"/>
           </a:xfrm>
           <a:prstGeom prst="line">
             <a:avLst/>
@@ -5262,8 +4793,8 @@
         </p:nvCxnSpPr>
         <p:spPr>
           <a:xfrm flipH="1">
-            <a:off x="7269516" y="3082864"/>
-            <a:ext cx="3557161" cy="2112093"/>
+            <a:off x="7269516" y="3612951"/>
+            <a:ext cx="3557161" cy="1438063"/>
           </a:xfrm>
           <a:prstGeom prst="line">
             <a:avLst/>
@@ -5298,46 +4829,7 @@
         </p:nvSpPr>
         <p:spPr>
           <a:xfrm>
-            <a:off x="1556991" y="904664"/>
-            <a:ext cx="301686" cy="369332"/>
-          </a:xfrm>
-          <a:prstGeom prst="rect">
-            <a:avLst/>
-          </a:prstGeom>
-          <a:noFill/>
-        </p:spPr>
-        <p:txBody>
-          <a:bodyPr wrap="none" rtlCol="0">
-            <a:spAutoFit/>
-          </a:bodyPr>
-          <a:lstStyle/>
-          <a:p>
-            <a:r>
-              <a:rPr lang="en-US" dirty="0">
-                <a:solidFill>
-                  <a:schemeClr val="accent1"/>
-                </a:solidFill>
-              </a:rPr>
-              <a:t>*</a:t>
-            </a:r>
-          </a:p>
-        </p:txBody>
-      </p:sp>
-      <p:sp>
-        <p:nvSpPr>
-          <p:cNvPr id="147" name="TextBox 146">
-            <a:extLst>
-              <a:ext uri="{FF2B5EF4-FFF2-40B4-BE49-F238E27FC236}">
-                <a16:creationId xmlns:a16="http://schemas.microsoft.com/office/drawing/2014/main" id="{9E2BC56C-4D3B-4EEB-832D-452DE585FA99}"/>
-              </a:ext>
-            </a:extLst>
-          </p:cNvPr>
-          <p:cNvSpPr txBox="1"/>
-          <p:nvPr/>
-        </p:nvSpPr>
-        <p:spPr>
-          <a:xfrm>
-            <a:off x="7266167" y="5514351"/>
+            <a:off x="2738075" y="2373654"/>
             <a:ext cx="301686" cy="369332"/>
           </a:xfrm>
           <a:prstGeom prst="rect">
@@ -5376,7 +4868,7 @@
         </p:nvSpPr>
         <p:spPr>
           <a:xfrm>
-            <a:off x="10740445" y="853129"/>
+            <a:off x="9561528" y="2355198"/>
             <a:ext cx="301686" cy="369332"/>
           </a:xfrm>
           <a:prstGeom prst="rect">
@@ -5401,51 +4893,12 @@
           </a:p>
         </p:txBody>
       </p:sp>
-      <p:cxnSp>
-        <p:nvCxnSpPr>
-          <p:cNvPr id="26" name="Straight Connector 25">
+      <p:sp>
+        <p:nvSpPr>
+          <p:cNvPr id="73" name="TextBox 72">
             <a:extLst>
               <a:ext uri="{FF2B5EF4-FFF2-40B4-BE49-F238E27FC236}">
-                <a16:creationId xmlns:a16="http://schemas.microsoft.com/office/drawing/2014/main" id="{25FE4D28-9332-416E-9C89-00779B2DDD78}"/>
-              </a:ext>
-            </a:extLst>
-          </p:cNvPr>
-          <p:cNvCxnSpPr>
-            <a:stCxn id="51" idx="2"/>
-            <a:endCxn id="53" idx="0"/>
-          </p:cNvCxnSpPr>
-          <p:nvPr/>
-        </p:nvCxnSpPr>
-        <p:spPr>
-          <a:xfrm flipH="1">
-            <a:off x="6308660" y="1891358"/>
-            <a:ext cx="4197" cy="2089277"/>
-          </a:xfrm>
-          <a:prstGeom prst="line">
-            <a:avLst/>
-          </a:prstGeom>
-        </p:spPr>
-        <p:style>
-          <a:lnRef idx="1">
-            <a:schemeClr val="accent1"/>
-          </a:lnRef>
-          <a:fillRef idx="0">
-            <a:schemeClr val="accent1"/>
-          </a:fillRef>
-          <a:effectRef idx="0">
-            <a:schemeClr val="accent1"/>
-          </a:effectRef>
-          <a:fontRef idx="minor">
-            <a:schemeClr val="tx1"/>
-          </a:fontRef>
-        </p:style>
-      </p:cxnSp>
-      <p:sp>
-        <p:nvSpPr>
-          <p:cNvPr id="64" name="TextBox 63">
-            <a:extLst>
-              <a:ext uri="{FF2B5EF4-FFF2-40B4-BE49-F238E27FC236}">
-                <a16:creationId xmlns:a16="http://schemas.microsoft.com/office/drawing/2014/main" id="{DA36E60A-B41A-4057-9F9F-9FCA35EA243D}"/>
+                <a16:creationId xmlns:a16="http://schemas.microsoft.com/office/drawing/2014/main" id="{1BD4E46F-AE05-4331-B64D-83AA0F5F73A5}"/>
               </a:ext>
             </a:extLst>
           </p:cNvPr>
@@ -5454,8 +4907,8 @@
         </p:nvSpPr>
         <p:spPr>
           <a:xfrm>
-            <a:off x="6248927" y="1922455"/>
-            <a:ext cx="301686" cy="369332"/>
+            <a:off x="5628038" y="6229141"/>
+            <a:ext cx="845296" cy="369332"/>
           </a:xfrm>
           <a:prstGeom prst="rect">
             <a:avLst/>
@@ -5469,22 +4922,18 @@
           <a:lstStyle/>
           <a:p>
             <a:r>
-              <a:rPr lang="en-US" dirty="0">
-                <a:solidFill>
-                  <a:schemeClr val="accent1"/>
-                </a:solidFill>
-              </a:rPr>
-              <a:t>1</a:t>
-            </a:r>
-          </a:p>
-        </p:txBody>
-      </p:sp>
-      <p:sp>
-        <p:nvSpPr>
-          <p:cNvPr id="65" name="TextBox 64">
+              <a:rPr lang="en-US" dirty="0"/>
+              <a:t>Picture</a:t>
+            </a:r>
+          </a:p>
+        </p:txBody>
+      </p:sp>
+      <p:sp>
+        <p:nvSpPr>
+          <p:cNvPr id="84" name="TextBox 83">
             <a:extLst>
               <a:ext uri="{FF2B5EF4-FFF2-40B4-BE49-F238E27FC236}">
-                <a16:creationId xmlns:a16="http://schemas.microsoft.com/office/drawing/2014/main" id="{5F3A79DB-34D1-4140-96E2-358AA45E8D9A}"/>
+                <a16:creationId xmlns:a16="http://schemas.microsoft.com/office/drawing/2014/main" id="{4C0D4EB3-5DEB-46A5-A798-64FA7C0D997C}"/>
               </a:ext>
             </a:extLst>
           </p:cNvPr>
@@ -5493,8 +4942,8 @@
         </p:nvSpPr>
         <p:spPr>
           <a:xfrm>
-            <a:off x="5994871" y="3685677"/>
-            <a:ext cx="301686" cy="369332"/>
+            <a:off x="5627212" y="5326608"/>
+            <a:ext cx="1085554" cy="369332"/>
           </a:xfrm>
           <a:prstGeom prst="rect">
             <a:avLst/>
@@ -5508,13 +4957,10 @@
           <a:lstStyle/>
           <a:p>
             <a:r>
-              <a:rPr lang="en-US" dirty="0">
-                <a:solidFill>
-                  <a:schemeClr val="accent1"/>
-                </a:solidFill>
-              </a:rPr>
-              <a:t>*</a:t>
-            </a:r>
+              <a:rPr lang="en-US" dirty="0" err="1"/>
+              <a:t>End_time</a:t>
+            </a:r>
+            <a:endParaRPr lang="en-US" dirty="0"/>
           </a:p>
         </p:txBody>
       </p:sp>

</xml_diff>

<commit_message>
#10 SignInSignUp Mockup, #18 Update ERD
</commit_message>
<xml_diff>
--- a/docs/ER-DIAGRAM.pptx
+++ b/docs/ER-DIAGRAM.pptx
@@ -242,7 +242,7 @@
           <a:p>
             <a:fld id="{28BE630F-C39C-4DB9-8258-0B48CA067079}" type="datetimeFigureOut">
               <a:rPr lang="en-US" smtClean="0"/>
-              <a:t>11/29/2021</a:t>
+              <a:t>11/30/2021</a:t>
             </a:fld>
             <a:endParaRPr lang="en-US"/>
           </a:p>
@@ -410,7 +410,7 @@
           <a:p>
             <a:fld id="{28BE630F-C39C-4DB9-8258-0B48CA067079}" type="datetimeFigureOut">
               <a:rPr lang="en-US" smtClean="0"/>
-              <a:t>11/29/2021</a:t>
+              <a:t>11/30/2021</a:t>
             </a:fld>
             <a:endParaRPr lang="en-US"/>
           </a:p>
@@ -588,7 +588,7 @@
           <a:p>
             <a:fld id="{28BE630F-C39C-4DB9-8258-0B48CA067079}" type="datetimeFigureOut">
               <a:rPr lang="en-US" smtClean="0"/>
-              <a:t>11/29/2021</a:t>
+              <a:t>11/30/2021</a:t>
             </a:fld>
             <a:endParaRPr lang="en-US"/>
           </a:p>
@@ -756,7 +756,7 @@
           <a:p>
             <a:fld id="{28BE630F-C39C-4DB9-8258-0B48CA067079}" type="datetimeFigureOut">
               <a:rPr lang="en-US" smtClean="0"/>
-              <a:t>11/29/2021</a:t>
+              <a:t>11/30/2021</a:t>
             </a:fld>
             <a:endParaRPr lang="en-US"/>
           </a:p>
@@ -1001,7 +1001,7 @@
           <a:p>
             <a:fld id="{28BE630F-C39C-4DB9-8258-0B48CA067079}" type="datetimeFigureOut">
               <a:rPr lang="en-US" smtClean="0"/>
-              <a:t>11/29/2021</a:t>
+              <a:t>11/30/2021</a:t>
             </a:fld>
             <a:endParaRPr lang="en-US"/>
           </a:p>
@@ -1230,7 +1230,7 @@
           <a:p>
             <a:fld id="{28BE630F-C39C-4DB9-8258-0B48CA067079}" type="datetimeFigureOut">
               <a:rPr lang="en-US" smtClean="0"/>
-              <a:t>11/29/2021</a:t>
+              <a:t>11/30/2021</a:t>
             </a:fld>
             <a:endParaRPr lang="en-US"/>
           </a:p>
@@ -1594,7 +1594,7 @@
           <a:p>
             <a:fld id="{28BE630F-C39C-4DB9-8258-0B48CA067079}" type="datetimeFigureOut">
               <a:rPr lang="en-US" smtClean="0"/>
-              <a:t>11/29/2021</a:t>
+              <a:t>11/30/2021</a:t>
             </a:fld>
             <a:endParaRPr lang="en-US"/>
           </a:p>
@@ -1711,7 +1711,7 @@
           <a:p>
             <a:fld id="{28BE630F-C39C-4DB9-8258-0B48CA067079}" type="datetimeFigureOut">
               <a:rPr lang="en-US" smtClean="0"/>
-              <a:t>11/29/2021</a:t>
+              <a:t>11/30/2021</a:t>
             </a:fld>
             <a:endParaRPr lang="en-US"/>
           </a:p>
@@ -1806,7 +1806,7 @@
           <a:p>
             <a:fld id="{28BE630F-C39C-4DB9-8258-0B48CA067079}" type="datetimeFigureOut">
               <a:rPr lang="en-US" smtClean="0"/>
-              <a:t>11/29/2021</a:t>
+              <a:t>11/30/2021</a:t>
             </a:fld>
             <a:endParaRPr lang="en-US"/>
           </a:p>
@@ -2081,7 +2081,7 @@
           <a:p>
             <a:fld id="{28BE630F-C39C-4DB9-8258-0B48CA067079}" type="datetimeFigureOut">
               <a:rPr lang="en-US" smtClean="0"/>
-              <a:t>11/29/2021</a:t>
+              <a:t>11/30/2021</a:t>
             </a:fld>
             <a:endParaRPr lang="en-US"/>
           </a:p>
@@ -2333,7 +2333,7 @@
           <a:p>
             <a:fld id="{28BE630F-C39C-4DB9-8258-0B48CA067079}" type="datetimeFigureOut">
               <a:rPr lang="en-US" smtClean="0"/>
-              <a:t>11/29/2021</a:t>
+              <a:t>11/30/2021</a:t>
             </a:fld>
             <a:endParaRPr lang="en-US"/>
           </a:p>
@@ -2544,7 +2544,7 @@
           <a:p>
             <a:fld id="{28BE630F-C39C-4DB9-8258-0B48CA067079}" type="datetimeFigureOut">
               <a:rPr lang="en-US" smtClean="0"/>
-              <a:t>11/29/2021</a:t>
+              <a:t>11/30/2021</a:t>
             </a:fld>
             <a:endParaRPr lang="en-US"/>
           </a:p>
@@ -3762,7 +3762,7 @@
         </p:nvSpPr>
         <p:spPr>
           <a:xfrm>
-            <a:off x="10854092" y="3569626"/>
+            <a:off x="10854092" y="3423854"/>
             <a:ext cx="301686" cy="369332"/>
           </a:xfrm>
           <a:prstGeom prst="rect">
@@ -4255,7 +4255,7 @@
         <p:spPr>
           <a:xfrm>
             <a:off x="9865821" y="1811185"/>
-            <a:ext cx="1921712" cy="1801766"/>
+            <a:ext cx="1921712" cy="1617815"/>
           </a:xfrm>
           <a:prstGeom prst="rect">
             <a:avLst/>
@@ -4364,42 +4364,6 @@
       </p:cxnSp>
       <p:sp>
         <p:nvSpPr>
-          <p:cNvPr id="127" name="TextBox 126">
-            <a:extLst>
-              <a:ext uri="{FF2B5EF4-FFF2-40B4-BE49-F238E27FC236}">
-                <a16:creationId xmlns:a16="http://schemas.microsoft.com/office/drawing/2014/main" id="{6CC432D3-63DD-48E7-B994-932AF7F45410}"/>
-              </a:ext>
-            </a:extLst>
-          </p:cNvPr>
-          <p:cNvSpPr txBox="1"/>
-          <p:nvPr/>
-        </p:nvSpPr>
-        <p:spPr>
-          <a:xfrm>
-            <a:off x="10162292" y="3071000"/>
-            <a:ext cx="907621" cy="369332"/>
-          </a:xfrm>
-          <a:prstGeom prst="rect">
-            <a:avLst/>
-          </a:prstGeom>
-          <a:noFill/>
-        </p:spPr>
-        <p:txBody>
-          <a:bodyPr wrap="none" rtlCol="0">
-            <a:spAutoFit/>
-          </a:bodyPr>
-          <a:lstStyle/>
-          <a:p>
-            <a:r>
-              <a:rPr lang="en-US" dirty="0" err="1"/>
-              <a:t>User_id</a:t>
-            </a:r>
-            <a:endParaRPr lang="en-US" dirty="0"/>
-          </a:p>
-        </p:txBody>
-      </p:sp>
-      <p:sp>
-        <p:nvSpPr>
           <p:cNvPr id="128" name="TextBox 127">
             <a:extLst>
               <a:ext uri="{FF2B5EF4-FFF2-40B4-BE49-F238E27FC236}">
@@ -4544,45 +4508,6 @@
                 </a:solidFill>
               </a:rPr>
               <a:t>PK</a:t>
-            </a:r>
-          </a:p>
-        </p:txBody>
-      </p:sp>
-      <p:sp>
-        <p:nvSpPr>
-          <p:cNvPr id="132" name="TextBox 131">
-            <a:extLst>
-              <a:ext uri="{FF2B5EF4-FFF2-40B4-BE49-F238E27FC236}">
-                <a16:creationId xmlns:a16="http://schemas.microsoft.com/office/drawing/2014/main" id="{6E94FA1B-316E-491E-B7A4-50C72371E7FD}"/>
-              </a:ext>
-            </a:extLst>
-          </p:cNvPr>
-          <p:cNvSpPr txBox="1"/>
-          <p:nvPr/>
-        </p:nvSpPr>
-        <p:spPr>
-          <a:xfrm>
-            <a:off x="9846264" y="3087347"/>
-            <a:ext cx="391454" cy="338554"/>
-          </a:xfrm>
-          <a:prstGeom prst="rect">
-            <a:avLst/>
-          </a:prstGeom>
-          <a:noFill/>
-        </p:spPr>
-        <p:txBody>
-          <a:bodyPr wrap="none" rtlCol="0">
-            <a:spAutoFit/>
-          </a:bodyPr>
-          <a:lstStyle/>
-          <a:p>
-            <a:r>
-              <a:rPr lang="en-US" sz="1600" b="1" dirty="0">
-                <a:solidFill>
-                  <a:srgbClr val="7030A0"/>
-                </a:solidFill>
-              </a:rPr>
-              <a:t>FK</a:t>
             </a:r>
           </a:p>
         </p:txBody>
@@ -4720,8 +4645,8 @@
         </p:nvCxnSpPr>
         <p:spPr>
           <a:xfrm flipH="1">
-            <a:off x="7269516" y="3612951"/>
-            <a:ext cx="3557161" cy="1623592"/>
+            <a:off x="7269516" y="3429000"/>
+            <a:ext cx="3557161" cy="1807543"/>
           </a:xfrm>
           <a:prstGeom prst="line">
             <a:avLst/>

</xml_diff>